<commit_message>
baby came to visit post nap
</commit_message>
<xml_diff>
--- a/Week7_MasterDataMgmt/BachmeierNTIM7030-7.pptx
+++ b/Week7_MasterDataMgmt/BachmeierNTIM7030-7.pptx
@@ -2542,10 +2542,9 @@
             </a:lnSpc>
           </a:pPr>
           <a:r>
-            <a:rPr lang="en-US"/>
+            <a:rPr lang="en-US" dirty="0"/>
             <a:t>Frameworks and Tooling</a:t>
           </a:r>
-          <a:endParaRPr lang="en-US" dirty="0"/>
         </a:p>
       </dgm:t>
     </dgm:pt>
@@ -2788,6 +2787,7 @@
             <a:rPr lang="en-US"/>
             <a:t>Master Data Management</a:t>
           </a:r>
+          <a:endParaRPr lang="en-US" dirty="0"/>
         </a:p>
       </dgm:t>
     </dgm:pt>
@@ -2826,9 +2826,10 @@
             </a:lnSpc>
           </a:pPr>
           <a:r>
-            <a:rPr lang="en-US" dirty="0"/>
+            <a:rPr lang="en-US"/>
             <a:t>Sharing business entities to enable business workflows</a:t>
           </a:r>
+          <a:endParaRPr lang="en-US" dirty="0"/>
         </a:p>
       </dgm:t>
     </dgm:pt>
@@ -3117,9 +3118,10 @@
             </a:lnSpc>
           </a:pPr>
           <a:r>
-            <a:rPr lang="en-US" dirty="0"/>
+            <a:rPr lang="en-US"/>
             <a:t>Partially trusted clients becomes the norm</a:t>
           </a:r>
+          <a:endParaRPr lang="en-US" dirty="0"/>
         </a:p>
       </dgm:t>
     </dgm:pt>
@@ -3158,11 +3160,11 @@
             </a:lnSpc>
           </a:pPr>
           <a:r>
-            <a:rPr lang="en-US" dirty="0"/>
+            <a:rPr lang="en-US"/>
             <a:t>Information becomes portable and decentralized</a:t>
           </a:r>
           <a:br>
-            <a:rPr lang="en-US" dirty="0"/>
+            <a:rPr lang="en-US"/>
           </a:br>
           <a:endParaRPr lang="en-US" dirty="0"/>
         </a:p>
@@ -3183,6 +3185,131 @@
       <dgm:prSet/>
       <dgm:spPr/>
     </dgm:pt>
+    <dgm:pt modelId="{193D77D5-5B09-44BB-878B-DA7EA745E30A}">
+      <dgm:prSet/>
+      <dgm:spPr/>
+      <dgm:t>
+        <a:bodyPr/>
+        <a:lstStyle/>
+        <a:p>
+          <a:pPr>
+            <a:lnSpc>
+              <a:spcPct val="100000"/>
+            </a:lnSpc>
+          </a:pPr>
+          <a:r>
+            <a:rPr lang="en-US"/>
+            <a:t>Mainframes and Data warehouses</a:t>
+          </a:r>
+          <a:endParaRPr lang="en-US" dirty="0"/>
+        </a:p>
+      </dgm:t>
+    </dgm:pt>
+    <dgm:pt modelId="{3637D2D2-1B06-42B3-8CCE-F1D2F93841AF}" type="parTrans" cxnId="{AD4FBE7F-9F6C-4890-A892-4E7D6C72B3D8}">
+      <dgm:prSet/>
+      <dgm:spPr/>
+      <dgm:t>
+        <a:bodyPr/>
+        <a:lstStyle/>
+        <a:p>
+          <a:endParaRPr lang="en-US"/>
+        </a:p>
+      </dgm:t>
+    </dgm:pt>
+    <dgm:pt modelId="{1B48D156-30FE-4BEA-AA63-5538EE45CAD0}" type="sibTrans" cxnId="{AD4FBE7F-9F6C-4890-A892-4E7D6C72B3D8}">
+      <dgm:prSet/>
+      <dgm:spPr/>
+      <dgm:t>
+        <a:bodyPr/>
+        <a:lstStyle/>
+        <a:p>
+          <a:endParaRPr lang="en-US"/>
+        </a:p>
+      </dgm:t>
+    </dgm:pt>
+    <dgm:pt modelId="{667C759C-2990-4AE1-96D2-4782F199B51B}">
+      <dgm:prSet/>
+      <dgm:spPr/>
+      <dgm:t>
+        <a:bodyPr/>
+        <a:lstStyle/>
+        <a:p>
+          <a:pPr>
+            <a:lnSpc>
+              <a:spcPct val="100000"/>
+            </a:lnSpc>
+          </a:pPr>
+          <a:r>
+            <a:rPr lang="en-US"/>
+            <a:t>Centralize single sourced</a:t>
+          </a:r>
+          <a:endParaRPr lang="en-US" dirty="0"/>
+        </a:p>
+      </dgm:t>
+    </dgm:pt>
+    <dgm:pt modelId="{654033B4-B7E9-47F6-9956-A3B91500E41D}" type="parTrans" cxnId="{CF90839B-F28D-49A6-82B7-84D55572FD65}">
+      <dgm:prSet/>
+      <dgm:spPr/>
+      <dgm:t>
+        <a:bodyPr/>
+        <a:lstStyle/>
+        <a:p>
+          <a:endParaRPr lang="en-US"/>
+        </a:p>
+      </dgm:t>
+    </dgm:pt>
+    <dgm:pt modelId="{70CF29A9-A183-4120-B5F7-78544381BDA0}" type="sibTrans" cxnId="{CF90839B-F28D-49A6-82B7-84D55572FD65}">
+      <dgm:prSet/>
+      <dgm:spPr/>
+      <dgm:t>
+        <a:bodyPr/>
+        <a:lstStyle/>
+        <a:p>
+          <a:endParaRPr lang="en-US"/>
+        </a:p>
+      </dgm:t>
+    </dgm:pt>
+    <dgm:pt modelId="{8A3E40B4-9A61-4006-94C8-A6BFC59DEAAE}">
+      <dgm:prSet/>
+      <dgm:spPr/>
+      <dgm:t>
+        <a:bodyPr/>
+        <a:lstStyle/>
+        <a:p>
+          <a:pPr>
+            <a:lnSpc>
+              <a:spcPct val="100000"/>
+            </a:lnSpc>
+          </a:pPr>
+          <a:r>
+            <a:rPr lang="en-US" dirty="0"/>
+            <a:t>Easy to manage through boarder security</a:t>
+          </a:r>
+        </a:p>
+      </dgm:t>
+    </dgm:pt>
+    <dgm:pt modelId="{98022190-66E5-4E68-A5E7-1C379D3B42AC}" type="parTrans" cxnId="{6AF535C3-B5B7-4F53-881C-6732CD02926C}">
+      <dgm:prSet/>
+      <dgm:spPr/>
+      <dgm:t>
+        <a:bodyPr/>
+        <a:lstStyle/>
+        <a:p>
+          <a:endParaRPr lang="en-US"/>
+        </a:p>
+      </dgm:t>
+    </dgm:pt>
+    <dgm:pt modelId="{A2248C73-DDF9-48CA-B8F2-BE7153E7FB25}" type="sibTrans" cxnId="{6AF535C3-B5B7-4F53-881C-6732CD02926C}">
+      <dgm:prSet/>
+      <dgm:spPr/>
+      <dgm:t>
+        <a:bodyPr/>
+        <a:lstStyle/>
+        <a:p>
+          <a:endParaRPr lang="en-US"/>
+        </a:p>
+      </dgm:t>
+    </dgm:pt>
     <dgm:pt modelId="{FAB61EDF-5DF9-4AE9-AFD9-9D075034EE5F}" type="pres">
       <dgm:prSet presAssocID="{8F467E0F-078A-46B0-9FD4-76CAFB19F654}" presName="Name0" presStyleCnt="0">
         <dgm:presLayoutVars>
@@ -3198,11 +3325,11 @@
       <dgm:spPr/>
     </dgm:pt>
     <dgm:pt modelId="{C49C736A-68C2-4078-87A3-ED8E15579E00}" type="pres">
-      <dgm:prSet presAssocID="{AD7B22C3-62FF-4240-9A8E-B681D9CA4CBD}" presName="parentTextBox" presStyleLbl="alignNode1" presStyleIdx="0" presStyleCnt="3"/>
+      <dgm:prSet presAssocID="{AD7B22C3-62FF-4240-9A8E-B681D9CA4CBD}" presName="parentTextBox" presStyleLbl="alignNode1" presStyleIdx="0" presStyleCnt="4"/>
       <dgm:spPr/>
     </dgm:pt>
     <dgm:pt modelId="{8EB0E6A6-0E4F-4102-88DB-E53700B3B072}" type="pres">
-      <dgm:prSet presAssocID="{AD7B22C3-62FF-4240-9A8E-B681D9CA4CBD}" presName="descendantBox" presStyleLbl="bgAccFollowNode1" presStyleIdx="0" presStyleCnt="3"/>
+      <dgm:prSet presAssocID="{AD7B22C3-62FF-4240-9A8E-B681D9CA4CBD}" presName="descendantBox" presStyleLbl="bgAccFollowNode1" presStyleIdx="0" presStyleCnt="4"/>
       <dgm:spPr/>
     </dgm:pt>
     <dgm:pt modelId="{974E88C6-74ED-4075-9F0F-9A01D950F9B9}" type="pres">
@@ -3218,11 +3345,11 @@
       <dgm:spPr/>
     </dgm:pt>
     <dgm:pt modelId="{DD0547F1-4605-4048-8593-8CCCAD929466}" type="pres">
-      <dgm:prSet presAssocID="{DC7B61BD-E2D8-42E1-B5B3-F02A96679C39}" presName="arrow" presStyleLbl="alignNode1" presStyleIdx="1" presStyleCnt="3"/>
+      <dgm:prSet presAssocID="{DC7B61BD-E2D8-42E1-B5B3-F02A96679C39}" presName="arrow" presStyleLbl="alignNode1" presStyleIdx="1" presStyleCnt="4"/>
       <dgm:spPr/>
     </dgm:pt>
     <dgm:pt modelId="{1994D7F9-37D2-4C2C-9D37-D93B04D95140}" type="pres">
-      <dgm:prSet presAssocID="{DC7B61BD-E2D8-42E1-B5B3-F02A96679C39}" presName="descendantArrow" presStyleLbl="bgAccFollowNode1" presStyleIdx="1" presStyleCnt="3"/>
+      <dgm:prSet presAssocID="{DC7B61BD-E2D8-42E1-B5B3-F02A96679C39}" presName="descendantArrow" presStyleLbl="bgAccFollowNode1" presStyleIdx="1" presStyleCnt="4"/>
       <dgm:spPr/>
     </dgm:pt>
     <dgm:pt modelId="{A08E90FF-A50E-4D1F-93FD-7E2EC635CCDD}" type="pres">
@@ -3238,51 +3365,83 @@
       <dgm:spPr/>
     </dgm:pt>
     <dgm:pt modelId="{0B8C9B41-B938-4F62-94A6-CBEE448CD564}" type="pres">
-      <dgm:prSet presAssocID="{60CB3E7F-2AF6-4028-87D8-EEBE72F769C9}" presName="arrow" presStyleLbl="alignNode1" presStyleIdx="2" presStyleCnt="3"/>
+      <dgm:prSet presAssocID="{60CB3E7F-2AF6-4028-87D8-EEBE72F769C9}" presName="arrow" presStyleLbl="alignNode1" presStyleIdx="2" presStyleCnt="4"/>
       <dgm:spPr/>
     </dgm:pt>
     <dgm:pt modelId="{56DDED8B-1034-442C-BFDD-FC4A509E662F}" type="pres">
-      <dgm:prSet presAssocID="{60CB3E7F-2AF6-4028-87D8-EEBE72F769C9}" presName="descendantArrow" presStyleLbl="bgAccFollowNode1" presStyleIdx="2" presStyleCnt="3"/>
+      <dgm:prSet presAssocID="{60CB3E7F-2AF6-4028-87D8-EEBE72F769C9}" presName="descendantArrow" presStyleLbl="bgAccFollowNode1" presStyleIdx="2" presStyleCnt="4"/>
+      <dgm:spPr/>
+    </dgm:pt>
+    <dgm:pt modelId="{7F4E247E-6808-4D3C-9E7A-8FB49E0B58F3}" type="pres">
+      <dgm:prSet presAssocID="{1B48D156-30FE-4BEA-AA63-5538EE45CAD0}" presName="sp" presStyleCnt="0"/>
+      <dgm:spPr/>
+    </dgm:pt>
+    <dgm:pt modelId="{B2A3017F-FFDF-460E-BADD-532975D1282A}" type="pres">
+      <dgm:prSet presAssocID="{193D77D5-5B09-44BB-878B-DA7EA745E30A}" presName="arrowAndChildren" presStyleCnt="0"/>
+      <dgm:spPr/>
+    </dgm:pt>
+    <dgm:pt modelId="{0D0AF31C-F2AA-4CC4-A2D1-12D05E60B6F4}" type="pres">
+      <dgm:prSet presAssocID="{193D77D5-5B09-44BB-878B-DA7EA745E30A}" presName="parentTextArrow" presStyleLbl="node1" presStyleIdx="0" presStyleCnt="0"/>
+      <dgm:spPr/>
+    </dgm:pt>
+    <dgm:pt modelId="{275DC252-2F96-45CD-9560-E2C478E03B35}" type="pres">
+      <dgm:prSet presAssocID="{193D77D5-5B09-44BB-878B-DA7EA745E30A}" presName="arrow" presStyleLbl="alignNode1" presStyleIdx="3" presStyleCnt="4"/>
+      <dgm:spPr/>
+    </dgm:pt>
+    <dgm:pt modelId="{6093AF76-5407-4005-8E22-4F7152F53309}" type="pres">
+      <dgm:prSet presAssocID="{193D77D5-5B09-44BB-878B-DA7EA745E30A}" presName="descendantArrow" presStyleLbl="bgAccFollowNode1" presStyleIdx="3" presStyleCnt="4"/>
       <dgm:spPr/>
     </dgm:pt>
   </dgm:ptLst>
   <dgm:cxnLst>
     <dgm:cxn modelId="{03B60402-07A6-498D-A294-F84BACF17AC8}" srcId="{DC7B61BD-E2D8-42E1-B5B3-F02A96679C39}" destId="{D4941F80-6BBC-443C-925C-C497047C166D}" srcOrd="1" destOrd="0" parTransId="{F3142173-9904-431C-BA20-F05709637F94}" sibTransId="{68D7467B-74E3-4949-BA99-FCF8CEFC26EC}"/>
-    <dgm:cxn modelId="{B4862A06-C36A-4090-B5B9-668C602ED732}" type="presOf" srcId="{E0B384D1-4B44-4E89-9C54-441F81F2708E}" destId="{8EB0E6A6-0E4F-4102-88DB-E53700B3B072}" srcOrd="0" destOrd="1" presId="urn:microsoft.com/office/officeart/2016/7/layout/VerticalDownArrowProcess"/>
-    <dgm:cxn modelId="{45B0AA11-D801-45E5-ABEB-C65B37768D49}" type="presOf" srcId="{60CB3E7F-2AF6-4028-87D8-EEBE72F769C9}" destId="{E1BD8028-D4B4-4808-A028-B3660301D5B8}" srcOrd="0" destOrd="0" presId="urn:microsoft.com/office/officeart/2016/7/layout/VerticalDownArrowProcess"/>
-    <dgm:cxn modelId="{6D1AF821-11C5-4E10-AB79-2C809274D8DE}" type="presOf" srcId="{DC7B61BD-E2D8-42E1-B5B3-F02A96679C39}" destId="{5E9DDA84-B39D-4C25-B385-3CE83FC7E309}" srcOrd="0" destOrd="0" presId="urn:microsoft.com/office/officeart/2016/7/layout/VerticalDownArrowProcess"/>
-    <dgm:cxn modelId="{5A551335-79AD-42CE-A078-2C57734271A5}" type="presOf" srcId="{DC7B61BD-E2D8-42E1-B5B3-F02A96679C39}" destId="{DD0547F1-4605-4048-8593-8CCCAD929466}" srcOrd="1" destOrd="0" presId="urn:microsoft.com/office/officeart/2016/7/layout/VerticalDownArrowProcess"/>
-    <dgm:cxn modelId="{77A5853A-28E7-4760-AFC6-B939B249C195}" type="presOf" srcId="{F6C9F479-6194-4A55-ACE3-C7477D97A534}" destId="{8EB0E6A6-0E4F-4102-88DB-E53700B3B072}" srcOrd="0" destOrd="2" presId="urn:microsoft.com/office/officeart/2016/7/layout/VerticalDownArrowProcess"/>
-    <dgm:cxn modelId="{27D74540-28BA-4284-B232-EB3CB5A4BB85}" type="presOf" srcId="{E7D0F2ED-7925-43F8-AFEE-8FE911DEA9DC}" destId="{8EB0E6A6-0E4F-4102-88DB-E53700B3B072}" srcOrd="0" destOrd="0" presId="urn:microsoft.com/office/officeart/2016/7/layout/VerticalDownArrowProcess"/>
-    <dgm:cxn modelId="{6B701E5F-E1D6-4D91-85E2-50BC12D6250A}" type="presOf" srcId="{4B986159-A904-4341-838B-2ACED22408D4}" destId="{1994D7F9-37D2-4C2C-9D37-D93B04D95140}" srcOrd="0" destOrd="0" presId="urn:microsoft.com/office/officeart/2016/7/layout/VerticalDownArrowProcess"/>
-    <dgm:cxn modelId="{7A8FA365-9B01-42EF-9A71-120724963474}" type="presOf" srcId="{D4941F80-6BBC-443C-925C-C497047C166D}" destId="{1994D7F9-37D2-4C2C-9D37-D93B04D95140}" srcOrd="0" destOrd="1" presId="urn:microsoft.com/office/officeart/2016/7/layout/VerticalDownArrowProcess"/>
-    <dgm:cxn modelId="{6EBE7567-C0F3-4407-874A-62BA34755A48}" type="presOf" srcId="{A3DD9B0E-F5F7-4DAB-98BE-CDD5B93C3600}" destId="{56DDED8B-1034-442C-BFDD-FC4A509E662F}" srcOrd="0" destOrd="1" presId="urn:microsoft.com/office/officeart/2016/7/layout/VerticalDownArrowProcess"/>
+    <dgm:cxn modelId="{1E035E06-F677-4071-B920-F5B31CED2513}" type="presOf" srcId="{E0B384D1-4B44-4E89-9C54-441F81F2708E}" destId="{8EB0E6A6-0E4F-4102-88DB-E53700B3B072}" srcOrd="0" destOrd="1" presId="urn:microsoft.com/office/officeart/2016/7/layout/VerticalDownArrowProcess"/>
+    <dgm:cxn modelId="{77DA7F11-675E-474A-81DD-1FA43F43DF83}" type="presOf" srcId="{E7D0F2ED-7925-43F8-AFEE-8FE911DEA9DC}" destId="{8EB0E6A6-0E4F-4102-88DB-E53700B3B072}" srcOrd="0" destOrd="0" presId="urn:microsoft.com/office/officeart/2016/7/layout/VerticalDownArrowProcess"/>
+    <dgm:cxn modelId="{6764EC24-8D39-412F-A472-982C3DF4D647}" type="presOf" srcId="{667C759C-2990-4AE1-96D2-4782F199B51B}" destId="{6093AF76-5407-4005-8E22-4F7152F53309}" srcOrd="0" destOrd="0" presId="urn:microsoft.com/office/officeart/2016/7/layout/VerticalDownArrowProcess"/>
+    <dgm:cxn modelId="{23D95A25-90F4-41D9-97EC-A270A7FB43B1}" type="presOf" srcId="{60CB3E7F-2AF6-4028-87D8-EEBE72F769C9}" destId="{E1BD8028-D4B4-4808-A028-B3660301D5B8}" srcOrd="0" destOrd="0" presId="urn:microsoft.com/office/officeart/2016/7/layout/VerticalDownArrowProcess"/>
+    <dgm:cxn modelId="{5609BB28-7B3F-4108-B978-5BDEE400BE6C}" type="presOf" srcId="{4B986159-A904-4341-838B-2ACED22408D4}" destId="{1994D7F9-37D2-4C2C-9D37-D93B04D95140}" srcOrd="0" destOrd="0" presId="urn:microsoft.com/office/officeart/2016/7/layout/VerticalDownArrowProcess"/>
+    <dgm:cxn modelId="{A5CA752C-B800-41D7-95E6-90741032042C}" type="presOf" srcId="{60CB3E7F-2AF6-4028-87D8-EEBE72F769C9}" destId="{0B8C9B41-B938-4F62-94A6-CBEE448CD564}" srcOrd="1" destOrd="0" presId="urn:microsoft.com/office/officeart/2016/7/layout/VerticalDownArrowProcess"/>
+    <dgm:cxn modelId="{BD7F9040-F29F-4D98-83A3-54B25AF6CCFD}" type="presOf" srcId="{8A3E40B4-9A61-4006-94C8-A6BFC59DEAAE}" destId="{6093AF76-5407-4005-8E22-4F7152F53309}" srcOrd="0" destOrd="1" presId="urn:microsoft.com/office/officeart/2016/7/layout/VerticalDownArrowProcess"/>
+    <dgm:cxn modelId="{4E9CAC5B-3B47-4E8B-8372-88AA37183856}" type="presOf" srcId="{F6C9F479-6194-4A55-ACE3-C7477D97A534}" destId="{8EB0E6A6-0E4F-4102-88DB-E53700B3B072}" srcOrd="0" destOrd="2" presId="urn:microsoft.com/office/officeart/2016/7/layout/VerticalDownArrowProcess"/>
     <dgm:cxn modelId="{4705BC70-C10F-4E95-ABBE-7EB782032E06}" srcId="{60CB3E7F-2AF6-4028-87D8-EEBE72F769C9}" destId="{A3DD9B0E-F5F7-4DAB-98BE-CDD5B93C3600}" srcOrd="1" destOrd="0" parTransId="{FBC7D31E-A8B7-4E77-8004-92D6E43CFC9C}" sibTransId="{47DAA418-EC80-4A54-9E9C-1FA217FDA30B}"/>
     <dgm:cxn modelId="{A6EDBE53-3B60-4416-A36F-CE5DD8700ACE}" srcId="{60CB3E7F-2AF6-4028-87D8-EEBE72F769C9}" destId="{A6648A01-26F3-43D6-A489-561F367BD4BD}" srcOrd="0" destOrd="0" parTransId="{A2A93498-6439-4BBC-8D18-32E08B462C5B}" sibTransId="{6BFA4723-C199-442B-8822-4F9AC1A697CD}"/>
+    <dgm:cxn modelId="{AD4FBE7F-9F6C-4890-A892-4E7D6C72B3D8}" srcId="{8F467E0F-078A-46B0-9FD4-76CAFB19F654}" destId="{193D77D5-5B09-44BB-878B-DA7EA745E30A}" srcOrd="0" destOrd="0" parTransId="{3637D2D2-1B06-42B3-8CCE-F1D2F93841AF}" sibTransId="{1B48D156-30FE-4BEA-AA63-5538EE45CAD0}"/>
+    <dgm:cxn modelId="{0D0FBF89-A32D-4ABB-B84F-894B26F5FE80}" type="presOf" srcId="{DC7B61BD-E2D8-42E1-B5B3-F02A96679C39}" destId="{5E9DDA84-B39D-4C25-B385-3CE83FC7E309}" srcOrd="0" destOrd="0" presId="urn:microsoft.com/office/officeart/2016/7/layout/VerticalDownArrowProcess"/>
     <dgm:cxn modelId="{0B59FD8D-517A-4B99-B7CB-5904262FBC1E}" srcId="{DC7B61BD-E2D8-42E1-B5B3-F02A96679C39}" destId="{4B986159-A904-4341-838B-2ACED22408D4}" srcOrd="0" destOrd="0" parTransId="{7BAE265A-97B4-47E0-B95A-42852F6051D7}" sibTransId="{5A3D5F8D-32CF-43D6-9E67-3FEB90B0E199}"/>
+    <dgm:cxn modelId="{CF90839B-F28D-49A6-82B7-84D55572FD65}" srcId="{193D77D5-5B09-44BB-878B-DA7EA745E30A}" destId="{667C759C-2990-4AE1-96D2-4782F199B51B}" srcOrd="0" destOrd="0" parTransId="{654033B4-B7E9-47F6-9956-A3B91500E41D}" sibTransId="{70CF29A9-A183-4120-B5F7-78544381BDA0}"/>
     <dgm:cxn modelId="{ED5B419C-2C24-4758-AC11-372DC9B192EC}" srcId="{AD7B22C3-62FF-4240-9A8E-B681D9CA4CBD}" destId="{E7D0F2ED-7925-43F8-AFEE-8FE911DEA9DC}" srcOrd="0" destOrd="0" parTransId="{7BD4EC99-6EED-4380-959C-00C468D1A4F7}" sibTransId="{5E340C89-83D0-40E9-BCC2-8032B89705B4}"/>
     <dgm:cxn modelId="{CA0FABA0-A28D-46A3-B10B-F620F13D5FCE}" srcId="{AD7B22C3-62FF-4240-9A8E-B681D9CA4CBD}" destId="{E0B384D1-4B44-4E89-9C54-441F81F2708E}" srcOrd="1" destOrd="0" parTransId="{7BB5A24E-FAD6-4C0A-AA1E-5176D9D01989}" sibTransId="{47D38C78-93B1-4C67-B06F-95FFF3ABB2EB}"/>
-    <dgm:cxn modelId="{B956C2A9-FF73-42A4-B08A-56D474013873}" srcId="{8F467E0F-078A-46B0-9FD4-76CAFB19F654}" destId="{AD7B22C3-62FF-4240-9A8E-B681D9CA4CBD}" srcOrd="2" destOrd="0" parTransId="{462E440D-EECD-4578-BB5D-4312FB23049F}" sibTransId="{90A0763C-B625-4AC0-8D89-D60FFE429F78}"/>
-    <dgm:cxn modelId="{FBA8ADAB-E03D-42E6-95D7-D31041F5C9A0}" srcId="{8F467E0F-078A-46B0-9FD4-76CAFB19F654}" destId="{60CB3E7F-2AF6-4028-87D8-EEBE72F769C9}" srcOrd="0" destOrd="0" parTransId="{F1E6DF51-0BB0-429C-A67C-C4204F714B01}" sibTransId="{9F504EF2-7C3C-408B-9D56-C4F5C399ABBF}"/>
-    <dgm:cxn modelId="{B48147B7-2802-4E03-914E-48C1D1DA7EBF}" srcId="{8F467E0F-078A-46B0-9FD4-76CAFB19F654}" destId="{DC7B61BD-E2D8-42E1-B5B3-F02A96679C39}" srcOrd="1" destOrd="0" parTransId="{479C90CE-5E82-4A52-9AB8-F828457EFFEF}" sibTransId="{CA31602C-704F-4C7D-9008-8FF2D04EB8C7}"/>
-    <dgm:cxn modelId="{AFCDDFCF-4CB2-4F63-896C-9DFADD13EED5}" type="presOf" srcId="{60CB3E7F-2AF6-4028-87D8-EEBE72F769C9}" destId="{0B8C9B41-B938-4F62-94A6-CBEE448CD564}" srcOrd="1" destOrd="0" presId="urn:microsoft.com/office/officeart/2016/7/layout/VerticalDownArrowProcess"/>
-    <dgm:cxn modelId="{2029A3D7-E89A-46DA-8895-8B0BE3F295CB}" type="presOf" srcId="{A6648A01-26F3-43D6-A489-561F367BD4BD}" destId="{56DDED8B-1034-442C-BFDD-FC4A509E662F}" srcOrd="0" destOrd="0" presId="urn:microsoft.com/office/officeart/2016/7/layout/VerticalDownArrowProcess"/>
+    <dgm:cxn modelId="{FC1127A3-EF09-4918-8795-ADEF67B5F950}" type="presOf" srcId="{D4941F80-6BBC-443C-925C-C497047C166D}" destId="{1994D7F9-37D2-4C2C-9D37-D93B04D95140}" srcOrd="0" destOrd="1" presId="urn:microsoft.com/office/officeart/2016/7/layout/VerticalDownArrowProcess"/>
+    <dgm:cxn modelId="{062286A7-555F-4F5C-B8F8-8E68CC578B68}" type="presOf" srcId="{193D77D5-5B09-44BB-878B-DA7EA745E30A}" destId="{275DC252-2F96-45CD-9560-E2C478E03B35}" srcOrd="1" destOrd="0" presId="urn:microsoft.com/office/officeart/2016/7/layout/VerticalDownArrowProcess"/>
+    <dgm:cxn modelId="{B956C2A9-FF73-42A4-B08A-56D474013873}" srcId="{8F467E0F-078A-46B0-9FD4-76CAFB19F654}" destId="{AD7B22C3-62FF-4240-9A8E-B681D9CA4CBD}" srcOrd="3" destOrd="0" parTransId="{462E440D-EECD-4578-BB5D-4312FB23049F}" sibTransId="{90A0763C-B625-4AC0-8D89-D60FFE429F78}"/>
+    <dgm:cxn modelId="{FBA8ADAB-E03D-42E6-95D7-D31041F5C9A0}" srcId="{8F467E0F-078A-46B0-9FD4-76CAFB19F654}" destId="{60CB3E7F-2AF6-4028-87D8-EEBE72F769C9}" srcOrd="1" destOrd="0" parTransId="{F1E6DF51-0BB0-429C-A67C-C4204F714B01}" sibTransId="{9F504EF2-7C3C-408B-9D56-C4F5C399ABBF}"/>
+    <dgm:cxn modelId="{E436A9B3-3B20-48A9-97EC-118D0D600BA8}" type="presOf" srcId="{AD7B22C3-62FF-4240-9A8E-B681D9CA4CBD}" destId="{C49C736A-68C2-4078-87A3-ED8E15579E00}" srcOrd="0" destOrd="0" presId="urn:microsoft.com/office/officeart/2016/7/layout/VerticalDownArrowProcess"/>
+    <dgm:cxn modelId="{B48147B7-2802-4E03-914E-48C1D1DA7EBF}" srcId="{8F467E0F-078A-46B0-9FD4-76CAFB19F654}" destId="{DC7B61BD-E2D8-42E1-B5B3-F02A96679C39}" srcOrd="2" destOrd="0" parTransId="{479C90CE-5E82-4A52-9AB8-F828457EFFEF}" sibTransId="{CA31602C-704F-4C7D-9008-8FF2D04EB8C7}"/>
+    <dgm:cxn modelId="{6AF535C3-B5B7-4F53-881C-6732CD02926C}" srcId="{193D77D5-5B09-44BB-878B-DA7EA745E30A}" destId="{8A3E40B4-9A61-4006-94C8-A6BFC59DEAAE}" srcOrd="1" destOrd="0" parTransId="{98022190-66E5-4E68-A5E7-1C379D3B42AC}" sibTransId="{A2248C73-DDF9-48CA-B8F2-BE7153E7FB25}"/>
+    <dgm:cxn modelId="{719783DA-0956-4E88-AF73-711BA359450F}" type="presOf" srcId="{DC7B61BD-E2D8-42E1-B5B3-F02A96679C39}" destId="{DD0547F1-4605-4048-8593-8CCCAD929466}" srcOrd="1" destOrd="0" presId="urn:microsoft.com/office/officeart/2016/7/layout/VerticalDownArrowProcess"/>
     <dgm:cxn modelId="{FFCD2DE0-9C9F-4962-8A58-4A4B5B60D8FD}" srcId="{AD7B22C3-62FF-4240-9A8E-B681D9CA4CBD}" destId="{F6C9F479-6194-4A55-ACE3-C7477D97A534}" srcOrd="2" destOrd="0" parTransId="{1A0E1F56-09BA-46B2-8644-69CC475965A4}" sibTransId="{753D321F-CFBC-47AE-A8C6-8B76E98D85CC}"/>
-    <dgm:cxn modelId="{5A5019EB-1B4F-4DC1-B848-85D66EE20122}" type="presOf" srcId="{8F467E0F-078A-46B0-9FD4-76CAFB19F654}" destId="{FAB61EDF-5DF9-4AE9-AFD9-9D075034EE5F}" srcOrd="0" destOrd="0" presId="urn:microsoft.com/office/officeart/2016/7/layout/VerticalDownArrowProcess"/>
-    <dgm:cxn modelId="{7AE041F7-4647-4AC0-9121-E94BE125C1B4}" type="presOf" srcId="{AD7B22C3-62FF-4240-9A8E-B681D9CA4CBD}" destId="{C49C736A-68C2-4078-87A3-ED8E15579E00}" srcOrd="0" destOrd="0" presId="urn:microsoft.com/office/officeart/2016/7/layout/VerticalDownArrowProcess"/>
-    <dgm:cxn modelId="{08E8FB02-94E5-45E1-8E76-1A847C5EFF66}" type="presParOf" srcId="{FAB61EDF-5DF9-4AE9-AFD9-9D075034EE5F}" destId="{5138CC13-B927-439B-9BB2-3608A259DE5F}" srcOrd="0" destOrd="0" presId="urn:microsoft.com/office/officeart/2016/7/layout/VerticalDownArrowProcess"/>
-    <dgm:cxn modelId="{CD541BB8-C1D1-4D05-B056-72889FE16BF8}" type="presParOf" srcId="{5138CC13-B927-439B-9BB2-3608A259DE5F}" destId="{C49C736A-68C2-4078-87A3-ED8E15579E00}" srcOrd="0" destOrd="0" presId="urn:microsoft.com/office/officeart/2016/7/layout/VerticalDownArrowProcess"/>
-    <dgm:cxn modelId="{321CA564-30E2-4FA3-8E11-A6AE697959F3}" type="presParOf" srcId="{5138CC13-B927-439B-9BB2-3608A259DE5F}" destId="{8EB0E6A6-0E4F-4102-88DB-E53700B3B072}" srcOrd="1" destOrd="0" presId="urn:microsoft.com/office/officeart/2016/7/layout/VerticalDownArrowProcess"/>
-    <dgm:cxn modelId="{A8A21CBE-0D91-4489-8E66-6737A5BACD3C}" type="presParOf" srcId="{FAB61EDF-5DF9-4AE9-AFD9-9D075034EE5F}" destId="{974E88C6-74ED-4075-9F0F-9A01D950F9B9}" srcOrd="1" destOrd="0" presId="urn:microsoft.com/office/officeart/2016/7/layout/VerticalDownArrowProcess"/>
-    <dgm:cxn modelId="{F68DB664-BDC7-4A54-80F8-66E0A9CDBDD7}" type="presParOf" srcId="{FAB61EDF-5DF9-4AE9-AFD9-9D075034EE5F}" destId="{2F72255D-B073-409D-886F-5104420CFC9E}" srcOrd="2" destOrd="0" presId="urn:microsoft.com/office/officeart/2016/7/layout/VerticalDownArrowProcess"/>
-    <dgm:cxn modelId="{6F680DB7-416D-43B6-AD73-6F0A1B9F9392}" type="presParOf" srcId="{2F72255D-B073-409D-886F-5104420CFC9E}" destId="{5E9DDA84-B39D-4C25-B385-3CE83FC7E309}" srcOrd="0" destOrd="0" presId="urn:microsoft.com/office/officeart/2016/7/layout/VerticalDownArrowProcess"/>
-    <dgm:cxn modelId="{CF55A0D1-4DFB-4FBD-8327-5649DECBD67D}" type="presParOf" srcId="{2F72255D-B073-409D-886F-5104420CFC9E}" destId="{DD0547F1-4605-4048-8593-8CCCAD929466}" srcOrd="1" destOrd="0" presId="urn:microsoft.com/office/officeart/2016/7/layout/VerticalDownArrowProcess"/>
-    <dgm:cxn modelId="{2ACFCCD7-3C29-4629-AB37-3D3F9274E619}" type="presParOf" srcId="{2F72255D-B073-409D-886F-5104420CFC9E}" destId="{1994D7F9-37D2-4C2C-9D37-D93B04D95140}" srcOrd="2" destOrd="0" presId="urn:microsoft.com/office/officeart/2016/7/layout/VerticalDownArrowProcess"/>
-    <dgm:cxn modelId="{C4E31714-9194-4332-9A21-A7E0BE2C96DD}" type="presParOf" srcId="{FAB61EDF-5DF9-4AE9-AFD9-9D075034EE5F}" destId="{A08E90FF-A50E-4D1F-93FD-7E2EC635CCDD}" srcOrd="3" destOrd="0" presId="urn:microsoft.com/office/officeart/2016/7/layout/VerticalDownArrowProcess"/>
-    <dgm:cxn modelId="{8750560D-742D-46F6-9368-402855F80288}" type="presParOf" srcId="{FAB61EDF-5DF9-4AE9-AFD9-9D075034EE5F}" destId="{BDA0B9E5-E136-4D6B-9EE7-989841C1F919}" srcOrd="4" destOrd="0" presId="urn:microsoft.com/office/officeart/2016/7/layout/VerticalDownArrowProcess"/>
-    <dgm:cxn modelId="{BF0EB6CD-D76D-4BD3-B2FA-4C41FFE0E52A}" type="presParOf" srcId="{BDA0B9E5-E136-4D6B-9EE7-989841C1F919}" destId="{E1BD8028-D4B4-4808-A028-B3660301D5B8}" srcOrd="0" destOrd="0" presId="urn:microsoft.com/office/officeart/2016/7/layout/VerticalDownArrowProcess"/>
-    <dgm:cxn modelId="{3D228C9E-48C9-4601-AD49-AAD9B3D1F9D4}" type="presParOf" srcId="{BDA0B9E5-E136-4D6B-9EE7-989841C1F919}" destId="{0B8C9B41-B938-4F62-94A6-CBEE448CD564}" srcOrd="1" destOrd="0" presId="urn:microsoft.com/office/officeart/2016/7/layout/VerticalDownArrowProcess"/>
-    <dgm:cxn modelId="{981ADE22-7D19-45FA-A95C-30F055E4C6A9}" type="presParOf" srcId="{BDA0B9E5-E136-4D6B-9EE7-989841C1F919}" destId="{56DDED8B-1034-442C-BFDD-FC4A509E662F}" srcOrd="2" destOrd="0" presId="urn:microsoft.com/office/officeart/2016/7/layout/VerticalDownArrowProcess"/>
+    <dgm:cxn modelId="{C04FB4F4-B970-42A5-B25A-D001433A94AA}" type="presOf" srcId="{A6648A01-26F3-43D6-A489-561F367BD4BD}" destId="{56DDED8B-1034-442C-BFDD-FC4A509E662F}" srcOrd="0" destOrd="0" presId="urn:microsoft.com/office/officeart/2016/7/layout/VerticalDownArrowProcess"/>
+    <dgm:cxn modelId="{BFF94FFD-2F5B-4214-9C20-50F695BD93E8}" type="presOf" srcId="{A3DD9B0E-F5F7-4DAB-98BE-CDD5B93C3600}" destId="{56DDED8B-1034-442C-BFDD-FC4A509E662F}" srcOrd="0" destOrd="1" presId="urn:microsoft.com/office/officeart/2016/7/layout/VerticalDownArrowProcess"/>
+    <dgm:cxn modelId="{E5B1A6FD-EC69-4EE4-ABC2-3838BC6E7628}" type="presOf" srcId="{193D77D5-5B09-44BB-878B-DA7EA745E30A}" destId="{0D0AF31C-F2AA-4CC4-A2D1-12D05E60B6F4}" srcOrd="0" destOrd="0" presId="urn:microsoft.com/office/officeart/2016/7/layout/VerticalDownArrowProcess"/>
+    <dgm:cxn modelId="{81F0B0FF-FB94-4928-A0AF-ECA724C97623}" type="presOf" srcId="{8F467E0F-078A-46B0-9FD4-76CAFB19F654}" destId="{FAB61EDF-5DF9-4AE9-AFD9-9D075034EE5F}" srcOrd="0" destOrd="0" presId="urn:microsoft.com/office/officeart/2016/7/layout/VerticalDownArrowProcess"/>
+    <dgm:cxn modelId="{9154A4C7-179A-4C7C-8C99-5B7AE218F5FF}" type="presParOf" srcId="{FAB61EDF-5DF9-4AE9-AFD9-9D075034EE5F}" destId="{5138CC13-B927-439B-9BB2-3608A259DE5F}" srcOrd="0" destOrd="0" presId="urn:microsoft.com/office/officeart/2016/7/layout/VerticalDownArrowProcess"/>
+    <dgm:cxn modelId="{F5BD12A5-3425-49FC-82B3-620D0BBDDEF7}" type="presParOf" srcId="{5138CC13-B927-439B-9BB2-3608A259DE5F}" destId="{C49C736A-68C2-4078-87A3-ED8E15579E00}" srcOrd="0" destOrd="0" presId="urn:microsoft.com/office/officeart/2016/7/layout/VerticalDownArrowProcess"/>
+    <dgm:cxn modelId="{F71DF0E5-6D83-425F-AB93-A9A6BFBD2470}" type="presParOf" srcId="{5138CC13-B927-439B-9BB2-3608A259DE5F}" destId="{8EB0E6A6-0E4F-4102-88DB-E53700B3B072}" srcOrd="1" destOrd="0" presId="urn:microsoft.com/office/officeart/2016/7/layout/VerticalDownArrowProcess"/>
+    <dgm:cxn modelId="{18A191B0-14BF-4C80-A1F1-06D16FAD6C45}" type="presParOf" srcId="{FAB61EDF-5DF9-4AE9-AFD9-9D075034EE5F}" destId="{974E88C6-74ED-4075-9F0F-9A01D950F9B9}" srcOrd="1" destOrd="0" presId="urn:microsoft.com/office/officeart/2016/7/layout/VerticalDownArrowProcess"/>
+    <dgm:cxn modelId="{C22E3735-7930-420A-AB80-C16D2CEA4289}" type="presParOf" srcId="{FAB61EDF-5DF9-4AE9-AFD9-9D075034EE5F}" destId="{2F72255D-B073-409D-886F-5104420CFC9E}" srcOrd="2" destOrd="0" presId="urn:microsoft.com/office/officeart/2016/7/layout/VerticalDownArrowProcess"/>
+    <dgm:cxn modelId="{9A5A159E-D78D-4557-939B-57B2A26EDF21}" type="presParOf" srcId="{2F72255D-B073-409D-886F-5104420CFC9E}" destId="{5E9DDA84-B39D-4C25-B385-3CE83FC7E309}" srcOrd="0" destOrd="0" presId="urn:microsoft.com/office/officeart/2016/7/layout/VerticalDownArrowProcess"/>
+    <dgm:cxn modelId="{3A829193-BF77-42D4-A2F3-FE53B7D2C18C}" type="presParOf" srcId="{2F72255D-B073-409D-886F-5104420CFC9E}" destId="{DD0547F1-4605-4048-8593-8CCCAD929466}" srcOrd="1" destOrd="0" presId="urn:microsoft.com/office/officeart/2016/7/layout/VerticalDownArrowProcess"/>
+    <dgm:cxn modelId="{119BD45A-EB58-400A-9125-9AC3ED2C52D8}" type="presParOf" srcId="{2F72255D-B073-409D-886F-5104420CFC9E}" destId="{1994D7F9-37D2-4C2C-9D37-D93B04D95140}" srcOrd="2" destOrd="0" presId="urn:microsoft.com/office/officeart/2016/7/layout/VerticalDownArrowProcess"/>
+    <dgm:cxn modelId="{EBAA204D-E48B-4692-AAA7-49F0253925A8}" type="presParOf" srcId="{FAB61EDF-5DF9-4AE9-AFD9-9D075034EE5F}" destId="{A08E90FF-A50E-4D1F-93FD-7E2EC635CCDD}" srcOrd="3" destOrd="0" presId="urn:microsoft.com/office/officeart/2016/7/layout/VerticalDownArrowProcess"/>
+    <dgm:cxn modelId="{A213C9FD-4DC4-4E49-83D1-D5B3EBB25C49}" type="presParOf" srcId="{FAB61EDF-5DF9-4AE9-AFD9-9D075034EE5F}" destId="{BDA0B9E5-E136-4D6B-9EE7-989841C1F919}" srcOrd="4" destOrd="0" presId="urn:microsoft.com/office/officeart/2016/7/layout/VerticalDownArrowProcess"/>
+    <dgm:cxn modelId="{0162F46F-7371-4707-AE2D-BFAECB86FE3D}" type="presParOf" srcId="{BDA0B9E5-E136-4D6B-9EE7-989841C1F919}" destId="{E1BD8028-D4B4-4808-A028-B3660301D5B8}" srcOrd="0" destOrd="0" presId="urn:microsoft.com/office/officeart/2016/7/layout/VerticalDownArrowProcess"/>
+    <dgm:cxn modelId="{16DCF9FB-1373-4BB4-8AD5-BBE210DE5D19}" type="presParOf" srcId="{BDA0B9E5-E136-4D6B-9EE7-989841C1F919}" destId="{0B8C9B41-B938-4F62-94A6-CBEE448CD564}" srcOrd="1" destOrd="0" presId="urn:microsoft.com/office/officeart/2016/7/layout/VerticalDownArrowProcess"/>
+    <dgm:cxn modelId="{E806983A-AFC0-4E85-A1F0-39091AC856D5}" type="presParOf" srcId="{BDA0B9E5-E136-4D6B-9EE7-989841C1F919}" destId="{56DDED8B-1034-442C-BFDD-FC4A509E662F}" srcOrd="2" destOrd="0" presId="urn:microsoft.com/office/officeart/2016/7/layout/VerticalDownArrowProcess"/>
+    <dgm:cxn modelId="{1BF9FC79-304D-4BCB-BE35-E7773742EB83}" type="presParOf" srcId="{FAB61EDF-5DF9-4AE9-AFD9-9D075034EE5F}" destId="{7F4E247E-6808-4D3C-9E7A-8FB49E0B58F3}" srcOrd="5" destOrd="0" presId="urn:microsoft.com/office/officeart/2016/7/layout/VerticalDownArrowProcess"/>
+    <dgm:cxn modelId="{590CFA7E-E426-4675-953E-9A427D78477C}" type="presParOf" srcId="{FAB61EDF-5DF9-4AE9-AFD9-9D075034EE5F}" destId="{B2A3017F-FFDF-460E-BADD-532975D1282A}" srcOrd="6" destOrd="0" presId="urn:microsoft.com/office/officeart/2016/7/layout/VerticalDownArrowProcess"/>
+    <dgm:cxn modelId="{D3B495FB-3291-427E-B442-0B7A6F6F737D}" type="presParOf" srcId="{B2A3017F-FFDF-460E-BADD-532975D1282A}" destId="{0D0AF31C-F2AA-4CC4-A2D1-12D05E60B6F4}" srcOrd="0" destOrd="0" presId="urn:microsoft.com/office/officeart/2016/7/layout/VerticalDownArrowProcess"/>
+    <dgm:cxn modelId="{DABAC5A6-8DA7-43EA-8A8C-C7033F0475D5}" type="presParOf" srcId="{B2A3017F-FFDF-460E-BADD-532975D1282A}" destId="{275DC252-2F96-45CD-9560-E2C478E03B35}" srcOrd="1" destOrd="0" presId="urn:microsoft.com/office/officeart/2016/7/layout/VerticalDownArrowProcess"/>
+    <dgm:cxn modelId="{8C4FD74F-02E6-4C42-BF2B-13F0A682ED49}" type="presParOf" srcId="{B2A3017F-FFDF-460E-BADD-532975D1282A}" destId="{6093AF76-5407-4005-8E22-4F7152F53309}" srcOrd="2" destOrd="0" presId="urn:microsoft.com/office/officeart/2016/7/layout/VerticalDownArrowProcess"/>
   </dgm:cxnLst>
   <dgm:bg/>
   <dgm:whole/>
@@ -4526,10 +4685,9 @@
             <a:buNone/>
           </a:pPr>
           <a:r>
-            <a:rPr lang="en-US" sz="3600" kern="1200"/>
+            <a:rPr lang="en-US" sz="3600" kern="1200" dirty="0"/>
             <a:t>Frameworks and Tooling</a:t>
           </a:r>
-          <a:endParaRPr lang="en-US" sz="3600" kern="1200" dirty="0"/>
         </a:p>
       </dsp:txBody>
       <dsp:txXfrm>
@@ -4649,8 +4807,8 @@
       </dsp:nvSpPr>
       <dsp:spPr>
         <a:xfrm>
-          <a:off x="0" y="3963077"/>
-          <a:ext cx="1708053" cy="1300770"/>
+          <a:off x="0" y="4318259"/>
+          <a:ext cx="1708053" cy="944729"/>
         </a:xfrm>
         <a:prstGeom prst="rect">
           <a:avLst/>
@@ -4691,12 +4849,12 @@
         </a:fontRef>
       </dsp:style>
       <dsp:txBody>
-        <a:bodyPr spcFirstLastPara="0" vert="horz" wrap="square" lIns="121477" tIns="113792" rIns="121477" bIns="113792" numCol="1" spcCol="1270" anchor="ctr" anchorCtr="0">
+        <a:bodyPr spcFirstLastPara="0" vert="horz" wrap="square" lIns="121477" tIns="92456" rIns="121477" bIns="92456" numCol="1" spcCol="1270" anchor="ctr" anchorCtr="0">
           <a:noAutofit/>
         </a:bodyPr>
         <a:lstStyle/>
         <a:p>
-          <a:pPr marL="0" lvl="0" indent="0" algn="ctr" defTabSz="711200">
+          <a:pPr marL="0" lvl="0" indent="0" algn="ctr" defTabSz="577850">
             <a:lnSpc>
               <a:spcPct val="100000"/>
             </a:lnSpc>
@@ -4709,14 +4867,14 @@
             <a:buNone/>
           </a:pPr>
           <a:r>
-            <a:rPr lang="en-US" sz="1600" kern="1200"/>
+            <a:rPr lang="en-US" sz="1300" kern="1200"/>
             <a:t>Modern environments include BYOD</a:t>
           </a:r>
         </a:p>
       </dsp:txBody>
       <dsp:txXfrm>
-        <a:off x="0" y="3963077"/>
-        <a:ext cx="1708053" cy="1300770"/>
+        <a:off x="0" y="4318259"/>
+        <a:ext cx="1708053" cy="944729"/>
       </dsp:txXfrm>
     </dsp:sp>
     <dsp:sp modelId="{8EB0E6A6-0E4F-4102-88DB-E53700B3B072}">
@@ -4726,8 +4884,8 @@
       </dsp:nvSpPr>
       <dsp:spPr>
         <a:xfrm>
-          <a:off x="1708052" y="3963077"/>
-          <a:ext cx="5124159" cy="1300770"/>
+          <a:off x="1708052" y="4318259"/>
+          <a:ext cx="5124159" cy="944729"/>
         </a:xfrm>
         <a:prstGeom prst="rect">
           <a:avLst/>
@@ -4770,12 +4928,12 @@
         <a:fontRef idx="minor"/>
       </dsp:style>
       <dsp:txBody>
-        <a:bodyPr spcFirstLastPara="0" vert="horz" wrap="square" lIns="103942" tIns="190500" rIns="103942" bIns="190500" numCol="1" spcCol="1270" anchor="ctr" anchorCtr="0">
+        <a:bodyPr spcFirstLastPara="0" vert="horz" wrap="square" lIns="103942" tIns="139700" rIns="103942" bIns="139700" numCol="1" spcCol="1270" anchor="ctr" anchorCtr="0">
           <a:noAutofit/>
         </a:bodyPr>
         <a:lstStyle/>
         <a:p>
-          <a:pPr marL="0" lvl="0" indent="0" algn="l" defTabSz="666750">
+          <a:pPr marL="0" lvl="0" indent="0" algn="l" defTabSz="488950">
             <a:lnSpc>
               <a:spcPct val="100000"/>
             </a:lnSpc>
@@ -4788,12 +4946,12 @@
             <a:buNone/>
           </a:pPr>
           <a:r>
-            <a:rPr lang="en-US" sz="1500" kern="1200"/>
+            <a:rPr lang="en-US" sz="1100" kern="1200"/>
             <a:t>System and Data owner are different people</a:t>
           </a:r>
         </a:p>
         <a:p>
-          <a:pPr marL="0" lvl="0" indent="0" algn="l" defTabSz="666750">
+          <a:pPr marL="0" lvl="0" indent="0" algn="l" defTabSz="488950">
             <a:lnSpc>
               <a:spcPct val="100000"/>
             </a:lnSpc>
@@ -4806,12 +4964,12 @@
             <a:buNone/>
           </a:pPr>
           <a:r>
-            <a:rPr lang="en-US" sz="1500" kern="1200"/>
+            <a:rPr lang="en-US" sz="1100" kern="1200"/>
             <a:t>Ecosystem becomes highly diverse</a:t>
           </a:r>
         </a:p>
         <a:p>
-          <a:pPr marL="0" lvl="0" indent="0" algn="l" defTabSz="666750">
+          <a:pPr marL="0" lvl="0" indent="0" algn="l" defTabSz="488950">
             <a:lnSpc>
               <a:spcPct val="100000"/>
             </a:lnSpc>
@@ -4824,14 +4982,15 @@
             <a:buNone/>
           </a:pPr>
           <a:r>
-            <a:rPr lang="en-US" sz="1500" kern="1200" dirty="0"/>
+            <a:rPr lang="en-US" sz="1100" kern="1200"/>
             <a:t>Partially trusted clients becomes the norm</a:t>
           </a:r>
+          <a:endParaRPr lang="en-US" sz="1100" kern="1200" dirty="0"/>
         </a:p>
       </dsp:txBody>
       <dsp:txXfrm>
-        <a:off x="1708052" y="3963077"/>
-        <a:ext cx="5124159" cy="1300770"/>
+        <a:off x="1708052" y="4318259"/>
+        <a:ext cx="5124159" cy="944729"/>
       </dsp:txXfrm>
     </dsp:sp>
     <dsp:sp modelId="{DD0547F1-4605-4048-8593-8CCCAD929466}">
@@ -4841,8 +5000,8 @@
       </dsp:nvSpPr>
       <dsp:spPr>
         <a:xfrm rot="10800000">
-          <a:off x="0" y="1982004"/>
-          <a:ext cx="1708053" cy="2000585"/>
+          <a:off x="0" y="2879436"/>
+          <a:ext cx="1708053" cy="1452994"/>
         </a:xfrm>
         <a:prstGeom prst="upArrowCallout">
           <a:avLst>
@@ -4888,12 +5047,12 @@
         </a:fontRef>
       </dsp:style>
       <dsp:txBody>
-        <a:bodyPr spcFirstLastPara="0" vert="horz" wrap="square" lIns="121477" tIns="113792" rIns="121477" bIns="113792" numCol="1" spcCol="1270" anchor="ctr" anchorCtr="0">
+        <a:bodyPr spcFirstLastPara="0" vert="horz" wrap="square" lIns="121477" tIns="92456" rIns="121477" bIns="92456" numCol="1" spcCol="1270" anchor="ctr" anchorCtr="0">
           <a:noAutofit/>
         </a:bodyPr>
         <a:lstStyle/>
         <a:p>
-          <a:pPr marL="0" lvl="0" indent="0" algn="ctr" defTabSz="711200">
+          <a:pPr marL="0" lvl="0" indent="0" algn="ctr" defTabSz="577850">
             <a:lnSpc>
               <a:spcPct val="100000"/>
             </a:lnSpc>
@@ -4906,14 +5065,14 @@
             <a:buNone/>
           </a:pPr>
           <a:r>
-            <a:rPr lang="en-US" sz="1600" kern="1200"/>
+            <a:rPr lang="en-US" sz="1300" kern="1200"/>
             <a:t>Traditional environments are highly controlled</a:t>
           </a:r>
         </a:p>
       </dsp:txBody>
       <dsp:txXfrm rot="-10800000">
-        <a:off x="0" y="1982004"/>
-        <a:ext cx="1708053" cy="1300380"/>
+        <a:off x="0" y="2879436"/>
+        <a:ext cx="1708053" cy="944446"/>
       </dsp:txXfrm>
     </dsp:sp>
     <dsp:sp modelId="{1994D7F9-37D2-4C2C-9D37-D93B04D95140}">
@@ -4923,8 +5082,8 @@
       </dsp:nvSpPr>
       <dsp:spPr>
         <a:xfrm>
-          <a:off x="1708052" y="1982004"/>
-          <a:ext cx="5124159" cy="1300380"/>
+          <a:off x="1708052" y="2879436"/>
+          <a:ext cx="5124159" cy="944446"/>
         </a:xfrm>
         <a:prstGeom prst="rect">
           <a:avLst/>
@@ -4967,12 +5126,12 @@
         <a:fontRef idx="minor"/>
       </dsp:style>
       <dsp:txBody>
-        <a:bodyPr spcFirstLastPara="0" vert="horz" wrap="square" lIns="103942" tIns="190500" rIns="103942" bIns="190500" numCol="1" spcCol="1270" anchor="ctr" anchorCtr="0">
+        <a:bodyPr spcFirstLastPara="0" vert="horz" wrap="square" lIns="103942" tIns="139700" rIns="103942" bIns="139700" numCol="1" spcCol="1270" anchor="ctr" anchorCtr="0">
           <a:noAutofit/>
         </a:bodyPr>
         <a:lstStyle/>
         <a:p>
-          <a:pPr marL="0" lvl="0" indent="0" algn="l" defTabSz="666750">
+          <a:pPr marL="0" lvl="0" indent="0" algn="l" defTabSz="488950">
             <a:lnSpc>
               <a:spcPct val="100000"/>
             </a:lnSpc>
@@ -4985,12 +5144,12 @@
             <a:buNone/>
           </a:pPr>
           <a:r>
-            <a:rPr lang="en-US" sz="1500" kern="1200"/>
+            <a:rPr lang="en-US" sz="1100" kern="1200"/>
             <a:t>Client Management Tooling (CMT)</a:t>
           </a:r>
         </a:p>
         <a:p>
-          <a:pPr marL="0" lvl="0" indent="0" algn="l" defTabSz="666750">
+          <a:pPr marL="0" lvl="0" indent="0" algn="l" defTabSz="488950">
             <a:lnSpc>
               <a:spcPct val="100000"/>
             </a:lnSpc>
@@ -5003,18 +5162,18 @@
             <a:buNone/>
           </a:pPr>
           <a:r>
-            <a:rPr lang="en-US" sz="1500" kern="1200"/>
+            <a:rPr lang="en-US" sz="1100" kern="1200"/>
             <a:t>Administrators have full control</a:t>
           </a:r>
           <a:br>
-            <a:rPr lang="en-US" sz="1500" kern="1200"/>
+            <a:rPr lang="en-US" sz="1100" kern="1200"/>
           </a:br>
-          <a:endParaRPr lang="en-US" sz="1500" kern="1200"/>
+          <a:endParaRPr lang="en-US" sz="1100" kern="1200"/>
         </a:p>
       </dsp:txBody>
       <dsp:txXfrm>
-        <a:off x="1708052" y="1982004"/>
-        <a:ext cx="5124159" cy="1300380"/>
+        <a:off x="1708052" y="2879436"/>
+        <a:ext cx="5124159" cy="944446"/>
       </dsp:txXfrm>
     </dsp:sp>
     <dsp:sp modelId="{0B8C9B41-B938-4F62-94A6-CBEE448CD564}">
@@ -5024,8 +5183,8 @@
       </dsp:nvSpPr>
       <dsp:spPr>
         <a:xfrm rot="10800000">
-          <a:off x="0" y="930"/>
-          <a:ext cx="1708053" cy="2000585"/>
+          <a:off x="0" y="1440613"/>
+          <a:ext cx="1708053" cy="1452994"/>
         </a:xfrm>
         <a:prstGeom prst="upArrowCallout">
           <a:avLst>
@@ -5071,12 +5230,12 @@
         </a:fontRef>
       </dsp:style>
       <dsp:txBody>
-        <a:bodyPr spcFirstLastPara="0" vert="horz" wrap="square" lIns="121477" tIns="113792" rIns="121477" bIns="113792" numCol="1" spcCol="1270" anchor="ctr" anchorCtr="0">
+        <a:bodyPr spcFirstLastPara="0" vert="horz" wrap="square" lIns="121477" tIns="92456" rIns="121477" bIns="92456" numCol="1" spcCol="1270" anchor="ctr" anchorCtr="0">
           <a:noAutofit/>
         </a:bodyPr>
         <a:lstStyle/>
         <a:p>
-          <a:pPr marL="0" lvl="0" indent="0" algn="ctr" defTabSz="711200">
+          <a:pPr marL="0" lvl="0" indent="0" algn="ctr" defTabSz="577850">
             <a:lnSpc>
               <a:spcPct val="100000"/>
             </a:lnSpc>
@@ -5089,14 +5248,15 @@
             <a:buNone/>
           </a:pPr>
           <a:r>
-            <a:rPr lang="en-US" sz="1600" kern="1200"/>
+            <a:rPr lang="en-US" sz="1300" kern="1200"/>
             <a:t>Master Data Management</a:t>
           </a:r>
+          <a:endParaRPr lang="en-US" sz="1300" kern="1200" dirty="0"/>
         </a:p>
       </dsp:txBody>
       <dsp:txXfrm rot="-10800000">
-        <a:off x="0" y="930"/>
-        <a:ext cx="1708053" cy="1300380"/>
+        <a:off x="0" y="1440613"/>
+        <a:ext cx="1708053" cy="944446"/>
       </dsp:txXfrm>
     </dsp:sp>
     <dsp:sp modelId="{56DDED8B-1034-442C-BFDD-FC4A509E662F}">
@@ -5106,8 +5266,8 @@
       </dsp:nvSpPr>
       <dsp:spPr>
         <a:xfrm>
-          <a:off x="1708052" y="930"/>
-          <a:ext cx="5124159" cy="1300380"/>
+          <a:off x="1708052" y="1440613"/>
+          <a:ext cx="5124159" cy="944446"/>
         </a:xfrm>
         <a:prstGeom prst="rect">
           <a:avLst/>
@@ -5150,12 +5310,12 @@
         <a:fontRef idx="minor"/>
       </dsp:style>
       <dsp:txBody>
-        <a:bodyPr spcFirstLastPara="0" vert="horz" wrap="square" lIns="103942" tIns="190500" rIns="103942" bIns="190500" numCol="1" spcCol="1270" anchor="ctr" anchorCtr="0">
+        <a:bodyPr spcFirstLastPara="0" vert="horz" wrap="square" lIns="103942" tIns="139700" rIns="103942" bIns="139700" numCol="1" spcCol="1270" anchor="ctr" anchorCtr="0">
           <a:noAutofit/>
         </a:bodyPr>
         <a:lstStyle/>
         <a:p>
-          <a:pPr marL="0" lvl="0" indent="0" algn="l" defTabSz="666750">
+          <a:pPr marL="0" lvl="0" indent="0" algn="l" defTabSz="488950">
             <a:lnSpc>
               <a:spcPct val="100000"/>
             </a:lnSpc>
@@ -5168,12 +5328,13 @@
             <a:buNone/>
           </a:pPr>
           <a:r>
-            <a:rPr lang="en-US" sz="1500" kern="1200" dirty="0"/>
+            <a:rPr lang="en-US" sz="1100" kern="1200"/>
             <a:t>Sharing business entities to enable business workflows</a:t>
           </a:r>
+          <a:endParaRPr lang="en-US" sz="1100" kern="1200" dirty="0"/>
         </a:p>
         <a:p>
-          <a:pPr marL="0" lvl="0" indent="0" algn="l" defTabSz="666750">
+          <a:pPr marL="0" lvl="0" indent="0" algn="l" defTabSz="488950">
             <a:lnSpc>
               <a:spcPct val="100000"/>
             </a:lnSpc>
@@ -5186,18 +5347,199 @@
             <a:buNone/>
           </a:pPr>
           <a:r>
-            <a:rPr lang="en-US" sz="1500" kern="1200" dirty="0"/>
+            <a:rPr lang="en-US" sz="1100" kern="1200"/>
             <a:t>Information becomes portable and decentralized</a:t>
           </a:r>
           <a:br>
-            <a:rPr lang="en-US" sz="1500" kern="1200" dirty="0"/>
+            <a:rPr lang="en-US" sz="1100" kern="1200"/>
           </a:br>
-          <a:endParaRPr lang="en-US" sz="1500" kern="1200" dirty="0"/>
+          <a:endParaRPr lang="en-US" sz="1100" kern="1200" dirty="0"/>
         </a:p>
       </dsp:txBody>
       <dsp:txXfrm>
-        <a:off x="1708052" y="930"/>
-        <a:ext cx="5124159" cy="1300380"/>
+        <a:off x="1708052" y="1440613"/>
+        <a:ext cx="5124159" cy="944446"/>
+      </dsp:txXfrm>
+    </dsp:sp>
+    <dsp:sp modelId="{275DC252-2F96-45CD-9560-E2C478E03B35}">
+      <dsp:nvSpPr>
+        <dsp:cNvPr id="0" name=""/>
+        <dsp:cNvSpPr/>
+      </dsp:nvSpPr>
+      <dsp:spPr>
+        <a:xfrm rot="10800000">
+          <a:off x="0" y="1789"/>
+          <a:ext cx="1708053" cy="1452994"/>
+        </a:xfrm>
+        <a:prstGeom prst="upArrowCallout">
+          <a:avLst>
+            <a:gd name="adj1" fmla="val 5000"/>
+            <a:gd name="adj2" fmla="val 10000"/>
+            <a:gd name="adj3" fmla="val 15000"/>
+            <a:gd name="adj4" fmla="val 64977"/>
+          </a:avLst>
+        </a:prstGeom>
+        <a:solidFill>
+          <a:schemeClr val="accent1">
+            <a:hueOff val="0"/>
+            <a:satOff val="0"/>
+            <a:lumOff val="0"/>
+            <a:alphaOff val="0"/>
+          </a:schemeClr>
+        </a:solidFill>
+        <a:ln w="15875" cap="rnd" cmpd="sng" algn="ctr">
+          <a:solidFill>
+            <a:schemeClr val="accent1">
+              <a:hueOff val="0"/>
+              <a:satOff val="0"/>
+              <a:lumOff val="0"/>
+              <a:alphaOff val="0"/>
+            </a:schemeClr>
+          </a:solidFill>
+          <a:prstDash val="solid"/>
+        </a:ln>
+        <a:effectLst/>
+      </dsp:spPr>
+      <dsp:style>
+        <a:lnRef idx="2">
+          <a:scrgbClr r="0" g="0" b="0"/>
+        </a:lnRef>
+        <a:fillRef idx="1">
+          <a:scrgbClr r="0" g="0" b="0"/>
+        </a:fillRef>
+        <a:effectRef idx="0">
+          <a:scrgbClr r="0" g="0" b="0"/>
+        </a:effectRef>
+        <a:fontRef idx="minor">
+          <a:schemeClr val="lt1"/>
+        </a:fontRef>
+      </dsp:style>
+      <dsp:txBody>
+        <a:bodyPr spcFirstLastPara="0" vert="horz" wrap="square" lIns="121477" tIns="92456" rIns="121477" bIns="92456" numCol="1" spcCol="1270" anchor="ctr" anchorCtr="0">
+          <a:noAutofit/>
+        </a:bodyPr>
+        <a:lstStyle/>
+        <a:p>
+          <a:pPr marL="0" lvl="0" indent="0" algn="ctr" defTabSz="577850">
+            <a:lnSpc>
+              <a:spcPct val="100000"/>
+            </a:lnSpc>
+            <a:spcBef>
+              <a:spcPct val="0"/>
+            </a:spcBef>
+            <a:spcAft>
+              <a:spcPct val="35000"/>
+            </a:spcAft>
+            <a:buNone/>
+          </a:pPr>
+          <a:r>
+            <a:rPr lang="en-US" sz="1300" kern="1200"/>
+            <a:t>Mainframes and Data warehouses</a:t>
+          </a:r>
+          <a:endParaRPr lang="en-US" sz="1300" kern="1200" dirty="0"/>
+        </a:p>
+      </dsp:txBody>
+      <dsp:txXfrm rot="-10800000">
+        <a:off x="0" y="1789"/>
+        <a:ext cx="1708053" cy="944446"/>
+      </dsp:txXfrm>
+    </dsp:sp>
+    <dsp:sp modelId="{6093AF76-5407-4005-8E22-4F7152F53309}">
+      <dsp:nvSpPr>
+        <dsp:cNvPr id="0" name=""/>
+        <dsp:cNvSpPr/>
+      </dsp:nvSpPr>
+      <dsp:spPr>
+        <a:xfrm>
+          <a:off x="1708052" y="1789"/>
+          <a:ext cx="5124159" cy="944446"/>
+        </a:xfrm>
+        <a:prstGeom prst="rect">
+          <a:avLst/>
+        </a:prstGeom>
+        <a:solidFill>
+          <a:schemeClr val="accent1">
+            <a:alpha val="90000"/>
+            <a:tint val="40000"/>
+            <a:hueOff val="0"/>
+            <a:satOff val="0"/>
+            <a:lumOff val="0"/>
+            <a:alphaOff val="0"/>
+          </a:schemeClr>
+        </a:solidFill>
+        <a:ln w="15875" cap="rnd" cmpd="sng" algn="ctr">
+          <a:solidFill>
+            <a:schemeClr val="accent1">
+              <a:alpha val="90000"/>
+              <a:tint val="40000"/>
+              <a:hueOff val="0"/>
+              <a:satOff val="0"/>
+              <a:lumOff val="0"/>
+              <a:alphaOff val="0"/>
+            </a:schemeClr>
+          </a:solidFill>
+          <a:prstDash val="solid"/>
+        </a:ln>
+        <a:effectLst/>
+      </dsp:spPr>
+      <dsp:style>
+        <a:lnRef idx="2">
+          <a:scrgbClr r="0" g="0" b="0"/>
+        </a:lnRef>
+        <a:fillRef idx="1">
+          <a:scrgbClr r="0" g="0" b="0"/>
+        </a:fillRef>
+        <a:effectRef idx="0">
+          <a:scrgbClr r="0" g="0" b="0"/>
+        </a:effectRef>
+        <a:fontRef idx="minor"/>
+      </dsp:style>
+      <dsp:txBody>
+        <a:bodyPr spcFirstLastPara="0" vert="horz" wrap="square" lIns="103942" tIns="139700" rIns="103942" bIns="139700" numCol="1" spcCol="1270" anchor="ctr" anchorCtr="0">
+          <a:noAutofit/>
+        </a:bodyPr>
+        <a:lstStyle/>
+        <a:p>
+          <a:pPr marL="0" lvl="0" indent="0" algn="l" defTabSz="488950">
+            <a:lnSpc>
+              <a:spcPct val="100000"/>
+            </a:lnSpc>
+            <a:spcBef>
+              <a:spcPct val="0"/>
+            </a:spcBef>
+            <a:spcAft>
+              <a:spcPct val="35000"/>
+            </a:spcAft>
+            <a:buNone/>
+          </a:pPr>
+          <a:r>
+            <a:rPr lang="en-US" sz="1100" kern="1200"/>
+            <a:t>Centralize single sourced</a:t>
+          </a:r>
+          <a:endParaRPr lang="en-US" sz="1100" kern="1200" dirty="0"/>
+        </a:p>
+        <a:p>
+          <a:pPr marL="0" lvl="0" indent="0" algn="l" defTabSz="488950">
+            <a:lnSpc>
+              <a:spcPct val="100000"/>
+            </a:lnSpc>
+            <a:spcBef>
+              <a:spcPct val="0"/>
+            </a:spcBef>
+            <a:spcAft>
+              <a:spcPct val="35000"/>
+            </a:spcAft>
+            <a:buNone/>
+          </a:pPr>
+          <a:r>
+            <a:rPr lang="en-US" sz="1100" kern="1200" dirty="0"/>
+            <a:t>Easy to manage through boarder security</a:t>
+          </a:r>
+        </a:p>
+      </dsp:txBody>
+      <dsp:txXfrm>
+        <a:off x="1708052" y="1789"/>
+        <a:ext cx="5124159" cy="944446"/>
       </dsp:txXfrm>
     </dsp:sp>
   </dsp:spTree>
@@ -18514,6 +18856,33 @@
               </a:rPr>
               <a:t>Asset Inventory Reporting</a:t>
             </a:r>
+            <a:br>
+              <a:rPr lang="en-US" dirty="0">
+                <a:solidFill>
+                  <a:srgbClr val="FEFFFF"/>
+                </a:solidFill>
+              </a:rPr>
+            </a:br>
+            <a:endParaRPr lang="en-US" dirty="0">
+              <a:solidFill>
+                <a:srgbClr val="FEFFFF"/>
+              </a:solidFill>
+            </a:endParaRPr>
+          </a:p>
+          <a:p>
+            <a:pPr>
+              <a:buClr>
+                <a:srgbClr val="FEC165"/>
+              </a:buClr>
+            </a:pPr>
+            <a:r>
+              <a:rPr lang="en-US" dirty="0">
+                <a:solidFill>
+                  <a:srgbClr val="FEFFFF"/>
+                </a:solidFill>
+              </a:rPr>
+              <a:t>Desired Configuration Management</a:t>
+            </a:r>
           </a:p>
         </p:txBody>
       </p:sp>
@@ -18539,8 +18908,8 @@
         </p:blipFill>
         <p:spPr>
           <a:xfrm>
-            <a:off x="8569235" y="2032000"/>
-            <a:ext cx="3393948" cy="3802742"/>
+            <a:off x="6958836" y="1941238"/>
+            <a:ext cx="4167710" cy="4669702"/>
           </a:xfrm>
           <a:prstGeom prst="rect">
             <a:avLst/>
@@ -26363,7 +26732,7 @@
         </p:nvSpPr>
         <p:spPr>
           <a:xfrm>
-            <a:off x="9392813" y="3101093"/>
+            <a:off x="9355868" y="2179295"/>
             <a:ext cx="2454052" cy="3029344"/>
           </a:xfrm>
         </p:spPr>
@@ -26374,12 +26743,12 @@
           <a:lstStyle/>
           <a:p>
             <a:r>
-              <a:rPr lang="en-US" sz="3200">
+              <a:rPr lang="en-US" sz="3200" dirty="0">
                 <a:solidFill>
                   <a:schemeClr val="bg1"/>
                 </a:solidFill>
               </a:rPr>
-              <a:t>How Did We Get Here</a:t>
+              <a:t>How Did We Get Here?</a:t>
             </a:r>
           </a:p>
         </p:txBody>
@@ -26556,7 +26925,7 @@
             <p:ph idx="1"/>
             <p:extLst>
               <p:ext uri="{D42A27DB-BD31-4B8C-83A1-F6EECF244321}">
-                <p14:modId xmlns:p14="http://schemas.microsoft.com/office/powerpoint/2010/main" val="589419006"/>
+                <p14:modId xmlns:p14="http://schemas.microsoft.com/office/powerpoint/2010/main" val="3052772435"/>
               </p:ext>
             </p:extLst>
           </p:nvPr>
@@ -27893,7 +28262,7 @@
           <a:lstStyle/>
           <a:p>
             <a:r>
-              <a:rPr lang="en-US">
+              <a:rPr lang="en-US" dirty="0">
                 <a:solidFill>
                   <a:srgbClr val="FFFFFF"/>
                 </a:solidFill>
@@ -27901,13 +28270,13 @@
               <a:t>European law that gives users control over their information</a:t>
             </a:r>
             <a:br>
-              <a:rPr lang="en-US">
+              <a:rPr lang="en-US" dirty="0">
                 <a:solidFill>
                   <a:srgbClr val="FFFFFF"/>
                 </a:solidFill>
               </a:rPr>
             </a:br>
-            <a:endParaRPr lang="en-US">
+            <a:endParaRPr lang="en-US" dirty="0">
               <a:solidFill>
                 <a:srgbClr val="FFFFFF"/>
               </a:solidFill>
@@ -27915,7 +28284,7 @@
           </a:p>
           <a:p>
             <a:r>
-              <a:rPr lang="en-US">
+              <a:rPr lang="en-US" dirty="0">
                 <a:solidFill>
                   <a:srgbClr val="FFFFFF"/>
                 </a:solidFill>
@@ -27923,13 +28292,13 @@
               <a:t>Establishes mandatory fines for negligently handling information</a:t>
             </a:r>
             <a:br>
-              <a:rPr lang="en-US">
+              <a:rPr lang="en-US" dirty="0">
                 <a:solidFill>
                   <a:srgbClr val="FFFFFF"/>
                 </a:solidFill>
               </a:rPr>
             </a:br>
-            <a:endParaRPr lang="en-US">
+            <a:endParaRPr lang="en-US" dirty="0">
               <a:solidFill>
                 <a:srgbClr val="FFFFFF"/>
               </a:solidFill>
@@ -27937,12 +28306,34 @@
           </a:p>
           <a:p>
             <a:r>
-              <a:rPr lang="en-US">
+              <a:rPr lang="en-US" dirty="0">
+                <a:solidFill>
+                  <a:srgbClr val="FFFFFF"/>
+                </a:solidFill>
+              </a:rPr>
+              <a:t>Users own the data</a:t>
+            </a:r>
+          </a:p>
+          <a:p>
+            <a:pPr lvl="1"/>
+            <a:r>
+              <a:rPr lang="en-US" dirty="0">
                 <a:solidFill>
                   <a:srgbClr val="FFFFFF"/>
                 </a:solidFill>
               </a:rPr>
               <a:t>Right to be Forgotten</a:t>
+            </a:r>
+          </a:p>
+          <a:p>
+            <a:pPr lvl="1"/>
+            <a:r>
+              <a:rPr lang="en-US" dirty="0">
+                <a:solidFill>
+                  <a:srgbClr val="FFFFFF"/>
+                </a:solidFill>
+              </a:rPr>
+              <a:t>Right for digital copy</a:t>
             </a:r>
           </a:p>
         </p:txBody>
@@ -28460,7 +28851,7 @@
             <a:pPr lvl="1"/>
             <a:r>
               <a:rPr lang="en-US" dirty="0"/>
-              <a:t>Shareholders abandon investments</a:t>
+              <a:t>Shareholders discard investments</a:t>
             </a:r>
             <a:br>
               <a:rPr lang="en-US" dirty="0"/>
@@ -28599,10 +28990,9 @@
           <a:lstStyle/>
           <a:p>
             <a:r>
-              <a:rPr lang="en-US"/>
-              <a:t>Health Care Privacy</a:t>
+              <a:rPr lang="en-US" dirty="0"/>
+              <a:t>Health Care Privacy Reform</a:t>
             </a:r>
-            <a:endParaRPr lang="en-US" dirty="0"/>
           </a:p>
         </p:txBody>
       </p:sp>
@@ -32243,6 +32633,29 @@
 <file path=ppt/slides/slide9.xml><?xml version="1.0" encoding="utf-8"?>
 <p:sld xmlns:a="http://schemas.openxmlformats.org/drawingml/2006/main" xmlns:r="http://schemas.openxmlformats.org/officeDocument/2006/relationships" xmlns:p="http://schemas.openxmlformats.org/presentationml/2006/main">
   <p:cSld>
+    <p:bg>
+      <p:bgPr>
+        <a:gradFill rotWithShape="1">
+          <a:gsLst>
+            <a:gs pos="0">
+              <a:schemeClr val="bg2">
+                <a:tint val="90000"/>
+                <a:lumMod val="120000"/>
+              </a:schemeClr>
+            </a:gs>
+            <a:gs pos="100000">
+              <a:schemeClr val="bg2">
+                <a:shade val="98000"/>
+                <a:satMod val="120000"/>
+                <a:lumMod val="98000"/>
+              </a:schemeClr>
+            </a:gs>
+          </a:gsLst>
+          <a:lin ang="5400000" scaled="0"/>
+        </a:gradFill>
+        <a:effectLst/>
+      </p:bgPr>
+    </p:bg>
     <p:spTree>
       <p:nvGrpSpPr>
         <p:cNvPr id="1" name=""/>
@@ -32257,6 +32670,66 @@
           <a:chExt cx="0" cy="0"/>
         </a:xfrm>
       </p:grpSpPr>
+      <p:sp useBgFill="1">
+        <p:nvSpPr>
+          <p:cNvPr id="41" name="Rectangle 40">
+            <a:extLst>
+              <a:ext uri="{FF2B5EF4-FFF2-40B4-BE49-F238E27FC236}">
+                <a16:creationId xmlns:a16="http://schemas.microsoft.com/office/drawing/2014/main" id="{0B0685DC-0CEE-482C-8A89-7A85EECA3D93}"/>
+              </a:ext>
+              <a:ext uri="{C183D7F6-B498-43B3-948B-1728B52AA6E4}">
+                <adec:decorative xmlns:adec="http://schemas.microsoft.com/office/drawing/2017/decorative" val="1"/>
+              </a:ext>
+            </a:extLst>
+          </p:cNvPr>
+          <p:cNvSpPr>
+            <a:spLocks noGrp="1" noRot="1" noChangeAspect="1" noMove="1" noResize="1" noEditPoints="1" noAdjustHandles="1" noChangeArrowheads="1" noChangeShapeType="1" noTextEdit="1"/>
+          </p:cNvSpPr>
+          <p:nvPr>
+            <p:extLst>
+              <p:ext uri="{386F3935-93C4-4BCD-93E2-E3B085C9AB24}">
+                <p16:designElem xmlns:p16="http://schemas.microsoft.com/office/powerpoint/2015/main" val="1"/>
+              </p:ext>
+            </p:extLst>
+          </p:nvPr>
+        </p:nvSpPr>
+        <p:spPr>
+          <a:xfrm>
+            <a:off x="2" y="0"/>
+            <a:ext cx="12191998" cy="6858000"/>
+          </a:xfrm>
+          <a:prstGeom prst="rect">
+            <a:avLst/>
+          </a:prstGeom>
+          <a:ln>
+            <a:noFill/>
+          </a:ln>
+        </p:spPr>
+        <p:style>
+          <a:lnRef idx="2">
+            <a:schemeClr val="accent1">
+              <a:shade val="50000"/>
+            </a:schemeClr>
+          </a:lnRef>
+          <a:fillRef idx="1">
+            <a:schemeClr val="accent1"/>
+          </a:fillRef>
+          <a:effectRef idx="0">
+            <a:schemeClr val="accent1"/>
+          </a:effectRef>
+          <a:fontRef idx="minor">
+            <a:schemeClr val="lt1"/>
+          </a:fontRef>
+        </p:style>
+        <p:txBody>
+          <a:bodyPr rtlCol="0" anchor="ctr"/>
+          <a:lstStyle/>
+          <a:p>
+            <a:pPr algn="ctr"/>
+            <a:endParaRPr lang="en-US"/>
+          </a:p>
+        </p:txBody>
+      </p:sp>
       <p:sp>
         <p:nvSpPr>
           <p:cNvPr id="2" name="Title 1">
@@ -32273,17 +32746,78 @@
             <p:ph type="title"/>
           </p:nvPr>
         </p:nvSpPr>
-        <p:spPr/>
+        <p:spPr>
+          <a:xfrm>
+            <a:off x="7855527" y="685800"/>
+            <a:ext cx="3649085" cy="5225422"/>
+          </a:xfrm>
+        </p:spPr>
         <p:txBody>
-          <a:bodyPr/>
+          <a:bodyPr anchor="ctr">
+            <a:normAutofit/>
+          </a:bodyPr>
           <a:lstStyle/>
           <a:p>
             <a:r>
-              <a:rPr lang="en-US" dirty="0"/>
+              <a:rPr lang="en-US"/>
               <a:t>Common Risks with Mobile Devices </a:t>
             </a:r>
           </a:p>
         </p:txBody>
+      </p:sp>
+      <p:sp>
+        <p:nvSpPr>
+          <p:cNvPr id="43" name="Rectangle 42">
+            <a:extLst>
+              <a:ext uri="{FF2B5EF4-FFF2-40B4-BE49-F238E27FC236}">
+                <a16:creationId xmlns:a16="http://schemas.microsoft.com/office/drawing/2014/main" id="{A31628A5-06CF-426B-948A-59ED234C9D1A}"/>
+              </a:ext>
+              <a:ext uri="{C183D7F6-B498-43B3-948B-1728B52AA6E4}">
+                <adec:decorative xmlns:adec="http://schemas.microsoft.com/office/drawing/2017/decorative" val="1"/>
+              </a:ext>
+            </a:extLst>
+          </p:cNvPr>
+          <p:cNvSpPr>
+            <a:spLocks noGrp="1" noRot="1" noChangeAspect="1" noMove="1" noResize="1" noEditPoints="1" noAdjustHandles="1" noChangeArrowheads="1" noChangeShapeType="1" noTextEdit="1"/>
+          </p:cNvSpPr>
+          <p:nvPr>
+            <p:extLst>
+              <p:ext uri="{386F3935-93C4-4BCD-93E2-E3B085C9AB24}">
+                <p16:designElem xmlns:p16="http://schemas.microsoft.com/office/powerpoint/2015/main" val="1"/>
+              </p:ext>
+            </p:extLst>
+          </p:nvPr>
+        </p:nvSpPr>
+        <p:spPr>
+          <a:xfrm>
+            <a:off x="0" y="0"/>
+            <a:ext cx="182880" cy="6858000"/>
+          </a:xfrm>
+          <a:prstGeom prst="rect">
+            <a:avLst/>
+          </a:prstGeom>
+          <a:solidFill>
+            <a:schemeClr val="tx2"/>
+          </a:solidFill>
+          <a:ln>
+            <a:noFill/>
+          </a:ln>
+          <a:effectLst/>
+        </p:spPr>
+        <p:style>
+          <a:lnRef idx="1">
+            <a:schemeClr val="accent1"/>
+          </a:lnRef>
+          <a:fillRef idx="3">
+            <a:schemeClr val="accent1"/>
+          </a:fillRef>
+          <a:effectRef idx="2">
+            <a:schemeClr val="accent1"/>
+          </a:effectRef>
+          <a:fontRef idx="minor">
+            <a:schemeClr val="lt1"/>
+          </a:fontRef>
+        </p:style>
       </p:sp>
       <p:sp>
         <p:nvSpPr>
@@ -32301,33 +32835,39 @@
             <p:ph idx="1"/>
           </p:nvPr>
         </p:nvSpPr>
-        <p:spPr/>
+        <p:spPr>
+          <a:xfrm>
+            <a:off x="1101554" y="685800"/>
+            <a:ext cx="5970162" cy="5225422"/>
+          </a:xfrm>
+        </p:spPr>
         <p:txBody>
-          <a:bodyPr>
+          <a:bodyPr anchor="ctr">
             <a:normAutofit/>
           </a:bodyPr>
           <a:lstStyle/>
           <a:p>
             <a:r>
               <a:rPr lang="en-US" dirty="0"/>
-              <a:t>Lost or Stolen Device</a:t>
+              <a:t>Maliciousness</a:t>
             </a:r>
-            <a:br>
-              <a:rPr lang="en-US" dirty="0"/>
-            </a:br>
-            <a:endParaRPr lang="en-US" dirty="0"/>
           </a:p>
           <a:p>
+            <a:pPr lvl="1"/>
+            <a:r>
+              <a:rPr lang="en-US" dirty="0"/>
+              <a:t>Stolen Device</a:t>
+            </a:r>
+          </a:p>
+          <a:p>
+            <a:pPr lvl="1"/>
             <a:r>
               <a:rPr lang="en-US" dirty="0"/>
               <a:t>Mobile Malware and Vulnerabilities</a:t>
             </a:r>
-            <a:br>
-              <a:rPr lang="en-US" dirty="0"/>
-            </a:br>
-            <a:endParaRPr lang="en-US" dirty="0"/>
           </a:p>
           <a:p>
+            <a:pPr lvl="1"/>
             <a:r>
               <a:rPr lang="en-US" dirty="0"/>
               <a:t>Advanced Threats</a:t>
@@ -32340,14 +32880,88 @@
           <a:p>
             <a:r>
               <a:rPr lang="en-US" dirty="0"/>
+              <a:t>Negligence</a:t>
+            </a:r>
+          </a:p>
+          <a:p>
+            <a:pPr lvl="1"/>
+            <a:r>
+              <a:rPr lang="en-US" dirty="0"/>
+              <a:t>Lost Device</a:t>
+            </a:r>
+          </a:p>
+          <a:p>
+            <a:pPr lvl="1"/>
+            <a:r>
+              <a:rPr lang="en-US" dirty="0"/>
+              <a:t>Multiple Usage Context</a:t>
+            </a:r>
+          </a:p>
+          <a:p>
+            <a:pPr lvl="1"/>
+            <a:r>
+              <a:rPr lang="en-US" dirty="0"/>
               <a:t>User Behavior and Monitoring</a:t>
             </a:r>
           </a:p>
           <a:p>
+            <a:pPr lvl="1"/>
             <a:endParaRPr lang="en-US" dirty="0"/>
           </a:p>
         </p:txBody>
       </p:sp>
+      <p:cxnSp>
+        <p:nvCxnSpPr>
+          <p:cNvPr id="45" name="Straight Connector 44">
+            <a:extLst>
+              <a:ext uri="{FF2B5EF4-FFF2-40B4-BE49-F238E27FC236}">
+                <a16:creationId xmlns:a16="http://schemas.microsoft.com/office/drawing/2014/main" id="{2D902729-F83B-46AA-B572-057BD32A6991}"/>
+              </a:ext>
+              <a:ext uri="{C183D7F6-B498-43B3-948B-1728B52AA6E4}">
+                <adec:decorative xmlns:adec="http://schemas.microsoft.com/office/drawing/2017/decorative" val="1"/>
+              </a:ext>
+            </a:extLst>
+          </p:cNvPr>
+          <p:cNvCxnSpPr>
+            <a:cxnSpLocks noGrp="1" noRot="1" noChangeAspect="1" noMove="1" noResize="1" noEditPoints="1" noAdjustHandles="1" noChangeArrowheads="1" noChangeShapeType="1"/>
+          </p:cNvCxnSpPr>
+          <p:nvPr>
+            <p:extLst>
+              <p:ext uri="{386F3935-93C4-4BCD-93E2-E3B085C9AB24}">
+                <p16:designElem xmlns:p16="http://schemas.microsoft.com/office/powerpoint/2015/main" val="1"/>
+              </p:ext>
+            </p:extLst>
+          </p:nvPr>
+        </p:nvCxnSpPr>
+        <p:spPr>
+          <a:xfrm>
+            <a:off x="7536041" y="1871831"/>
+            <a:ext cx="0" cy="3200400"/>
+          </a:xfrm>
+          <a:prstGeom prst="line">
+            <a:avLst/>
+          </a:prstGeom>
+          <a:ln w="15875">
+            <a:solidFill>
+              <a:schemeClr val="accent5"/>
+            </a:solidFill>
+          </a:ln>
+        </p:spPr>
+        <p:style>
+          <a:lnRef idx="1">
+            <a:schemeClr val="accent1"/>
+          </a:lnRef>
+          <a:fillRef idx="0">
+            <a:schemeClr val="accent1"/>
+          </a:fillRef>
+          <a:effectRef idx="0">
+            <a:schemeClr val="accent1"/>
+          </a:effectRef>
+          <a:fontRef idx="minor">
+            <a:schemeClr val="tx1"/>
+          </a:fontRef>
+        </p:style>
+      </p:cxnSp>
     </p:spTree>
     <p:extLst>
       <p:ext uri="{BB962C8B-B14F-4D97-AF65-F5344CB8AC3E}">

</xml_diff>

<commit_message>
checkpoint before beer closes
</commit_message>
<xml_diff>
--- a/Week7_MasterDataMgmt/BachmeierNTIM7030-7.pptx
+++ b/Week7_MasterDataMgmt/BachmeierNTIM7030-7.pptx
@@ -3165,6 +3165,927 @@
   <dgm:styleLbl name="revTx">
     <dgm:fillClrLst meth="repeat">
       <a:schemeClr val="lt2">
+        <a:alpha val="0"/>
+      </a:schemeClr>
+    </dgm:fillClrLst>
+    <dgm:linClrLst meth="repeat">
+      <a:schemeClr val="dk1">
+        <a:alpha val="0"/>
+      </a:schemeClr>
+    </dgm:linClrLst>
+    <dgm:effectClrLst/>
+    <dgm:txLinClrLst/>
+    <dgm:txFillClrLst meth="repeat">
+      <a:schemeClr val="tx1"/>
+    </dgm:txFillClrLst>
+    <dgm:txEffectClrLst/>
+  </dgm:styleLbl>
+</dgm:colorsDef>
+</file>
+
+<file path=ppt/diagrams/colors5.xml><?xml version="1.0" encoding="utf-8"?>
+<dgm:colorsDef xmlns:dgm="http://schemas.openxmlformats.org/drawingml/2006/diagram" xmlns:a="http://schemas.openxmlformats.org/drawingml/2006/main" uniqueId="urn:microsoft.com/office/officeart/2018/5/colors/Iconchunking_neutralbg_colorful1">
+  <dgm:title val=""/>
+  <dgm:desc val=""/>
+  <dgm:catLst>
+    <dgm:cat type="colorful" pri="10100"/>
+  </dgm:catLst>
+  <dgm:styleLbl name="node0">
+    <dgm:fillClrLst meth="repeat">
+      <a:schemeClr val="accent1"/>
+    </dgm:fillClrLst>
+    <dgm:linClrLst meth="repeat">
+      <a:schemeClr val="lt1"/>
+    </dgm:linClrLst>
+    <dgm:effectClrLst/>
+    <dgm:txLinClrLst/>
+    <dgm:txFillClrLst/>
+    <dgm:txEffectClrLst/>
+  </dgm:styleLbl>
+  <dgm:styleLbl name="node1">
+    <dgm:fillClrLst meth="repeat">
+      <a:schemeClr val="accent2"/>
+      <a:schemeClr val="accent3"/>
+      <a:schemeClr val="accent4"/>
+      <a:schemeClr val="accent5"/>
+      <a:schemeClr val="accent6"/>
+    </dgm:fillClrLst>
+    <dgm:linClrLst meth="repeat">
+      <a:schemeClr val="lt1">
+        <a:alpha val="0"/>
+      </a:schemeClr>
+    </dgm:linClrLst>
+    <dgm:effectClrLst/>
+    <dgm:txLinClrLst/>
+    <dgm:txFillClrLst/>
+    <dgm:txEffectClrLst/>
+  </dgm:styleLbl>
+  <dgm:styleLbl name="alignNode1">
+    <dgm:fillClrLst meth="repeat">
+      <a:schemeClr val="accent2"/>
+      <a:schemeClr val="accent3"/>
+      <a:schemeClr val="accent4"/>
+      <a:schemeClr val="accent5"/>
+      <a:schemeClr val="accent6"/>
+    </dgm:fillClrLst>
+    <dgm:linClrLst meth="repeat">
+      <a:schemeClr val="accent2"/>
+      <a:schemeClr val="accent3"/>
+      <a:schemeClr val="accent4"/>
+      <a:schemeClr val="accent5"/>
+      <a:schemeClr val="accent6"/>
+    </dgm:linClrLst>
+    <dgm:effectClrLst/>
+    <dgm:txLinClrLst/>
+    <dgm:txFillClrLst/>
+    <dgm:txEffectClrLst/>
+  </dgm:styleLbl>
+  <dgm:styleLbl name="lnNode1">
+    <dgm:fillClrLst meth="repeat">
+      <a:schemeClr val="accent2"/>
+      <a:schemeClr val="accent3"/>
+      <a:schemeClr val="accent4"/>
+      <a:schemeClr val="accent5"/>
+      <a:schemeClr val="accent6"/>
+    </dgm:fillClrLst>
+    <dgm:linClrLst meth="repeat">
+      <a:schemeClr val="lt1"/>
+    </dgm:linClrLst>
+    <dgm:effectClrLst/>
+    <dgm:txLinClrLst/>
+    <dgm:txFillClrLst/>
+    <dgm:txEffectClrLst/>
+  </dgm:styleLbl>
+  <dgm:styleLbl name="vennNode1">
+    <dgm:fillClrLst meth="repeat">
+      <a:schemeClr val="accent2">
+        <a:alpha val="50000"/>
+      </a:schemeClr>
+      <a:schemeClr val="accent3">
+        <a:alpha val="50000"/>
+      </a:schemeClr>
+      <a:schemeClr val="accent4">
+        <a:alpha val="50000"/>
+      </a:schemeClr>
+      <a:schemeClr val="accent5">
+        <a:alpha val="50000"/>
+      </a:schemeClr>
+      <a:schemeClr val="accent6">
+        <a:alpha val="50000"/>
+      </a:schemeClr>
+    </dgm:fillClrLst>
+    <dgm:linClrLst meth="repeat">
+      <a:schemeClr val="lt1"/>
+    </dgm:linClrLst>
+    <dgm:effectClrLst/>
+    <dgm:txLinClrLst/>
+    <dgm:txFillClrLst/>
+    <dgm:txEffectClrLst/>
+  </dgm:styleLbl>
+  <dgm:styleLbl name="node2">
+    <dgm:fillClrLst>
+      <a:schemeClr val="accent2"/>
+    </dgm:fillClrLst>
+    <dgm:linClrLst meth="repeat">
+      <a:schemeClr val="lt1"/>
+    </dgm:linClrLst>
+    <dgm:effectClrLst/>
+    <dgm:txLinClrLst/>
+    <dgm:txFillClrLst/>
+    <dgm:txEffectClrLst/>
+  </dgm:styleLbl>
+  <dgm:styleLbl name="node3">
+    <dgm:fillClrLst>
+      <a:schemeClr val="accent3"/>
+    </dgm:fillClrLst>
+    <dgm:linClrLst meth="repeat">
+      <a:schemeClr val="lt1"/>
+    </dgm:linClrLst>
+    <dgm:effectClrLst/>
+    <dgm:txLinClrLst/>
+    <dgm:txFillClrLst/>
+    <dgm:txEffectClrLst/>
+  </dgm:styleLbl>
+  <dgm:styleLbl name="node4">
+    <dgm:fillClrLst>
+      <a:schemeClr val="accent4"/>
+    </dgm:fillClrLst>
+    <dgm:linClrLst meth="repeat">
+      <a:schemeClr val="lt1"/>
+    </dgm:linClrLst>
+    <dgm:effectClrLst/>
+    <dgm:txLinClrLst/>
+    <dgm:txFillClrLst/>
+    <dgm:txEffectClrLst/>
+  </dgm:styleLbl>
+  <dgm:styleLbl name="fgImgPlace1">
+    <dgm:fillClrLst meth="repeat">
+      <a:schemeClr val="accent2">
+        <a:tint val="50000"/>
+      </a:schemeClr>
+      <a:schemeClr val="accent3">
+        <a:tint val="50000"/>
+      </a:schemeClr>
+      <a:schemeClr val="accent4">
+        <a:tint val="50000"/>
+      </a:schemeClr>
+      <a:schemeClr val="accent5">
+        <a:tint val="50000"/>
+      </a:schemeClr>
+      <a:schemeClr val="accent6">
+        <a:tint val="50000"/>
+      </a:schemeClr>
+    </dgm:fillClrLst>
+    <dgm:linClrLst meth="repeat">
+      <a:schemeClr val="lt1"/>
+    </dgm:linClrLst>
+    <dgm:effectClrLst/>
+    <dgm:txLinClrLst/>
+    <dgm:txFillClrLst meth="repeat">
+      <a:schemeClr val="lt1"/>
+    </dgm:txFillClrLst>
+    <dgm:txEffectClrLst/>
+  </dgm:styleLbl>
+  <dgm:styleLbl name="alignImgPlace1">
+    <dgm:fillClrLst>
+      <a:schemeClr val="accent1">
+        <a:tint val="50000"/>
+      </a:schemeClr>
+      <a:schemeClr val="accent2">
+        <a:tint val="20000"/>
+      </a:schemeClr>
+    </dgm:fillClrLst>
+    <dgm:linClrLst meth="repeat">
+      <a:schemeClr val="lt1"/>
+    </dgm:linClrLst>
+    <dgm:effectClrLst/>
+    <dgm:txLinClrLst/>
+    <dgm:txFillClrLst meth="repeat">
+      <a:schemeClr val="lt1"/>
+    </dgm:txFillClrLst>
+    <dgm:txEffectClrLst/>
+  </dgm:styleLbl>
+  <dgm:styleLbl name="bgImgPlace1">
+    <dgm:fillClrLst>
+      <a:schemeClr val="accent1">
+        <a:tint val="50000"/>
+      </a:schemeClr>
+      <a:schemeClr val="accent2">
+        <a:tint val="20000"/>
+      </a:schemeClr>
+    </dgm:fillClrLst>
+    <dgm:linClrLst meth="repeat">
+      <a:schemeClr val="lt1"/>
+    </dgm:linClrLst>
+    <dgm:effectClrLst/>
+    <dgm:txLinClrLst/>
+    <dgm:txFillClrLst meth="repeat">
+      <a:schemeClr val="lt1"/>
+    </dgm:txFillClrLst>
+    <dgm:txEffectClrLst/>
+  </dgm:styleLbl>
+  <dgm:styleLbl name="sibTrans2D1">
+    <dgm:fillClrLst meth="repeat">
+      <a:schemeClr val="accent2"/>
+      <a:schemeClr val="accent3"/>
+      <a:schemeClr val="accent4"/>
+      <a:schemeClr val="accent5"/>
+      <a:schemeClr val="accent6"/>
+    </dgm:fillClrLst>
+    <dgm:linClrLst meth="cycle">
+      <a:schemeClr val="lt1"/>
+    </dgm:linClrLst>
+    <dgm:effectClrLst/>
+    <dgm:txLinClrLst/>
+    <dgm:txFillClrLst/>
+    <dgm:txEffectClrLst/>
+  </dgm:styleLbl>
+  <dgm:styleLbl name="fgSibTrans2D1">
+    <dgm:fillClrLst meth="repeat">
+      <a:schemeClr val="accent2"/>
+      <a:schemeClr val="accent3"/>
+      <a:schemeClr val="accent4"/>
+      <a:schemeClr val="accent5"/>
+      <a:schemeClr val="accent6"/>
+    </dgm:fillClrLst>
+    <dgm:linClrLst meth="cycle">
+      <a:schemeClr val="lt1"/>
+    </dgm:linClrLst>
+    <dgm:effectClrLst/>
+    <dgm:txLinClrLst/>
+    <dgm:txFillClrLst meth="repeat">
+      <a:schemeClr val="lt1"/>
+    </dgm:txFillClrLst>
+    <dgm:txEffectClrLst/>
+  </dgm:styleLbl>
+  <dgm:styleLbl name="bgSibTrans2D1">
+    <dgm:fillClrLst meth="repeat">
+      <a:schemeClr val="accent2"/>
+      <a:schemeClr val="accent3"/>
+      <a:schemeClr val="accent4"/>
+      <a:schemeClr val="accent5"/>
+      <a:schemeClr val="accent6"/>
+    </dgm:fillClrLst>
+    <dgm:linClrLst meth="cycle">
+      <a:schemeClr val="lt1"/>
+    </dgm:linClrLst>
+    <dgm:effectClrLst/>
+    <dgm:txLinClrLst/>
+    <dgm:txFillClrLst meth="repeat">
+      <a:schemeClr val="lt1"/>
+    </dgm:txFillClrLst>
+    <dgm:txEffectClrLst/>
+  </dgm:styleLbl>
+  <dgm:styleLbl name="sibTrans1D1">
+    <dgm:fillClrLst meth="repeat">
+      <a:schemeClr val="accent2"/>
+      <a:schemeClr val="accent3"/>
+      <a:schemeClr val="accent4"/>
+      <a:schemeClr val="accent5"/>
+      <a:schemeClr val="accent6"/>
+    </dgm:fillClrLst>
+    <dgm:linClrLst meth="repeat">
+      <a:schemeClr val="accent2"/>
+      <a:schemeClr val="accent3"/>
+      <a:schemeClr val="accent4"/>
+      <a:schemeClr val="accent5"/>
+      <a:schemeClr val="accent6"/>
+    </dgm:linClrLst>
+    <dgm:effectClrLst/>
+    <dgm:txLinClrLst/>
+    <dgm:txFillClrLst meth="repeat">
+      <a:schemeClr val="tx1"/>
+    </dgm:txFillClrLst>
+    <dgm:txEffectClrLst/>
+  </dgm:styleLbl>
+  <dgm:styleLbl name="callout">
+    <dgm:fillClrLst meth="repeat">
+      <a:schemeClr val="accent2"/>
+    </dgm:fillClrLst>
+    <dgm:linClrLst meth="repeat">
+      <a:schemeClr val="accent2">
+        <a:tint val="50000"/>
+      </a:schemeClr>
+    </dgm:linClrLst>
+    <dgm:effectClrLst/>
+    <dgm:txLinClrLst/>
+    <dgm:txFillClrLst meth="repeat">
+      <a:schemeClr val="tx1"/>
+    </dgm:txFillClrLst>
+    <dgm:txEffectClrLst/>
+  </dgm:styleLbl>
+  <dgm:styleLbl name="asst0">
+    <dgm:fillClrLst meth="repeat">
+      <a:schemeClr val="accent1"/>
+    </dgm:fillClrLst>
+    <dgm:linClrLst meth="repeat">
+      <a:schemeClr val="lt1"/>
+    </dgm:linClrLst>
+    <dgm:effectClrLst/>
+    <dgm:txLinClrLst/>
+    <dgm:txFillClrLst/>
+    <dgm:txEffectClrLst/>
+  </dgm:styleLbl>
+  <dgm:styleLbl name="asst1">
+    <dgm:fillClrLst meth="repeat">
+      <a:schemeClr val="accent2"/>
+    </dgm:fillClrLst>
+    <dgm:linClrLst meth="repeat">
+      <a:schemeClr val="lt1"/>
+    </dgm:linClrLst>
+    <dgm:effectClrLst/>
+    <dgm:txLinClrLst/>
+    <dgm:txFillClrLst/>
+    <dgm:txEffectClrLst/>
+  </dgm:styleLbl>
+  <dgm:styleLbl name="asst2">
+    <dgm:fillClrLst>
+      <a:schemeClr val="accent3"/>
+    </dgm:fillClrLst>
+    <dgm:linClrLst meth="repeat">
+      <a:schemeClr val="lt1"/>
+    </dgm:linClrLst>
+    <dgm:effectClrLst/>
+    <dgm:txLinClrLst/>
+    <dgm:txFillClrLst/>
+    <dgm:txEffectClrLst/>
+  </dgm:styleLbl>
+  <dgm:styleLbl name="asst3">
+    <dgm:fillClrLst>
+      <a:schemeClr val="accent4"/>
+    </dgm:fillClrLst>
+    <dgm:linClrLst meth="repeat">
+      <a:schemeClr val="lt1"/>
+    </dgm:linClrLst>
+    <dgm:effectClrLst/>
+    <dgm:txLinClrLst/>
+    <dgm:txFillClrLst/>
+    <dgm:txEffectClrLst/>
+  </dgm:styleLbl>
+  <dgm:styleLbl name="asst4">
+    <dgm:fillClrLst>
+      <a:schemeClr val="accent5"/>
+    </dgm:fillClrLst>
+    <dgm:linClrLst meth="repeat">
+      <a:schemeClr val="lt1"/>
+    </dgm:linClrLst>
+    <dgm:effectClrLst/>
+    <dgm:txLinClrLst/>
+    <dgm:txFillClrLst/>
+    <dgm:txEffectClrLst/>
+  </dgm:styleLbl>
+  <dgm:styleLbl name="parChTrans2D1">
+    <dgm:fillClrLst meth="repeat">
+      <a:schemeClr val="accent2"/>
+    </dgm:fillClrLst>
+    <dgm:linClrLst meth="repeat">
+      <a:schemeClr val="lt1"/>
+    </dgm:linClrLst>
+    <dgm:effectClrLst/>
+    <dgm:txLinClrLst/>
+    <dgm:txFillClrLst meth="repeat">
+      <a:schemeClr val="lt1"/>
+    </dgm:txFillClrLst>
+    <dgm:txEffectClrLst/>
+  </dgm:styleLbl>
+  <dgm:styleLbl name="parChTrans2D2">
+    <dgm:fillClrLst meth="repeat">
+      <a:schemeClr val="accent3"/>
+    </dgm:fillClrLst>
+    <dgm:linClrLst meth="repeat">
+      <a:schemeClr val="lt1"/>
+    </dgm:linClrLst>
+    <dgm:effectClrLst/>
+    <dgm:txLinClrLst/>
+    <dgm:txFillClrLst/>
+    <dgm:txEffectClrLst/>
+  </dgm:styleLbl>
+  <dgm:styleLbl name="parChTrans2D3">
+    <dgm:fillClrLst meth="repeat">
+      <a:schemeClr val="accent4"/>
+    </dgm:fillClrLst>
+    <dgm:linClrLst meth="repeat">
+      <a:schemeClr val="lt1"/>
+    </dgm:linClrLst>
+    <dgm:effectClrLst/>
+    <dgm:txLinClrLst/>
+    <dgm:txFillClrLst/>
+    <dgm:txEffectClrLst/>
+  </dgm:styleLbl>
+  <dgm:styleLbl name="parChTrans2D4">
+    <dgm:fillClrLst meth="repeat">
+      <a:schemeClr val="accent5"/>
+    </dgm:fillClrLst>
+    <dgm:linClrLst meth="repeat">
+      <a:schemeClr val="lt1"/>
+    </dgm:linClrLst>
+    <dgm:effectClrLst/>
+    <dgm:txLinClrLst/>
+    <dgm:txFillClrLst meth="repeat">
+      <a:schemeClr val="lt1"/>
+    </dgm:txFillClrLst>
+    <dgm:txEffectClrLst/>
+  </dgm:styleLbl>
+  <dgm:styleLbl name="parChTrans1D1">
+    <dgm:fillClrLst meth="repeat">
+      <a:schemeClr val="accent2"/>
+    </dgm:fillClrLst>
+    <dgm:linClrLst meth="repeat">
+      <a:schemeClr val="accent1"/>
+    </dgm:linClrLst>
+    <dgm:effectClrLst/>
+    <dgm:txLinClrLst/>
+    <dgm:txFillClrLst meth="repeat">
+      <a:schemeClr val="tx1"/>
+    </dgm:txFillClrLst>
+    <dgm:txEffectClrLst/>
+  </dgm:styleLbl>
+  <dgm:styleLbl name="parChTrans1D2">
+    <dgm:fillClrLst meth="repeat">
+      <a:schemeClr val="accent3">
+        <a:tint val="90000"/>
+      </a:schemeClr>
+    </dgm:fillClrLst>
+    <dgm:linClrLst meth="repeat">
+      <a:schemeClr val="accent2"/>
+    </dgm:linClrLst>
+    <dgm:effectClrLst/>
+    <dgm:txLinClrLst/>
+    <dgm:txFillClrLst meth="repeat">
+      <a:schemeClr val="tx1"/>
+    </dgm:txFillClrLst>
+    <dgm:txEffectClrLst/>
+  </dgm:styleLbl>
+  <dgm:styleLbl name="parChTrans1D3">
+    <dgm:fillClrLst meth="repeat">
+      <a:schemeClr val="accent4">
+        <a:tint val="70000"/>
+      </a:schemeClr>
+    </dgm:fillClrLst>
+    <dgm:linClrLst meth="repeat">
+      <a:schemeClr val="accent3"/>
+    </dgm:linClrLst>
+    <dgm:effectClrLst/>
+    <dgm:txLinClrLst/>
+    <dgm:txFillClrLst meth="repeat">
+      <a:schemeClr val="tx1"/>
+    </dgm:txFillClrLst>
+    <dgm:txEffectClrLst/>
+  </dgm:styleLbl>
+  <dgm:styleLbl name="parChTrans1D4">
+    <dgm:fillClrLst meth="repeat">
+      <a:schemeClr val="accent5">
+        <a:tint val="50000"/>
+      </a:schemeClr>
+    </dgm:fillClrLst>
+    <dgm:linClrLst meth="repeat">
+      <a:schemeClr val="accent4"/>
+    </dgm:linClrLst>
+    <dgm:effectClrLst/>
+    <dgm:txLinClrLst/>
+    <dgm:txFillClrLst meth="repeat">
+      <a:schemeClr val="tx1"/>
+    </dgm:txFillClrLst>
+    <dgm:txEffectClrLst/>
+  </dgm:styleLbl>
+  <dgm:styleLbl name="fgAcc1">
+    <dgm:fillClrLst meth="repeat">
+      <a:schemeClr val="lt1">
+        <a:alpha val="90000"/>
+      </a:schemeClr>
+    </dgm:fillClrLst>
+    <dgm:linClrLst meth="repeat">
+      <a:schemeClr val="accent2"/>
+      <a:schemeClr val="accent3"/>
+      <a:schemeClr val="accent4"/>
+      <a:schemeClr val="accent5"/>
+      <a:schemeClr val="accent6"/>
+    </dgm:linClrLst>
+    <dgm:effectClrLst/>
+    <dgm:txLinClrLst/>
+    <dgm:txFillClrLst meth="repeat">
+      <a:schemeClr val="dk1"/>
+    </dgm:txFillClrLst>
+    <dgm:txEffectClrLst/>
+  </dgm:styleLbl>
+  <dgm:styleLbl name="conFgAcc1">
+    <dgm:fillClrLst meth="repeat">
+      <a:schemeClr val="lt1">
+        <a:alpha val="90000"/>
+      </a:schemeClr>
+    </dgm:fillClrLst>
+    <dgm:linClrLst meth="repeat">
+      <a:schemeClr val="accent2"/>
+      <a:schemeClr val="accent3"/>
+      <a:schemeClr val="accent4"/>
+      <a:schemeClr val="accent5"/>
+      <a:schemeClr val="accent6"/>
+    </dgm:linClrLst>
+    <dgm:effectClrLst/>
+    <dgm:txLinClrLst/>
+    <dgm:txFillClrLst meth="repeat">
+      <a:schemeClr val="dk1"/>
+    </dgm:txFillClrLst>
+    <dgm:txEffectClrLst/>
+  </dgm:styleLbl>
+  <dgm:styleLbl name="alignAcc1">
+    <dgm:fillClrLst meth="repeat">
+      <a:schemeClr val="lt1">
+        <a:alpha val="90000"/>
+      </a:schemeClr>
+    </dgm:fillClrLst>
+    <dgm:linClrLst meth="repeat">
+      <a:schemeClr val="accent2"/>
+      <a:schemeClr val="accent3"/>
+      <a:schemeClr val="accent4"/>
+      <a:schemeClr val="accent5"/>
+      <a:schemeClr val="accent6"/>
+    </dgm:linClrLst>
+    <dgm:effectClrLst/>
+    <dgm:txLinClrLst/>
+    <dgm:txFillClrLst meth="repeat">
+      <a:schemeClr val="dk1"/>
+    </dgm:txFillClrLst>
+    <dgm:txEffectClrLst/>
+  </dgm:styleLbl>
+  <dgm:styleLbl name="trAlignAcc1">
+    <dgm:fillClrLst meth="repeat">
+      <a:schemeClr val="lt1">
+        <a:alpha val="40000"/>
+      </a:schemeClr>
+    </dgm:fillClrLst>
+    <dgm:linClrLst meth="repeat">
+      <a:schemeClr val="accent1"/>
+    </dgm:linClrLst>
+    <dgm:effectClrLst/>
+    <dgm:txLinClrLst/>
+    <dgm:txFillClrLst meth="repeat">
+      <a:schemeClr val="dk1"/>
+    </dgm:txFillClrLst>
+    <dgm:txEffectClrLst/>
+  </dgm:styleLbl>
+  <dgm:styleLbl name="bgAcc1">
+    <dgm:fillClrLst meth="repeat">
+      <a:schemeClr val="lt1">
+        <a:alpha val="90000"/>
+      </a:schemeClr>
+    </dgm:fillClrLst>
+    <dgm:linClrLst meth="repeat">
+      <a:schemeClr val="accent2"/>
+      <a:schemeClr val="accent3"/>
+      <a:schemeClr val="accent4"/>
+      <a:schemeClr val="accent5"/>
+      <a:schemeClr val="accent6"/>
+    </dgm:linClrLst>
+    <dgm:effectClrLst/>
+    <dgm:txLinClrLst/>
+    <dgm:txFillClrLst meth="repeat">
+      <a:schemeClr val="dk1"/>
+    </dgm:txFillClrLst>
+    <dgm:txEffectClrLst/>
+  </dgm:styleLbl>
+  <dgm:styleLbl name="solidFgAcc1">
+    <dgm:fillClrLst meth="repeat">
+      <a:schemeClr val="lt1"/>
+    </dgm:fillClrLst>
+    <dgm:linClrLst meth="repeat">
+      <a:schemeClr val="accent2"/>
+      <a:schemeClr val="accent3"/>
+      <a:schemeClr val="accent4"/>
+      <a:schemeClr val="accent5"/>
+      <a:schemeClr val="accent6"/>
+    </dgm:linClrLst>
+    <dgm:effectClrLst/>
+    <dgm:txLinClrLst/>
+    <dgm:txFillClrLst meth="repeat">
+      <a:schemeClr val="dk1"/>
+    </dgm:txFillClrLst>
+    <dgm:txEffectClrLst/>
+  </dgm:styleLbl>
+  <dgm:styleLbl name="solidAlignAcc1">
+    <dgm:fillClrLst meth="repeat">
+      <a:schemeClr val="lt1"/>
+    </dgm:fillClrLst>
+    <dgm:linClrLst meth="repeat">
+      <a:schemeClr val="accent2"/>
+      <a:schemeClr val="accent3"/>
+      <a:schemeClr val="accent4"/>
+      <a:schemeClr val="accent5"/>
+      <a:schemeClr val="accent6"/>
+    </dgm:linClrLst>
+    <dgm:effectClrLst/>
+    <dgm:txLinClrLst/>
+    <dgm:txFillClrLst meth="repeat">
+      <a:schemeClr val="dk1"/>
+    </dgm:txFillClrLst>
+    <dgm:txEffectClrLst/>
+  </dgm:styleLbl>
+  <dgm:styleLbl name="solidBgAcc1">
+    <dgm:fillClrLst meth="repeat">
+      <a:schemeClr val="lt1"/>
+    </dgm:fillClrLst>
+    <dgm:linClrLst meth="repeat">
+      <a:schemeClr val="accent2"/>
+      <a:schemeClr val="accent3"/>
+      <a:schemeClr val="accent4"/>
+      <a:schemeClr val="accent5"/>
+      <a:schemeClr val="accent6"/>
+    </dgm:linClrLst>
+    <dgm:effectClrLst/>
+    <dgm:txLinClrLst/>
+    <dgm:txFillClrLst meth="repeat">
+      <a:schemeClr val="dk1"/>
+    </dgm:txFillClrLst>
+    <dgm:txEffectClrLst/>
+  </dgm:styleLbl>
+  <dgm:styleLbl name="fgAccFollowNode1">
+    <dgm:fillClrLst meth="repeat">
+      <a:schemeClr val="accent2">
+        <a:tint val="40000"/>
+        <a:alpha val="90000"/>
+      </a:schemeClr>
+      <a:schemeClr val="accent3">
+        <a:tint val="40000"/>
+        <a:alpha val="90000"/>
+      </a:schemeClr>
+      <a:schemeClr val="accent4">
+        <a:tint val="40000"/>
+        <a:alpha val="90000"/>
+      </a:schemeClr>
+      <a:schemeClr val="accent5">
+        <a:tint val="40000"/>
+        <a:alpha val="90000"/>
+      </a:schemeClr>
+      <a:schemeClr val="accent6">
+        <a:tint val="40000"/>
+        <a:alpha val="90000"/>
+      </a:schemeClr>
+    </dgm:fillClrLst>
+    <dgm:linClrLst meth="repeat">
+      <a:schemeClr val="accent2">
+        <a:tint val="40000"/>
+        <a:alpha val="90000"/>
+      </a:schemeClr>
+      <a:schemeClr val="accent3">
+        <a:tint val="40000"/>
+        <a:alpha val="90000"/>
+      </a:schemeClr>
+      <a:schemeClr val="accent4">
+        <a:tint val="40000"/>
+        <a:alpha val="90000"/>
+      </a:schemeClr>
+      <a:schemeClr val="accent5">
+        <a:tint val="40000"/>
+        <a:alpha val="90000"/>
+      </a:schemeClr>
+      <a:schemeClr val="accent6">
+        <a:tint val="40000"/>
+        <a:alpha val="90000"/>
+      </a:schemeClr>
+    </dgm:linClrLst>
+    <dgm:effectClrLst/>
+    <dgm:txLinClrLst/>
+    <dgm:txFillClrLst meth="repeat">
+      <a:schemeClr val="dk1"/>
+    </dgm:txFillClrLst>
+    <dgm:txEffectClrLst/>
+  </dgm:styleLbl>
+  <dgm:styleLbl name="alignAccFollowNode1">
+    <dgm:fillClrLst meth="repeat">
+      <a:schemeClr val="accent2">
+        <a:tint val="40000"/>
+        <a:alpha val="90000"/>
+      </a:schemeClr>
+      <a:schemeClr val="accent3">
+        <a:tint val="40000"/>
+        <a:alpha val="90000"/>
+      </a:schemeClr>
+      <a:schemeClr val="accent4">
+        <a:tint val="40000"/>
+        <a:alpha val="90000"/>
+      </a:schemeClr>
+      <a:schemeClr val="accent5">
+        <a:tint val="40000"/>
+        <a:alpha val="90000"/>
+      </a:schemeClr>
+      <a:schemeClr val="accent6">
+        <a:tint val="40000"/>
+        <a:alpha val="90000"/>
+      </a:schemeClr>
+    </dgm:fillClrLst>
+    <dgm:linClrLst meth="repeat">
+      <a:schemeClr val="accent2">
+        <a:tint val="40000"/>
+        <a:alpha val="90000"/>
+      </a:schemeClr>
+      <a:schemeClr val="accent3">
+        <a:tint val="40000"/>
+        <a:alpha val="90000"/>
+      </a:schemeClr>
+      <a:schemeClr val="accent4">
+        <a:tint val="40000"/>
+        <a:alpha val="90000"/>
+      </a:schemeClr>
+      <a:schemeClr val="accent5">
+        <a:tint val="40000"/>
+        <a:alpha val="90000"/>
+      </a:schemeClr>
+      <a:schemeClr val="accent6">
+        <a:tint val="40000"/>
+        <a:alpha val="90000"/>
+      </a:schemeClr>
+    </dgm:linClrLst>
+    <dgm:effectClrLst/>
+    <dgm:txLinClrLst/>
+    <dgm:txFillClrLst meth="repeat">
+      <a:schemeClr val="dk1"/>
+    </dgm:txFillClrLst>
+    <dgm:txEffectClrLst/>
+  </dgm:styleLbl>
+  <dgm:styleLbl name="bgAccFollowNode1">
+    <dgm:fillClrLst meth="repeat">
+      <a:schemeClr val="accent2">
+        <a:tint val="40000"/>
+        <a:alpha val="90000"/>
+      </a:schemeClr>
+      <a:schemeClr val="accent3">
+        <a:tint val="40000"/>
+        <a:alpha val="90000"/>
+      </a:schemeClr>
+      <a:schemeClr val="accent4">
+        <a:tint val="40000"/>
+        <a:alpha val="90000"/>
+      </a:schemeClr>
+      <a:schemeClr val="accent5">
+        <a:tint val="40000"/>
+        <a:alpha val="90000"/>
+      </a:schemeClr>
+      <a:schemeClr val="accent6">
+        <a:tint val="40000"/>
+        <a:alpha val="90000"/>
+      </a:schemeClr>
+    </dgm:fillClrLst>
+    <dgm:linClrLst meth="repeat">
+      <a:schemeClr val="accent2">
+        <a:tint val="40000"/>
+        <a:alpha val="90000"/>
+      </a:schemeClr>
+      <a:schemeClr val="accent3">
+        <a:tint val="40000"/>
+        <a:alpha val="90000"/>
+      </a:schemeClr>
+      <a:schemeClr val="accent4">
+        <a:tint val="40000"/>
+        <a:alpha val="90000"/>
+      </a:schemeClr>
+      <a:schemeClr val="accent5">
+        <a:tint val="40000"/>
+        <a:alpha val="90000"/>
+      </a:schemeClr>
+      <a:schemeClr val="accent6">
+        <a:tint val="40000"/>
+        <a:alpha val="90000"/>
+      </a:schemeClr>
+    </dgm:linClrLst>
+    <dgm:effectClrLst/>
+    <dgm:txLinClrLst/>
+    <dgm:txFillClrLst meth="repeat">
+      <a:schemeClr val="dk1"/>
+    </dgm:txFillClrLst>
+    <dgm:txEffectClrLst/>
+  </dgm:styleLbl>
+  <dgm:styleLbl name="fgAcc0">
+    <dgm:fillClrLst meth="repeat">
+      <a:schemeClr val="lt1">
+        <a:alpha val="90000"/>
+      </a:schemeClr>
+    </dgm:fillClrLst>
+    <dgm:linClrLst>
+      <a:schemeClr val="accent1"/>
+    </dgm:linClrLst>
+    <dgm:effectClrLst/>
+    <dgm:txLinClrLst/>
+    <dgm:txFillClrLst meth="repeat">
+      <a:schemeClr val="dk1"/>
+    </dgm:txFillClrLst>
+    <dgm:txEffectClrLst/>
+  </dgm:styleLbl>
+  <dgm:styleLbl name="fgAcc2">
+    <dgm:fillClrLst meth="repeat">
+      <a:schemeClr val="lt1">
+        <a:alpha val="90000"/>
+      </a:schemeClr>
+    </dgm:fillClrLst>
+    <dgm:linClrLst>
+      <a:schemeClr val="accent2"/>
+    </dgm:linClrLst>
+    <dgm:effectClrLst/>
+    <dgm:txLinClrLst/>
+    <dgm:txFillClrLst meth="repeat">
+      <a:schemeClr val="dk1"/>
+    </dgm:txFillClrLst>
+    <dgm:txEffectClrLst/>
+  </dgm:styleLbl>
+  <dgm:styleLbl name="fgAcc3">
+    <dgm:fillClrLst meth="repeat">
+      <a:schemeClr val="lt1">
+        <a:alpha val="90000"/>
+      </a:schemeClr>
+    </dgm:fillClrLst>
+    <dgm:linClrLst>
+      <a:schemeClr val="accent3"/>
+    </dgm:linClrLst>
+    <dgm:effectClrLst/>
+    <dgm:txLinClrLst/>
+    <dgm:txFillClrLst meth="repeat">
+      <a:schemeClr val="dk1"/>
+    </dgm:txFillClrLst>
+    <dgm:txEffectClrLst/>
+  </dgm:styleLbl>
+  <dgm:styleLbl name="fgAcc4">
+    <dgm:fillClrLst meth="repeat">
+      <a:schemeClr val="lt1">
+        <a:alpha val="90000"/>
+      </a:schemeClr>
+    </dgm:fillClrLst>
+    <dgm:linClrLst>
+      <a:schemeClr val="accent4"/>
+    </dgm:linClrLst>
+    <dgm:effectClrLst/>
+    <dgm:txLinClrLst/>
+    <dgm:txFillClrLst meth="repeat">
+      <a:schemeClr val="dk1"/>
+    </dgm:txFillClrLst>
+    <dgm:txEffectClrLst/>
+  </dgm:styleLbl>
+  <dgm:styleLbl name="bgShp">
+    <dgm:fillClrLst meth="repeat">
+      <a:schemeClr val="bg1">
+        <a:lumMod val="95000"/>
+      </a:schemeClr>
+    </dgm:fillClrLst>
+    <dgm:linClrLst meth="repeat">
+      <a:schemeClr val="dk1"/>
+    </dgm:linClrLst>
+    <dgm:effectClrLst/>
+    <dgm:txLinClrLst/>
+    <dgm:txFillClrLst meth="repeat">
+      <a:schemeClr val="dk1"/>
+    </dgm:txFillClrLst>
+    <dgm:txEffectClrLst/>
+  </dgm:styleLbl>
+  <dgm:styleLbl name="dkBgShp">
+    <dgm:fillClrLst meth="repeat">
+      <a:schemeClr val="accent2">
+        <a:shade val="90000"/>
+      </a:schemeClr>
+    </dgm:fillClrLst>
+    <dgm:linClrLst meth="repeat">
+      <a:schemeClr val="dk1"/>
+    </dgm:linClrLst>
+    <dgm:effectClrLst/>
+    <dgm:txLinClrLst/>
+    <dgm:txFillClrLst meth="repeat">
+      <a:schemeClr val="lt1"/>
+    </dgm:txFillClrLst>
+    <dgm:txEffectClrLst/>
+  </dgm:styleLbl>
+  <dgm:styleLbl name="trBgShp">
+    <dgm:fillClrLst meth="repeat">
+      <a:schemeClr val="accent1">
+        <a:tint val="50000"/>
+        <a:alpha val="40000"/>
+      </a:schemeClr>
+    </dgm:fillClrLst>
+    <dgm:linClrLst meth="repeat">
+      <a:schemeClr val="accent2"/>
+    </dgm:linClrLst>
+    <dgm:effectClrLst/>
+    <dgm:txLinClrLst/>
+    <dgm:txFillClrLst meth="repeat">
+      <a:schemeClr val="lt1"/>
+    </dgm:txFillClrLst>
+    <dgm:txEffectClrLst/>
+  </dgm:styleLbl>
+  <dgm:styleLbl name="fgShp">
+    <dgm:fillClrLst meth="repeat">
+      <a:schemeClr val="accent2">
+        <a:tint val="40000"/>
+      </a:schemeClr>
+    </dgm:fillClrLst>
+    <dgm:linClrLst meth="repeat">
+      <a:schemeClr val="lt1"/>
+    </dgm:linClrLst>
+    <dgm:effectClrLst/>
+    <dgm:txLinClrLst/>
+    <dgm:txFillClrLst meth="repeat">
+      <a:schemeClr val="dk1"/>
+    </dgm:txFillClrLst>
+    <dgm:txEffectClrLst/>
+  </dgm:styleLbl>
+  <dgm:styleLbl name="revTx">
+    <dgm:fillClrLst meth="repeat">
+      <a:schemeClr val="lt1">
         <a:alpha val="0"/>
       </a:schemeClr>
     </dgm:fillClrLst>
@@ -5615,6 +6536,618 @@
     <dgm:cxn modelId="{E67B4453-AD5D-49DB-A6BA-59060DB105D1}" type="presParOf" srcId="{8DC50751-9387-4AD8-A3F9-193217B51401}" destId="{61E68731-5C58-4792-8E28-F9407382D908}" srcOrd="8" destOrd="0" presId="urn:microsoft.com/office/officeart/2016/7/layout/VerticalSolidActionList"/>
     <dgm:cxn modelId="{0E16DE51-F552-42A3-94AF-14913E640CFB}" type="presParOf" srcId="{61E68731-5C58-4792-8E28-F9407382D908}" destId="{EF8DC689-A7FD-4E77-A084-A4F68FD50705}" srcOrd="0" destOrd="0" presId="urn:microsoft.com/office/officeart/2016/7/layout/VerticalSolidActionList"/>
     <dgm:cxn modelId="{68F6A1AF-BB2F-4F8C-9D8D-F84636B9D920}" type="presParOf" srcId="{61E68731-5C58-4792-8E28-F9407382D908}" destId="{37D62EA2-BABE-437A-B144-FC7787595AEA}" srcOrd="1" destOrd="0" presId="urn:microsoft.com/office/officeart/2016/7/layout/VerticalSolidActionList"/>
+  </dgm:cxnLst>
+  <dgm:bg/>
+  <dgm:whole/>
+  <dgm:extLst>
+    <a:ext uri="http://schemas.microsoft.com/office/drawing/2008/diagram">
+      <dsp:dataModelExt xmlns:dsp="http://schemas.microsoft.com/office/drawing/2008/diagram" relId="rId6" minVer="http://schemas.openxmlformats.org/drawingml/2006/diagram"/>
+    </a:ext>
+  </dgm:extLst>
+</dgm:dataModel>
+</file>
+
+<file path=ppt/diagrams/data5.xml><?xml version="1.0" encoding="utf-8"?>
+<dgm:dataModel xmlns:dgm="http://schemas.openxmlformats.org/drawingml/2006/diagram" xmlns:a="http://schemas.openxmlformats.org/drawingml/2006/main">
+  <dgm:ptLst>
+    <dgm:pt modelId="{3F463E47-BDA0-4EC7-9CBC-5C84F6FA005D}" type="doc">
+      <dgm:prSet loTypeId="urn:microsoft.com/office/officeart/2018/2/layout/IconVerticalSolidList" loCatId="icon" qsTypeId="urn:microsoft.com/office/officeart/2005/8/quickstyle/simple1" qsCatId="simple" csTypeId="urn:microsoft.com/office/officeart/2018/5/colors/Iconchunking_neutralbg_colorful1" csCatId="colorful" phldr="1"/>
+      <dgm:spPr/>
+      <dgm:t>
+        <a:bodyPr/>
+        <a:lstStyle/>
+        <a:p>
+          <a:endParaRPr lang="en-US"/>
+        </a:p>
+      </dgm:t>
+    </dgm:pt>
+    <dgm:pt modelId="{DDCB5566-7019-4FB3-9746-752E106DA090}">
+      <dgm:prSet phldrT="[Text]"/>
+      <dgm:spPr/>
+      <dgm:t>
+        <a:bodyPr/>
+        <a:lstStyle/>
+        <a:p>
+          <a:pPr>
+            <a:lnSpc>
+              <a:spcPct val="100000"/>
+            </a:lnSpc>
+          </a:pPr>
+          <a:r>
+            <a:rPr lang="en-US" dirty="0"/>
+            <a:t>Identity</a:t>
+          </a:r>
+        </a:p>
+      </dgm:t>
+    </dgm:pt>
+    <dgm:pt modelId="{99878B4B-1A9E-40F2-A00F-D38C51254143}" type="parTrans" cxnId="{2F60EA80-A402-40A4-9301-4AB049546AF4}">
+      <dgm:prSet/>
+      <dgm:spPr/>
+      <dgm:t>
+        <a:bodyPr/>
+        <a:lstStyle/>
+        <a:p>
+          <a:endParaRPr lang="en-US"/>
+        </a:p>
+      </dgm:t>
+    </dgm:pt>
+    <dgm:pt modelId="{4D4EF1F3-ED0B-422A-BDAF-8CC3D8DFB20A}" type="sibTrans" cxnId="{2F60EA80-A402-40A4-9301-4AB049546AF4}">
+      <dgm:prSet/>
+      <dgm:spPr/>
+      <dgm:t>
+        <a:bodyPr/>
+        <a:lstStyle/>
+        <a:p>
+          <a:endParaRPr lang="en-US"/>
+        </a:p>
+      </dgm:t>
+    </dgm:pt>
+    <dgm:pt modelId="{63FD127C-FA20-4BF6-9DD0-A7812EE34F5D}">
+      <dgm:prSet phldrT="[Text]"/>
+      <dgm:spPr/>
+      <dgm:t>
+        <a:bodyPr/>
+        <a:lstStyle/>
+        <a:p>
+          <a:pPr>
+            <a:lnSpc>
+              <a:spcPct val="100000"/>
+            </a:lnSpc>
+          </a:pPr>
+          <a:r>
+            <a:rPr lang="en-US" dirty="0"/>
+            <a:t>Plan</a:t>
+          </a:r>
+        </a:p>
+      </dgm:t>
+    </dgm:pt>
+    <dgm:pt modelId="{47D17223-FB9D-4381-8581-D74A1A4CA583}" type="parTrans" cxnId="{72B174F4-D762-44F6-A8FF-E87DA876AF6B}">
+      <dgm:prSet/>
+      <dgm:spPr/>
+      <dgm:t>
+        <a:bodyPr/>
+        <a:lstStyle/>
+        <a:p>
+          <a:endParaRPr lang="en-US"/>
+        </a:p>
+      </dgm:t>
+    </dgm:pt>
+    <dgm:pt modelId="{29D082D3-2F4C-4735-A95E-148EA593542E}" type="sibTrans" cxnId="{72B174F4-D762-44F6-A8FF-E87DA876AF6B}">
+      <dgm:prSet/>
+      <dgm:spPr/>
+      <dgm:t>
+        <a:bodyPr/>
+        <a:lstStyle/>
+        <a:p>
+          <a:endParaRPr lang="en-US"/>
+        </a:p>
+      </dgm:t>
+    </dgm:pt>
+    <dgm:pt modelId="{0E5CA5DA-DACD-452D-9D47-309A006FF313}">
+      <dgm:prSet phldrT="[Text]"/>
+      <dgm:spPr/>
+      <dgm:t>
+        <a:bodyPr/>
+        <a:lstStyle/>
+        <a:p>
+          <a:pPr>
+            <a:lnSpc>
+              <a:spcPct val="100000"/>
+            </a:lnSpc>
+          </a:pPr>
+          <a:r>
+            <a:rPr lang="en-US" dirty="0"/>
+            <a:t>Act</a:t>
+          </a:r>
+        </a:p>
+      </dgm:t>
+    </dgm:pt>
+    <dgm:pt modelId="{66F9F41B-E894-4E04-88E5-E2C3E0F094A0}" type="parTrans" cxnId="{7DC9E79C-72BD-44B6-BC8A-260C93070DB9}">
+      <dgm:prSet/>
+      <dgm:spPr/>
+      <dgm:t>
+        <a:bodyPr/>
+        <a:lstStyle/>
+        <a:p>
+          <a:endParaRPr lang="en-US"/>
+        </a:p>
+      </dgm:t>
+    </dgm:pt>
+    <dgm:pt modelId="{72F96D37-DCA3-467C-84E9-BB477A3192FA}" type="sibTrans" cxnId="{7DC9E79C-72BD-44B6-BC8A-260C93070DB9}">
+      <dgm:prSet/>
+      <dgm:spPr/>
+      <dgm:t>
+        <a:bodyPr/>
+        <a:lstStyle/>
+        <a:p>
+          <a:endParaRPr lang="en-US"/>
+        </a:p>
+      </dgm:t>
+    </dgm:pt>
+    <dgm:pt modelId="{06332657-053E-4F0E-8305-1DBEB23BC7A3}">
+      <dgm:prSet phldrT="[Text]"/>
+      <dgm:spPr/>
+      <dgm:t>
+        <a:bodyPr/>
+        <a:lstStyle/>
+        <a:p>
+          <a:pPr>
+            <a:lnSpc>
+              <a:spcPct val="100000"/>
+            </a:lnSpc>
+          </a:pPr>
+          <a:r>
+            <a:rPr lang="en-US" dirty="0"/>
+            <a:t>Check</a:t>
+          </a:r>
+        </a:p>
+      </dgm:t>
+    </dgm:pt>
+    <dgm:pt modelId="{6B8CBF02-7210-4B3E-B8A3-8619A01CC4B7}" type="parTrans" cxnId="{2C6262F7-AAD2-4418-A24B-C14B24B8BE20}">
+      <dgm:prSet/>
+      <dgm:spPr/>
+      <dgm:t>
+        <a:bodyPr/>
+        <a:lstStyle/>
+        <a:p>
+          <a:endParaRPr lang="en-US"/>
+        </a:p>
+      </dgm:t>
+    </dgm:pt>
+    <dgm:pt modelId="{7B5C868F-C75B-4451-A2F7-7751C07CAB63}" type="sibTrans" cxnId="{2C6262F7-AAD2-4418-A24B-C14B24B8BE20}">
+      <dgm:prSet/>
+      <dgm:spPr/>
+      <dgm:t>
+        <a:bodyPr/>
+        <a:lstStyle/>
+        <a:p>
+          <a:endParaRPr lang="en-US"/>
+        </a:p>
+      </dgm:t>
+    </dgm:pt>
+    <dgm:pt modelId="{456D9BE1-0661-4C8C-B378-A809E35D2B9F}">
+      <dgm:prSet phldrT="[Text]"/>
+      <dgm:spPr/>
+      <dgm:t>
+        <a:bodyPr/>
+        <a:lstStyle/>
+        <a:p>
+          <a:pPr>
+            <a:lnSpc>
+              <a:spcPct val="100000"/>
+            </a:lnSpc>
+          </a:pPr>
+          <a:r>
+            <a:rPr lang="en-US" dirty="0"/>
+            <a:t>What is the threat or issue</a:t>
+          </a:r>
+        </a:p>
+      </dgm:t>
+    </dgm:pt>
+    <dgm:pt modelId="{9EF1A525-EAA0-4670-A896-F6B9BD7A01E9}" type="parTrans" cxnId="{0625E671-9EFD-4FEF-86E0-B52C5AFB7EAB}">
+      <dgm:prSet/>
+      <dgm:spPr/>
+      <dgm:t>
+        <a:bodyPr/>
+        <a:lstStyle/>
+        <a:p>
+          <a:endParaRPr lang="en-US"/>
+        </a:p>
+      </dgm:t>
+    </dgm:pt>
+    <dgm:pt modelId="{DC0B3A8F-7333-4783-A9AE-2E58283EC0A6}" type="sibTrans" cxnId="{0625E671-9EFD-4FEF-86E0-B52C5AFB7EAB}">
+      <dgm:prSet/>
+      <dgm:spPr/>
+    </dgm:pt>
+    <dgm:pt modelId="{3C035F94-8167-4663-8B84-8245855BF249}">
+      <dgm:prSet phldrT="[Text]"/>
+      <dgm:spPr/>
+      <dgm:t>
+        <a:bodyPr/>
+        <a:lstStyle/>
+        <a:p>
+          <a:pPr>
+            <a:lnSpc>
+              <a:spcPct val="100000"/>
+            </a:lnSpc>
+          </a:pPr>
+          <a:r>
+            <a:rPr lang="en-US" dirty="0"/>
+            <a:t>Determine appropriate responses</a:t>
+          </a:r>
+        </a:p>
+      </dgm:t>
+    </dgm:pt>
+    <dgm:pt modelId="{629AA14F-EF25-4B73-9A28-4977E7BEBD50}" type="parTrans" cxnId="{9BE2F649-A63B-41C0-9283-6DDABEDBFEC7}">
+      <dgm:prSet/>
+      <dgm:spPr/>
+      <dgm:t>
+        <a:bodyPr/>
+        <a:lstStyle/>
+        <a:p>
+          <a:endParaRPr lang="en-US"/>
+        </a:p>
+      </dgm:t>
+    </dgm:pt>
+    <dgm:pt modelId="{D414AA9D-0B23-4D2E-B566-0FFD303CF51F}" type="sibTrans" cxnId="{9BE2F649-A63B-41C0-9283-6DDABEDBFEC7}">
+      <dgm:prSet/>
+      <dgm:spPr/>
+    </dgm:pt>
+    <dgm:pt modelId="{C81A4555-25E4-4356-8F46-8EB7E6AA77D3}">
+      <dgm:prSet phldrT="[Text]"/>
+      <dgm:spPr/>
+      <dgm:t>
+        <a:bodyPr/>
+        <a:lstStyle/>
+        <a:p>
+          <a:pPr>
+            <a:lnSpc>
+              <a:spcPct val="100000"/>
+            </a:lnSpc>
+          </a:pPr>
+          <a:r>
+            <a:rPr lang="en-US" dirty="0"/>
+            <a:t>Implement the plan</a:t>
+          </a:r>
+        </a:p>
+      </dgm:t>
+    </dgm:pt>
+    <dgm:pt modelId="{C12425A2-0D89-45D3-9B8D-B810CDFF94F0}" type="parTrans" cxnId="{713902F4-1019-45B0-A60E-BBBF1ADC3C59}">
+      <dgm:prSet/>
+      <dgm:spPr/>
+      <dgm:t>
+        <a:bodyPr/>
+        <a:lstStyle/>
+        <a:p>
+          <a:endParaRPr lang="en-US"/>
+        </a:p>
+      </dgm:t>
+    </dgm:pt>
+    <dgm:pt modelId="{0CCEFDA0-30BB-4853-8624-79B4665DD3FA}" type="sibTrans" cxnId="{713902F4-1019-45B0-A60E-BBBF1ADC3C59}">
+      <dgm:prSet/>
+      <dgm:spPr/>
+    </dgm:pt>
+    <dgm:pt modelId="{B5318BEF-D068-4898-9682-8D0E5E177206}">
+      <dgm:prSet phldrT="[Text]"/>
+      <dgm:spPr/>
+      <dgm:t>
+        <a:bodyPr/>
+        <a:lstStyle/>
+        <a:p>
+          <a:pPr>
+            <a:lnSpc>
+              <a:spcPct val="100000"/>
+            </a:lnSpc>
+          </a:pPr>
+          <a:r>
+            <a:rPr lang="en-US" dirty="0"/>
+            <a:t>Confirm the response is sufficient</a:t>
+          </a:r>
+        </a:p>
+      </dgm:t>
+    </dgm:pt>
+    <dgm:pt modelId="{162339A7-2CBE-4D28-AE50-6B55B6FFA08D}" type="parTrans" cxnId="{58E71E8F-61BD-40A0-AFF0-0C5E00C9AF09}">
+      <dgm:prSet/>
+      <dgm:spPr/>
+      <dgm:t>
+        <a:bodyPr/>
+        <a:lstStyle/>
+        <a:p>
+          <a:endParaRPr lang="en-US"/>
+        </a:p>
+      </dgm:t>
+    </dgm:pt>
+    <dgm:pt modelId="{658BE6E5-0F75-4290-AF97-CAA1D9253E92}" type="sibTrans" cxnId="{58E71E8F-61BD-40A0-AFF0-0C5E00C9AF09}">
+      <dgm:prSet/>
+      <dgm:spPr/>
+    </dgm:pt>
+    <dgm:pt modelId="{9DD21822-9758-4B04-A47E-E4FDF6BFB962}" type="pres">
+      <dgm:prSet presAssocID="{3F463E47-BDA0-4EC7-9CBC-5C84F6FA005D}" presName="root" presStyleCnt="0">
+        <dgm:presLayoutVars>
+          <dgm:dir/>
+          <dgm:resizeHandles val="exact"/>
+        </dgm:presLayoutVars>
+      </dgm:prSet>
+      <dgm:spPr/>
+    </dgm:pt>
+    <dgm:pt modelId="{640CF7E3-A96A-4761-A73B-7A281ECC2210}" type="pres">
+      <dgm:prSet presAssocID="{DDCB5566-7019-4FB3-9746-752E106DA090}" presName="compNode" presStyleCnt="0"/>
+      <dgm:spPr/>
+    </dgm:pt>
+    <dgm:pt modelId="{985713DE-C205-4F79-9826-B0F5C8D54208}" type="pres">
+      <dgm:prSet presAssocID="{DDCB5566-7019-4FB3-9746-752E106DA090}" presName="bgRect" presStyleLbl="bgShp" presStyleIdx="0" presStyleCnt="4"/>
+      <dgm:spPr/>
+    </dgm:pt>
+    <dgm:pt modelId="{02C1128D-2DD9-409D-B8B1-8167D1418CB9}" type="pres">
+      <dgm:prSet presAssocID="{DDCB5566-7019-4FB3-9746-752E106DA090}" presName="iconRect" presStyleLbl="node1" presStyleIdx="0" presStyleCnt="4"/>
+      <dgm:spPr>
+        <a:blipFill>
+          <a:blip xmlns:r="http://schemas.openxmlformats.org/officeDocument/2006/relationships" r:embed="rId1">
+            <a:extLst>
+              <a:ext uri="{28A0092B-C50C-407E-A947-70E740481C1C}">
+                <a14:useLocalDpi xmlns:a14="http://schemas.microsoft.com/office/drawing/2010/main" val="0"/>
+              </a:ext>
+              <a:ext uri="{96DAC541-7B7A-43D3-8B79-37D633B846F1}">
+                <asvg:svgBlip xmlns:asvg="http://schemas.microsoft.com/office/drawing/2016/SVG/main" r:embed="rId2"/>
+              </a:ext>
+            </a:extLst>
+          </a:blip>
+          <a:stretch>
+            <a:fillRect/>
+          </a:stretch>
+        </a:blipFill>
+        <a:ln>
+          <a:noFill/>
+        </a:ln>
+      </dgm:spPr>
+      <dgm:extLst>
+        <a:ext uri="{E40237B7-FDA0-4F09-8148-C483321AD2D9}">
+          <dgm14:cNvPr xmlns:dgm14="http://schemas.microsoft.com/office/drawing/2010/diagram" id="0" name="" descr="Help"/>
+        </a:ext>
+      </dgm:extLst>
+    </dgm:pt>
+    <dgm:pt modelId="{7FA14438-2C79-4DF5-913C-CE75ECFC5468}" type="pres">
+      <dgm:prSet presAssocID="{DDCB5566-7019-4FB3-9746-752E106DA090}" presName="spaceRect" presStyleCnt="0"/>
+      <dgm:spPr/>
+    </dgm:pt>
+    <dgm:pt modelId="{CB3B6849-DEA3-4216-A6A6-34D6A868D51A}" type="pres">
+      <dgm:prSet presAssocID="{DDCB5566-7019-4FB3-9746-752E106DA090}" presName="parTx" presStyleLbl="revTx" presStyleIdx="0" presStyleCnt="8">
+        <dgm:presLayoutVars>
+          <dgm:chMax val="0"/>
+          <dgm:chPref val="0"/>
+        </dgm:presLayoutVars>
+      </dgm:prSet>
+      <dgm:spPr/>
+    </dgm:pt>
+    <dgm:pt modelId="{98845165-ADFA-4EF7-BA31-B4EA2AB33EB8}" type="pres">
+      <dgm:prSet presAssocID="{DDCB5566-7019-4FB3-9746-752E106DA090}" presName="desTx" presStyleLbl="revTx" presStyleIdx="1" presStyleCnt="8">
+        <dgm:presLayoutVars/>
+      </dgm:prSet>
+      <dgm:spPr/>
+    </dgm:pt>
+    <dgm:pt modelId="{F405C2F5-28DB-4F4E-931E-FDA6175EAADD}" type="pres">
+      <dgm:prSet presAssocID="{4D4EF1F3-ED0B-422A-BDAF-8CC3D8DFB20A}" presName="sibTrans" presStyleCnt="0"/>
+      <dgm:spPr/>
+    </dgm:pt>
+    <dgm:pt modelId="{C19C1B83-3F35-4A1A-BCBF-F99838C761C4}" type="pres">
+      <dgm:prSet presAssocID="{63FD127C-FA20-4BF6-9DD0-A7812EE34F5D}" presName="compNode" presStyleCnt="0"/>
+      <dgm:spPr/>
+    </dgm:pt>
+    <dgm:pt modelId="{C6606E59-EC18-47F7-91A1-39C6D267DCC6}" type="pres">
+      <dgm:prSet presAssocID="{63FD127C-FA20-4BF6-9DD0-A7812EE34F5D}" presName="bgRect" presStyleLbl="bgShp" presStyleIdx="1" presStyleCnt="4"/>
+      <dgm:spPr/>
+    </dgm:pt>
+    <dgm:pt modelId="{82E307B5-82C0-40DF-AA53-F9B3B9A2ED12}" type="pres">
+      <dgm:prSet presAssocID="{63FD127C-FA20-4BF6-9DD0-A7812EE34F5D}" presName="iconRect" presStyleLbl="node1" presStyleIdx="1" presStyleCnt="4"/>
+      <dgm:spPr>
+        <a:blipFill>
+          <a:blip xmlns:r="http://schemas.openxmlformats.org/officeDocument/2006/relationships" r:embed="rId3">
+            <a:extLst>
+              <a:ext uri="{28A0092B-C50C-407E-A947-70E740481C1C}">
+                <a14:useLocalDpi xmlns:a14="http://schemas.microsoft.com/office/drawing/2010/main" val="0"/>
+              </a:ext>
+              <a:ext uri="{96DAC541-7B7A-43D3-8B79-37D633B846F1}">
+                <asvg:svgBlip xmlns:asvg="http://schemas.microsoft.com/office/drawing/2016/SVG/main" r:embed="rId4"/>
+              </a:ext>
+            </a:extLst>
+          </a:blip>
+          <a:stretch>
+            <a:fillRect/>
+          </a:stretch>
+        </a:blipFill>
+        <a:ln>
+          <a:noFill/>
+        </a:ln>
+      </dgm:spPr>
+      <dgm:extLst>
+        <a:ext uri="{E40237B7-FDA0-4F09-8148-C483321AD2D9}">
+          <dgm14:cNvPr xmlns:dgm14="http://schemas.microsoft.com/office/drawing/2010/diagram" id="0" name="" descr="Check List"/>
+        </a:ext>
+      </dgm:extLst>
+    </dgm:pt>
+    <dgm:pt modelId="{D6FB781F-8A17-43C6-81CB-B1E213891CC1}" type="pres">
+      <dgm:prSet presAssocID="{63FD127C-FA20-4BF6-9DD0-A7812EE34F5D}" presName="spaceRect" presStyleCnt="0"/>
+      <dgm:spPr/>
+    </dgm:pt>
+    <dgm:pt modelId="{1A7DF329-A409-4BAF-8F0D-3F9C343A49AC}" type="pres">
+      <dgm:prSet presAssocID="{63FD127C-FA20-4BF6-9DD0-A7812EE34F5D}" presName="parTx" presStyleLbl="revTx" presStyleIdx="2" presStyleCnt="8">
+        <dgm:presLayoutVars>
+          <dgm:chMax val="0"/>
+          <dgm:chPref val="0"/>
+        </dgm:presLayoutVars>
+      </dgm:prSet>
+      <dgm:spPr/>
+    </dgm:pt>
+    <dgm:pt modelId="{19BB6E5F-A11F-4FE3-AEB8-B88085F1369D}" type="pres">
+      <dgm:prSet presAssocID="{63FD127C-FA20-4BF6-9DD0-A7812EE34F5D}" presName="desTx" presStyleLbl="revTx" presStyleIdx="3" presStyleCnt="8">
+        <dgm:presLayoutVars/>
+      </dgm:prSet>
+      <dgm:spPr/>
+    </dgm:pt>
+    <dgm:pt modelId="{96CAA459-6BCD-4D9C-B703-A2F2B816FDCE}" type="pres">
+      <dgm:prSet presAssocID="{29D082D3-2F4C-4735-A95E-148EA593542E}" presName="sibTrans" presStyleCnt="0"/>
+      <dgm:spPr/>
+    </dgm:pt>
+    <dgm:pt modelId="{23B9F9DF-5EE2-4A09-BE85-49287BDEA1AF}" type="pres">
+      <dgm:prSet presAssocID="{0E5CA5DA-DACD-452D-9D47-309A006FF313}" presName="compNode" presStyleCnt="0"/>
+      <dgm:spPr/>
+    </dgm:pt>
+    <dgm:pt modelId="{5BC17322-664E-430A-9DE3-79B4F5DBA3A2}" type="pres">
+      <dgm:prSet presAssocID="{0E5CA5DA-DACD-452D-9D47-309A006FF313}" presName="bgRect" presStyleLbl="bgShp" presStyleIdx="2" presStyleCnt="4"/>
+      <dgm:spPr/>
+    </dgm:pt>
+    <dgm:pt modelId="{4E714C16-610A-4EAC-9CA3-85B784D28A60}" type="pres">
+      <dgm:prSet presAssocID="{0E5CA5DA-DACD-452D-9D47-309A006FF313}" presName="iconRect" presStyleLbl="node1" presStyleIdx="2" presStyleCnt="4"/>
+      <dgm:spPr>
+        <a:blipFill>
+          <a:blip xmlns:r="http://schemas.openxmlformats.org/officeDocument/2006/relationships" r:embed="rId5">
+            <a:extLst>
+              <a:ext uri="{28A0092B-C50C-407E-A947-70E740481C1C}">
+                <a14:useLocalDpi xmlns:a14="http://schemas.microsoft.com/office/drawing/2010/main" val="0"/>
+              </a:ext>
+              <a:ext uri="{96DAC541-7B7A-43D3-8B79-37D633B846F1}">
+                <asvg:svgBlip xmlns:asvg="http://schemas.microsoft.com/office/drawing/2016/SVG/main" r:embed="rId6"/>
+              </a:ext>
+            </a:extLst>
+          </a:blip>
+          <a:stretch>
+            <a:fillRect/>
+          </a:stretch>
+        </a:blipFill>
+        <a:ln>
+          <a:noFill/>
+        </a:ln>
+      </dgm:spPr>
+      <dgm:extLst>
+        <a:ext uri="{E40237B7-FDA0-4F09-8148-C483321AD2D9}">
+          <dgm14:cNvPr xmlns:dgm14="http://schemas.microsoft.com/office/drawing/2010/diagram" id="0" name="" descr="Checkmark"/>
+        </a:ext>
+      </dgm:extLst>
+    </dgm:pt>
+    <dgm:pt modelId="{0BB9F754-03A9-4D92-9911-5129E2F105EA}" type="pres">
+      <dgm:prSet presAssocID="{0E5CA5DA-DACD-452D-9D47-309A006FF313}" presName="spaceRect" presStyleCnt="0"/>
+      <dgm:spPr/>
+    </dgm:pt>
+    <dgm:pt modelId="{88EC4FBD-33CF-4E29-B84B-84F4B64CF8E4}" type="pres">
+      <dgm:prSet presAssocID="{0E5CA5DA-DACD-452D-9D47-309A006FF313}" presName="parTx" presStyleLbl="revTx" presStyleIdx="4" presStyleCnt="8">
+        <dgm:presLayoutVars>
+          <dgm:chMax val="0"/>
+          <dgm:chPref val="0"/>
+        </dgm:presLayoutVars>
+      </dgm:prSet>
+      <dgm:spPr/>
+    </dgm:pt>
+    <dgm:pt modelId="{4C8A5F5E-11D5-49E8-9BA6-FB0C3E2EFC24}" type="pres">
+      <dgm:prSet presAssocID="{0E5CA5DA-DACD-452D-9D47-309A006FF313}" presName="desTx" presStyleLbl="revTx" presStyleIdx="5" presStyleCnt="8">
+        <dgm:presLayoutVars/>
+      </dgm:prSet>
+      <dgm:spPr/>
+    </dgm:pt>
+    <dgm:pt modelId="{7C26E420-E62C-4F77-8993-CB0AF528229E}" type="pres">
+      <dgm:prSet presAssocID="{72F96D37-DCA3-467C-84E9-BB477A3192FA}" presName="sibTrans" presStyleCnt="0"/>
+      <dgm:spPr/>
+    </dgm:pt>
+    <dgm:pt modelId="{5C0351F8-3CF9-4889-A66A-91CEC5F8BB05}" type="pres">
+      <dgm:prSet presAssocID="{06332657-053E-4F0E-8305-1DBEB23BC7A3}" presName="compNode" presStyleCnt="0"/>
+      <dgm:spPr/>
+    </dgm:pt>
+    <dgm:pt modelId="{A7AD2A86-DF9E-4EBC-A99D-9D0C1CAEBA29}" type="pres">
+      <dgm:prSet presAssocID="{06332657-053E-4F0E-8305-1DBEB23BC7A3}" presName="bgRect" presStyleLbl="bgShp" presStyleIdx="3" presStyleCnt="4"/>
+      <dgm:spPr/>
+    </dgm:pt>
+    <dgm:pt modelId="{3E28EA8C-B93F-4E60-9D42-061C52DE82A0}" type="pres">
+      <dgm:prSet presAssocID="{06332657-053E-4F0E-8305-1DBEB23BC7A3}" presName="iconRect" presStyleLbl="node1" presStyleIdx="3" presStyleCnt="4"/>
+      <dgm:spPr>
+        <a:blipFill>
+          <a:blip xmlns:r="http://schemas.openxmlformats.org/officeDocument/2006/relationships" r:embed="rId7">
+            <a:extLst>
+              <a:ext uri="{28A0092B-C50C-407E-A947-70E740481C1C}">
+                <a14:useLocalDpi xmlns:a14="http://schemas.microsoft.com/office/drawing/2010/main" val="0"/>
+              </a:ext>
+              <a:ext uri="{96DAC541-7B7A-43D3-8B79-37D633B846F1}">
+                <asvg:svgBlip xmlns:asvg="http://schemas.microsoft.com/office/drawing/2016/SVG/main" r:embed="rId8"/>
+              </a:ext>
+            </a:extLst>
+          </a:blip>
+          <a:stretch>
+            <a:fillRect/>
+          </a:stretch>
+        </a:blipFill>
+        <a:ln>
+          <a:noFill/>
+        </a:ln>
+      </dgm:spPr>
+      <dgm:extLst>
+        <a:ext uri="{E40237B7-FDA0-4F09-8148-C483321AD2D9}">
+          <dgm14:cNvPr xmlns:dgm14="http://schemas.microsoft.com/office/drawing/2010/diagram" id="0" name="" descr="Close"/>
+        </a:ext>
+      </dgm:extLst>
+    </dgm:pt>
+    <dgm:pt modelId="{DAC1E9EC-A73D-4DD2-B4DF-4ED0D819D715}" type="pres">
+      <dgm:prSet presAssocID="{06332657-053E-4F0E-8305-1DBEB23BC7A3}" presName="spaceRect" presStyleCnt="0"/>
+      <dgm:spPr/>
+    </dgm:pt>
+    <dgm:pt modelId="{A4621C78-E2D9-40CB-8C00-F97A3C8E2E1F}" type="pres">
+      <dgm:prSet presAssocID="{06332657-053E-4F0E-8305-1DBEB23BC7A3}" presName="parTx" presStyleLbl="revTx" presStyleIdx="6" presStyleCnt="8">
+        <dgm:presLayoutVars>
+          <dgm:chMax val="0"/>
+          <dgm:chPref val="0"/>
+        </dgm:presLayoutVars>
+      </dgm:prSet>
+      <dgm:spPr/>
+    </dgm:pt>
+    <dgm:pt modelId="{D8A735C6-7C25-4D52-B3F8-E7243DD0AB54}" type="pres">
+      <dgm:prSet presAssocID="{06332657-053E-4F0E-8305-1DBEB23BC7A3}" presName="desTx" presStyleLbl="revTx" presStyleIdx="7" presStyleCnt="8">
+        <dgm:presLayoutVars/>
+      </dgm:prSet>
+      <dgm:spPr/>
+    </dgm:pt>
+  </dgm:ptLst>
+  <dgm:cxnLst>
+    <dgm:cxn modelId="{DC5F7F0B-73D4-4023-A3DD-D47AA03E8655}" type="presOf" srcId="{63FD127C-FA20-4BF6-9DD0-A7812EE34F5D}" destId="{1A7DF329-A409-4BAF-8F0D-3F9C343A49AC}" srcOrd="0" destOrd="0" presId="urn:microsoft.com/office/officeart/2018/2/layout/IconVerticalSolidList"/>
+    <dgm:cxn modelId="{49B51B26-E86F-419F-80E1-AFEC9EDA8BF4}" type="presOf" srcId="{06332657-053E-4F0E-8305-1DBEB23BC7A3}" destId="{A4621C78-E2D9-40CB-8C00-F97A3C8E2E1F}" srcOrd="0" destOrd="0" presId="urn:microsoft.com/office/officeart/2018/2/layout/IconVerticalSolidList"/>
+    <dgm:cxn modelId="{F26D245E-8221-4FF3-B208-073E6206B859}" type="presOf" srcId="{B5318BEF-D068-4898-9682-8D0E5E177206}" destId="{D8A735C6-7C25-4D52-B3F8-E7243DD0AB54}" srcOrd="0" destOrd="0" presId="urn:microsoft.com/office/officeart/2018/2/layout/IconVerticalSolidList"/>
+    <dgm:cxn modelId="{86650864-697A-42B7-B4AC-345552F90EC2}" type="presOf" srcId="{DDCB5566-7019-4FB3-9746-752E106DA090}" destId="{CB3B6849-DEA3-4216-A6A6-34D6A868D51A}" srcOrd="0" destOrd="0" presId="urn:microsoft.com/office/officeart/2018/2/layout/IconVerticalSolidList"/>
+    <dgm:cxn modelId="{9BE2F649-A63B-41C0-9283-6DDABEDBFEC7}" srcId="{63FD127C-FA20-4BF6-9DD0-A7812EE34F5D}" destId="{3C035F94-8167-4663-8B84-8245855BF249}" srcOrd="0" destOrd="0" parTransId="{629AA14F-EF25-4B73-9A28-4977E7BEBD50}" sibTransId="{D414AA9D-0B23-4D2E-B566-0FFD303CF51F}"/>
+    <dgm:cxn modelId="{87BD376B-FE47-4976-BED5-F991727D8E22}" type="presOf" srcId="{0E5CA5DA-DACD-452D-9D47-309A006FF313}" destId="{88EC4FBD-33CF-4E29-B84B-84F4B64CF8E4}" srcOrd="0" destOrd="0" presId="urn:microsoft.com/office/officeart/2018/2/layout/IconVerticalSolidList"/>
+    <dgm:cxn modelId="{0625E671-9EFD-4FEF-86E0-B52C5AFB7EAB}" srcId="{DDCB5566-7019-4FB3-9746-752E106DA090}" destId="{456D9BE1-0661-4C8C-B378-A809E35D2B9F}" srcOrd="0" destOrd="0" parTransId="{9EF1A525-EAA0-4670-A896-F6B9BD7A01E9}" sibTransId="{DC0B3A8F-7333-4783-A9AE-2E58283EC0A6}"/>
+    <dgm:cxn modelId="{0D87177B-34D2-41A2-A8CD-BAD28688182E}" type="presOf" srcId="{3F463E47-BDA0-4EC7-9CBC-5C84F6FA005D}" destId="{9DD21822-9758-4B04-A47E-E4FDF6BFB962}" srcOrd="0" destOrd="0" presId="urn:microsoft.com/office/officeart/2018/2/layout/IconVerticalSolidList"/>
+    <dgm:cxn modelId="{2F60EA80-A402-40A4-9301-4AB049546AF4}" srcId="{3F463E47-BDA0-4EC7-9CBC-5C84F6FA005D}" destId="{DDCB5566-7019-4FB3-9746-752E106DA090}" srcOrd="0" destOrd="0" parTransId="{99878B4B-1A9E-40F2-A00F-D38C51254143}" sibTransId="{4D4EF1F3-ED0B-422A-BDAF-8CC3D8DFB20A}"/>
+    <dgm:cxn modelId="{58E71E8F-61BD-40A0-AFF0-0C5E00C9AF09}" srcId="{06332657-053E-4F0E-8305-1DBEB23BC7A3}" destId="{B5318BEF-D068-4898-9682-8D0E5E177206}" srcOrd="0" destOrd="0" parTransId="{162339A7-2CBE-4D28-AE50-6B55B6FFA08D}" sibTransId="{658BE6E5-0F75-4290-AF97-CAA1D9253E92}"/>
+    <dgm:cxn modelId="{7DC9E79C-72BD-44B6-BC8A-260C93070DB9}" srcId="{3F463E47-BDA0-4EC7-9CBC-5C84F6FA005D}" destId="{0E5CA5DA-DACD-452D-9D47-309A006FF313}" srcOrd="2" destOrd="0" parTransId="{66F9F41B-E894-4E04-88E5-E2C3E0F094A0}" sibTransId="{72F96D37-DCA3-467C-84E9-BB477A3192FA}"/>
+    <dgm:cxn modelId="{1A1A20A3-2107-4D3B-957E-CAAFFD18BECA}" type="presOf" srcId="{3C035F94-8167-4663-8B84-8245855BF249}" destId="{19BB6E5F-A11F-4FE3-AEB8-B88085F1369D}" srcOrd="0" destOrd="0" presId="urn:microsoft.com/office/officeart/2018/2/layout/IconVerticalSolidList"/>
+    <dgm:cxn modelId="{1DB52DE3-2279-4A73-AAD9-D4F7BFC86677}" type="presOf" srcId="{456D9BE1-0661-4C8C-B378-A809E35D2B9F}" destId="{98845165-ADFA-4EF7-BA31-B4EA2AB33EB8}" srcOrd="0" destOrd="0" presId="urn:microsoft.com/office/officeart/2018/2/layout/IconVerticalSolidList"/>
+    <dgm:cxn modelId="{713902F4-1019-45B0-A60E-BBBF1ADC3C59}" srcId="{0E5CA5DA-DACD-452D-9D47-309A006FF313}" destId="{C81A4555-25E4-4356-8F46-8EB7E6AA77D3}" srcOrd="0" destOrd="0" parTransId="{C12425A2-0D89-45D3-9B8D-B810CDFF94F0}" sibTransId="{0CCEFDA0-30BB-4853-8624-79B4665DD3FA}"/>
+    <dgm:cxn modelId="{72B174F4-D762-44F6-A8FF-E87DA876AF6B}" srcId="{3F463E47-BDA0-4EC7-9CBC-5C84F6FA005D}" destId="{63FD127C-FA20-4BF6-9DD0-A7812EE34F5D}" srcOrd="1" destOrd="0" parTransId="{47D17223-FB9D-4381-8581-D74A1A4CA583}" sibTransId="{29D082D3-2F4C-4735-A95E-148EA593542E}"/>
+    <dgm:cxn modelId="{2C6262F7-AAD2-4418-A24B-C14B24B8BE20}" srcId="{3F463E47-BDA0-4EC7-9CBC-5C84F6FA005D}" destId="{06332657-053E-4F0E-8305-1DBEB23BC7A3}" srcOrd="3" destOrd="0" parTransId="{6B8CBF02-7210-4B3E-B8A3-8619A01CC4B7}" sibTransId="{7B5C868F-C75B-4451-A2F7-7751C07CAB63}"/>
+    <dgm:cxn modelId="{EAD598FE-435C-4AA5-855F-F4508434FCC0}" type="presOf" srcId="{C81A4555-25E4-4356-8F46-8EB7E6AA77D3}" destId="{4C8A5F5E-11D5-49E8-9BA6-FB0C3E2EFC24}" srcOrd="0" destOrd="0" presId="urn:microsoft.com/office/officeart/2018/2/layout/IconVerticalSolidList"/>
+    <dgm:cxn modelId="{6FB40E0A-C9DC-4C82-877D-6E41E3FCCD77}" type="presParOf" srcId="{9DD21822-9758-4B04-A47E-E4FDF6BFB962}" destId="{640CF7E3-A96A-4761-A73B-7A281ECC2210}" srcOrd="0" destOrd="0" presId="urn:microsoft.com/office/officeart/2018/2/layout/IconVerticalSolidList"/>
+    <dgm:cxn modelId="{57BDBEF6-6507-46B8-84EB-625539BFFC1A}" type="presParOf" srcId="{640CF7E3-A96A-4761-A73B-7A281ECC2210}" destId="{985713DE-C205-4F79-9826-B0F5C8D54208}" srcOrd="0" destOrd="0" presId="urn:microsoft.com/office/officeart/2018/2/layout/IconVerticalSolidList"/>
+    <dgm:cxn modelId="{75996C40-7EEF-4F11-8418-8061F62DE59C}" type="presParOf" srcId="{640CF7E3-A96A-4761-A73B-7A281ECC2210}" destId="{02C1128D-2DD9-409D-B8B1-8167D1418CB9}" srcOrd="1" destOrd="0" presId="urn:microsoft.com/office/officeart/2018/2/layout/IconVerticalSolidList"/>
+    <dgm:cxn modelId="{6F69763C-D49D-4503-B54F-39BBB81D71DB}" type="presParOf" srcId="{640CF7E3-A96A-4761-A73B-7A281ECC2210}" destId="{7FA14438-2C79-4DF5-913C-CE75ECFC5468}" srcOrd="2" destOrd="0" presId="urn:microsoft.com/office/officeart/2018/2/layout/IconVerticalSolidList"/>
+    <dgm:cxn modelId="{3BDBB691-4A25-492A-ACEB-045CA4DB7809}" type="presParOf" srcId="{640CF7E3-A96A-4761-A73B-7A281ECC2210}" destId="{CB3B6849-DEA3-4216-A6A6-34D6A868D51A}" srcOrd="3" destOrd="0" presId="urn:microsoft.com/office/officeart/2018/2/layout/IconVerticalSolidList"/>
+    <dgm:cxn modelId="{988ED71F-C464-4D26-94A2-998FD725D36F}" type="presParOf" srcId="{640CF7E3-A96A-4761-A73B-7A281ECC2210}" destId="{98845165-ADFA-4EF7-BA31-B4EA2AB33EB8}" srcOrd="4" destOrd="0" presId="urn:microsoft.com/office/officeart/2018/2/layout/IconVerticalSolidList"/>
+    <dgm:cxn modelId="{67C0E4B2-DF23-4CAF-A190-3601758DEDBD}" type="presParOf" srcId="{9DD21822-9758-4B04-A47E-E4FDF6BFB962}" destId="{F405C2F5-28DB-4F4E-931E-FDA6175EAADD}" srcOrd="1" destOrd="0" presId="urn:microsoft.com/office/officeart/2018/2/layout/IconVerticalSolidList"/>
+    <dgm:cxn modelId="{74D3994E-5A88-4670-9B5B-8750FB88EB24}" type="presParOf" srcId="{9DD21822-9758-4B04-A47E-E4FDF6BFB962}" destId="{C19C1B83-3F35-4A1A-BCBF-F99838C761C4}" srcOrd="2" destOrd="0" presId="urn:microsoft.com/office/officeart/2018/2/layout/IconVerticalSolidList"/>
+    <dgm:cxn modelId="{B459DAA2-E175-4A28-B158-EDD1C681F390}" type="presParOf" srcId="{C19C1B83-3F35-4A1A-BCBF-F99838C761C4}" destId="{C6606E59-EC18-47F7-91A1-39C6D267DCC6}" srcOrd="0" destOrd="0" presId="urn:microsoft.com/office/officeart/2018/2/layout/IconVerticalSolidList"/>
+    <dgm:cxn modelId="{AD159EA4-6AD3-4225-877C-A46C54A538B7}" type="presParOf" srcId="{C19C1B83-3F35-4A1A-BCBF-F99838C761C4}" destId="{82E307B5-82C0-40DF-AA53-F9B3B9A2ED12}" srcOrd="1" destOrd="0" presId="urn:microsoft.com/office/officeart/2018/2/layout/IconVerticalSolidList"/>
+    <dgm:cxn modelId="{77AE98B4-FB10-4088-AEC0-EA3A361AEB4B}" type="presParOf" srcId="{C19C1B83-3F35-4A1A-BCBF-F99838C761C4}" destId="{D6FB781F-8A17-43C6-81CB-B1E213891CC1}" srcOrd="2" destOrd="0" presId="urn:microsoft.com/office/officeart/2018/2/layout/IconVerticalSolidList"/>
+    <dgm:cxn modelId="{3ABC7A69-2AB8-401F-963C-1CE96DB244C2}" type="presParOf" srcId="{C19C1B83-3F35-4A1A-BCBF-F99838C761C4}" destId="{1A7DF329-A409-4BAF-8F0D-3F9C343A49AC}" srcOrd="3" destOrd="0" presId="urn:microsoft.com/office/officeart/2018/2/layout/IconVerticalSolidList"/>
+    <dgm:cxn modelId="{F5F51AD1-3812-4FB3-8C25-80B62B505EE5}" type="presParOf" srcId="{C19C1B83-3F35-4A1A-BCBF-F99838C761C4}" destId="{19BB6E5F-A11F-4FE3-AEB8-B88085F1369D}" srcOrd="4" destOrd="0" presId="urn:microsoft.com/office/officeart/2018/2/layout/IconVerticalSolidList"/>
+    <dgm:cxn modelId="{A1620564-6017-4508-94DF-49519462840B}" type="presParOf" srcId="{9DD21822-9758-4B04-A47E-E4FDF6BFB962}" destId="{96CAA459-6BCD-4D9C-B703-A2F2B816FDCE}" srcOrd="3" destOrd="0" presId="urn:microsoft.com/office/officeart/2018/2/layout/IconVerticalSolidList"/>
+    <dgm:cxn modelId="{7B21E5E8-CC35-4D28-80F2-5EE9C617CDF7}" type="presParOf" srcId="{9DD21822-9758-4B04-A47E-E4FDF6BFB962}" destId="{23B9F9DF-5EE2-4A09-BE85-49287BDEA1AF}" srcOrd="4" destOrd="0" presId="urn:microsoft.com/office/officeart/2018/2/layout/IconVerticalSolidList"/>
+    <dgm:cxn modelId="{DB7BE45A-3416-4605-A99A-D669766CEB11}" type="presParOf" srcId="{23B9F9DF-5EE2-4A09-BE85-49287BDEA1AF}" destId="{5BC17322-664E-430A-9DE3-79B4F5DBA3A2}" srcOrd="0" destOrd="0" presId="urn:microsoft.com/office/officeart/2018/2/layout/IconVerticalSolidList"/>
+    <dgm:cxn modelId="{CFAE451D-8E21-445B-98FE-B53C90A96043}" type="presParOf" srcId="{23B9F9DF-5EE2-4A09-BE85-49287BDEA1AF}" destId="{4E714C16-610A-4EAC-9CA3-85B784D28A60}" srcOrd="1" destOrd="0" presId="urn:microsoft.com/office/officeart/2018/2/layout/IconVerticalSolidList"/>
+    <dgm:cxn modelId="{F51F9D28-0954-4C2D-8073-85B6C99DEB28}" type="presParOf" srcId="{23B9F9DF-5EE2-4A09-BE85-49287BDEA1AF}" destId="{0BB9F754-03A9-4D92-9911-5129E2F105EA}" srcOrd="2" destOrd="0" presId="urn:microsoft.com/office/officeart/2018/2/layout/IconVerticalSolidList"/>
+    <dgm:cxn modelId="{49715CB3-4E65-4B85-897C-5AB6D6C0FD18}" type="presParOf" srcId="{23B9F9DF-5EE2-4A09-BE85-49287BDEA1AF}" destId="{88EC4FBD-33CF-4E29-B84B-84F4B64CF8E4}" srcOrd="3" destOrd="0" presId="urn:microsoft.com/office/officeart/2018/2/layout/IconVerticalSolidList"/>
+    <dgm:cxn modelId="{E1AA1956-772F-4730-BED7-CD4B1D25B9D5}" type="presParOf" srcId="{23B9F9DF-5EE2-4A09-BE85-49287BDEA1AF}" destId="{4C8A5F5E-11D5-49E8-9BA6-FB0C3E2EFC24}" srcOrd="4" destOrd="0" presId="urn:microsoft.com/office/officeart/2018/2/layout/IconVerticalSolidList"/>
+    <dgm:cxn modelId="{184E5C1C-78BF-4DA1-98FF-C0B233E292DD}" type="presParOf" srcId="{9DD21822-9758-4B04-A47E-E4FDF6BFB962}" destId="{7C26E420-E62C-4F77-8993-CB0AF528229E}" srcOrd="5" destOrd="0" presId="urn:microsoft.com/office/officeart/2018/2/layout/IconVerticalSolidList"/>
+    <dgm:cxn modelId="{CE55315E-4849-4EFF-8838-22C2C7A5C611}" type="presParOf" srcId="{9DD21822-9758-4B04-A47E-E4FDF6BFB962}" destId="{5C0351F8-3CF9-4889-A66A-91CEC5F8BB05}" srcOrd="6" destOrd="0" presId="urn:microsoft.com/office/officeart/2018/2/layout/IconVerticalSolidList"/>
+    <dgm:cxn modelId="{D3E7B66E-3B05-497B-9A1C-DA6613D22A7D}" type="presParOf" srcId="{5C0351F8-3CF9-4889-A66A-91CEC5F8BB05}" destId="{A7AD2A86-DF9E-4EBC-A99D-9D0C1CAEBA29}" srcOrd="0" destOrd="0" presId="urn:microsoft.com/office/officeart/2018/2/layout/IconVerticalSolidList"/>
+    <dgm:cxn modelId="{70FFE461-3978-43FB-A9EE-BC9CEB6E84F9}" type="presParOf" srcId="{5C0351F8-3CF9-4889-A66A-91CEC5F8BB05}" destId="{3E28EA8C-B93F-4E60-9D42-061C52DE82A0}" srcOrd="1" destOrd="0" presId="urn:microsoft.com/office/officeart/2018/2/layout/IconVerticalSolidList"/>
+    <dgm:cxn modelId="{67CE363F-EEB1-4569-8E6D-6760CB1764F7}" type="presParOf" srcId="{5C0351F8-3CF9-4889-A66A-91CEC5F8BB05}" destId="{DAC1E9EC-A73D-4DD2-B4DF-4ED0D819D715}" srcOrd="2" destOrd="0" presId="urn:microsoft.com/office/officeart/2018/2/layout/IconVerticalSolidList"/>
+    <dgm:cxn modelId="{A079711C-FF7E-459B-9183-02117729DE24}" type="presParOf" srcId="{5C0351F8-3CF9-4889-A66A-91CEC5F8BB05}" destId="{A4621C78-E2D9-40CB-8C00-F97A3C8E2E1F}" srcOrd="3" destOrd="0" presId="urn:microsoft.com/office/officeart/2018/2/layout/IconVerticalSolidList"/>
+    <dgm:cxn modelId="{F43BAF43-B003-43B6-B4F4-C3A9D3A10D44}" type="presParOf" srcId="{5C0351F8-3CF9-4889-A66A-91CEC5F8BB05}" destId="{D8A735C6-7C25-4D52-B3F8-E7243DD0AB54}" srcOrd="4" destOrd="0" presId="urn:microsoft.com/office/officeart/2018/2/layout/IconVerticalSolidList"/>
   </dgm:cxnLst>
   <dgm:bg/>
   <dgm:whole/>
@@ -8725,6 +10258,862 @@
 </dsp:drawing>
 </file>
 
+<file path=ppt/diagrams/drawing5.xml><?xml version="1.0" encoding="utf-8"?>
+<dsp:drawing xmlns:dgm="http://schemas.openxmlformats.org/drawingml/2006/diagram" xmlns:dsp="http://schemas.microsoft.com/office/drawing/2008/diagram" xmlns:a="http://schemas.openxmlformats.org/drawingml/2006/main">
+  <dsp:spTree>
+    <dsp:nvGrpSpPr>
+      <dsp:cNvPr id="0" name=""/>
+      <dsp:cNvGrpSpPr/>
+    </dsp:nvGrpSpPr>
+    <dsp:grpSpPr/>
+    <dsp:sp modelId="{985713DE-C205-4F79-9826-B0F5C8D54208}">
+      <dsp:nvSpPr>
+        <dsp:cNvPr id="0" name=""/>
+        <dsp:cNvSpPr/>
+      </dsp:nvSpPr>
+      <dsp:spPr>
+        <a:xfrm>
+          <a:off x="0" y="2185"/>
+          <a:ext cx="6832212" cy="1107454"/>
+        </a:xfrm>
+        <a:prstGeom prst="roundRect">
+          <a:avLst>
+            <a:gd name="adj" fmla="val 10000"/>
+          </a:avLst>
+        </a:prstGeom>
+        <a:solidFill>
+          <a:schemeClr val="bg1">
+            <a:lumMod val="95000"/>
+            <a:hueOff val="0"/>
+            <a:satOff val="0"/>
+            <a:lumOff val="0"/>
+            <a:alphaOff val="0"/>
+          </a:schemeClr>
+        </a:solidFill>
+        <a:ln>
+          <a:noFill/>
+        </a:ln>
+        <a:effectLst/>
+      </dsp:spPr>
+      <dsp:style>
+        <a:lnRef idx="0">
+          <a:scrgbClr r="0" g="0" b="0"/>
+        </a:lnRef>
+        <a:fillRef idx="1">
+          <a:scrgbClr r="0" g="0" b="0"/>
+        </a:fillRef>
+        <a:effectRef idx="0">
+          <a:scrgbClr r="0" g="0" b="0"/>
+        </a:effectRef>
+        <a:fontRef idx="minor"/>
+      </dsp:style>
+    </dsp:sp>
+    <dsp:sp modelId="{02C1128D-2DD9-409D-B8B1-8167D1418CB9}">
+      <dsp:nvSpPr>
+        <dsp:cNvPr id="0" name=""/>
+        <dsp:cNvSpPr/>
+      </dsp:nvSpPr>
+      <dsp:spPr>
+        <a:xfrm>
+          <a:off x="335004" y="251362"/>
+          <a:ext cx="609099" cy="609099"/>
+        </a:xfrm>
+        <a:prstGeom prst="rect">
+          <a:avLst/>
+        </a:prstGeom>
+        <a:blipFill>
+          <a:blip xmlns:r="http://schemas.openxmlformats.org/officeDocument/2006/relationships" r:embed="rId1">
+            <a:extLst>
+              <a:ext uri="{28A0092B-C50C-407E-A947-70E740481C1C}">
+                <a14:useLocalDpi xmlns:a14="http://schemas.microsoft.com/office/drawing/2010/main" val="0"/>
+              </a:ext>
+              <a:ext uri="{96DAC541-7B7A-43D3-8B79-37D633B846F1}">
+                <asvg:svgBlip xmlns:asvg="http://schemas.microsoft.com/office/drawing/2016/SVG/main" r:embed="rId2"/>
+              </a:ext>
+            </a:extLst>
+          </a:blip>
+          <a:stretch>
+            <a:fillRect/>
+          </a:stretch>
+        </a:blipFill>
+        <a:ln w="15875" cap="rnd" cmpd="sng" algn="ctr">
+          <a:noFill/>
+          <a:prstDash val="solid"/>
+        </a:ln>
+        <a:effectLst/>
+      </dsp:spPr>
+      <dsp:style>
+        <a:lnRef idx="2">
+          <a:scrgbClr r="0" g="0" b="0"/>
+        </a:lnRef>
+        <a:fillRef idx="1">
+          <a:scrgbClr r="0" g="0" b="0"/>
+        </a:fillRef>
+        <a:effectRef idx="0">
+          <a:scrgbClr r="0" g="0" b="0"/>
+        </a:effectRef>
+        <a:fontRef idx="minor">
+          <a:schemeClr val="lt1"/>
+        </a:fontRef>
+      </dsp:style>
+    </dsp:sp>
+    <dsp:sp modelId="{CB3B6849-DEA3-4216-A6A6-34D6A868D51A}">
+      <dsp:nvSpPr>
+        <dsp:cNvPr id="0" name=""/>
+        <dsp:cNvSpPr/>
+      </dsp:nvSpPr>
+      <dsp:spPr>
+        <a:xfrm>
+          <a:off x="1279109" y="2185"/>
+          <a:ext cx="3074495" cy="1107454"/>
+        </a:xfrm>
+        <a:prstGeom prst="rect">
+          <a:avLst/>
+        </a:prstGeom>
+        <a:noFill/>
+        <a:ln>
+          <a:noFill/>
+        </a:ln>
+        <a:effectLst/>
+      </dsp:spPr>
+      <dsp:style>
+        <a:lnRef idx="0">
+          <a:scrgbClr r="0" g="0" b="0"/>
+        </a:lnRef>
+        <a:fillRef idx="0">
+          <a:scrgbClr r="0" g="0" b="0"/>
+        </a:fillRef>
+        <a:effectRef idx="0">
+          <a:scrgbClr r="0" g="0" b="0"/>
+        </a:effectRef>
+        <a:fontRef idx="minor"/>
+      </dsp:style>
+      <dsp:txBody>
+        <a:bodyPr spcFirstLastPara="0" vert="horz" wrap="square" lIns="117206" tIns="117206" rIns="117206" bIns="117206" numCol="1" spcCol="1270" anchor="ctr" anchorCtr="0">
+          <a:noAutofit/>
+        </a:bodyPr>
+        <a:lstStyle/>
+        <a:p>
+          <a:pPr marL="0" lvl="0" indent="0" algn="l" defTabSz="977900">
+            <a:lnSpc>
+              <a:spcPct val="100000"/>
+            </a:lnSpc>
+            <a:spcBef>
+              <a:spcPct val="0"/>
+            </a:spcBef>
+            <a:spcAft>
+              <a:spcPct val="35000"/>
+            </a:spcAft>
+            <a:buNone/>
+          </a:pPr>
+          <a:r>
+            <a:rPr lang="en-US" sz="2200" kern="1200" dirty="0"/>
+            <a:t>Identity</a:t>
+          </a:r>
+        </a:p>
+      </dsp:txBody>
+      <dsp:txXfrm>
+        <a:off x="1279109" y="2185"/>
+        <a:ext cx="3074495" cy="1107454"/>
+      </dsp:txXfrm>
+    </dsp:sp>
+    <dsp:sp modelId="{98845165-ADFA-4EF7-BA31-B4EA2AB33EB8}">
+      <dsp:nvSpPr>
+        <dsp:cNvPr id="0" name=""/>
+        <dsp:cNvSpPr/>
+      </dsp:nvSpPr>
+      <dsp:spPr>
+        <a:xfrm>
+          <a:off x="4353605" y="2185"/>
+          <a:ext cx="2478606" cy="1107454"/>
+        </a:xfrm>
+        <a:prstGeom prst="rect">
+          <a:avLst/>
+        </a:prstGeom>
+        <a:noFill/>
+        <a:ln>
+          <a:noFill/>
+        </a:ln>
+        <a:effectLst/>
+      </dsp:spPr>
+      <dsp:style>
+        <a:lnRef idx="0">
+          <a:scrgbClr r="0" g="0" b="0"/>
+        </a:lnRef>
+        <a:fillRef idx="0">
+          <a:scrgbClr r="0" g="0" b="0"/>
+        </a:fillRef>
+        <a:effectRef idx="0">
+          <a:scrgbClr r="0" g="0" b="0"/>
+        </a:effectRef>
+        <a:fontRef idx="minor"/>
+      </dsp:style>
+      <dsp:txBody>
+        <a:bodyPr spcFirstLastPara="0" vert="horz" wrap="square" lIns="117206" tIns="117206" rIns="117206" bIns="117206" numCol="1" spcCol="1270" anchor="ctr" anchorCtr="0">
+          <a:noAutofit/>
+        </a:bodyPr>
+        <a:lstStyle/>
+        <a:p>
+          <a:pPr marL="0" lvl="0" indent="0" algn="l" defTabSz="800100">
+            <a:lnSpc>
+              <a:spcPct val="100000"/>
+            </a:lnSpc>
+            <a:spcBef>
+              <a:spcPct val="0"/>
+            </a:spcBef>
+            <a:spcAft>
+              <a:spcPct val="35000"/>
+            </a:spcAft>
+            <a:buNone/>
+          </a:pPr>
+          <a:r>
+            <a:rPr lang="en-US" sz="1800" kern="1200" dirty="0"/>
+            <a:t>What is the threat or issue</a:t>
+          </a:r>
+        </a:p>
+      </dsp:txBody>
+      <dsp:txXfrm>
+        <a:off x="4353605" y="2185"/>
+        <a:ext cx="2478606" cy="1107454"/>
+      </dsp:txXfrm>
+    </dsp:sp>
+    <dsp:sp modelId="{C6606E59-EC18-47F7-91A1-39C6D267DCC6}">
+      <dsp:nvSpPr>
+        <dsp:cNvPr id="0" name=""/>
+        <dsp:cNvSpPr/>
+      </dsp:nvSpPr>
+      <dsp:spPr>
+        <a:xfrm>
+          <a:off x="0" y="1386503"/>
+          <a:ext cx="6832212" cy="1107454"/>
+        </a:xfrm>
+        <a:prstGeom prst="roundRect">
+          <a:avLst>
+            <a:gd name="adj" fmla="val 10000"/>
+          </a:avLst>
+        </a:prstGeom>
+        <a:solidFill>
+          <a:schemeClr val="bg1">
+            <a:lumMod val="95000"/>
+            <a:hueOff val="0"/>
+            <a:satOff val="0"/>
+            <a:lumOff val="0"/>
+            <a:alphaOff val="0"/>
+          </a:schemeClr>
+        </a:solidFill>
+        <a:ln>
+          <a:noFill/>
+        </a:ln>
+        <a:effectLst/>
+      </dsp:spPr>
+      <dsp:style>
+        <a:lnRef idx="0">
+          <a:scrgbClr r="0" g="0" b="0"/>
+        </a:lnRef>
+        <a:fillRef idx="1">
+          <a:scrgbClr r="0" g="0" b="0"/>
+        </a:fillRef>
+        <a:effectRef idx="0">
+          <a:scrgbClr r="0" g="0" b="0"/>
+        </a:effectRef>
+        <a:fontRef idx="minor"/>
+      </dsp:style>
+    </dsp:sp>
+    <dsp:sp modelId="{82E307B5-82C0-40DF-AA53-F9B3B9A2ED12}">
+      <dsp:nvSpPr>
+        <dsp:cNvPr id="0" name=""/>
+        <dsp:cNvSpPr/>
+      </dsp:nvSpPr>
+      <dsp:spPr>
+        <a:xfrm>
+          <a:off x="335004" y="1635680"/>
+          <a:ext cx="609099" cy="609099"/>
+        </a:xfrm>
+        <a:prstGeom prst="rect">
+          <a:avLst/>
+        </a:prstGeom>
+        <a:blipFill>
+          <a:blip xmlns:r="http://schemas.openxmlformats.org/officeDocument/2006/relationships" r:embed="rId3">
+            <a:extLst>
+              <a:ext uri="{28A0092B-C50C-407E-A947-70E740481C1C}">
+                <a14:useLocalDpi xmlns:a14="http://schemas.microsoft.com/office/drawing/2010/main" val="0"/>
+              </a:ext>
+              <a:ext uri="{96DAC541-7B7A-43D3-8B79-37D633B846F1}">
+                <asvg:svgBlip xmlns:asvg="http://schemas.microsoft.com/office/drawing/2016/SVG/main" r:embed="rId4"/>
+              </a:ext>
+            </a:extLst>
+          </a:blip>
+          <a:stretch>
+            <a:fillRect/>
+          </a:stretch>
+        </a:blipFill>
+        <a:ln w="15875" cap="rnd" cmpd="sng" algn="ctr">
+          <a:noFill/>
+          <a:prstDash val="solid"/>
+        </a:ln>
+        <a:effectLst/>
+      </dsp:spPr>
+      <dsp:style>
+        <a:lnRef idx="2">
+          <a:scrgbClr r="0" g="0" b="0"/>
+        </a:lnRef>
+        <a:fillRef idx="1">
+          <a:scrgbClr r="0" g="0" b="0"/>
+        </a:fillRef>
+        <a:effectRef idx="0">
+          <a:scrgbClr r="0" g="0" b="0"/>
+        </a:effectRef>
+        <a:fontRef idx="minor">
+          <a:schemeClr val="lt1"/>
+        </a:fontRef>
+      </dsp:style>
+    </dsp:sp>
+    <dsp:sp modelId="{1A7DF329-A409-4BAF-8F0D-3F9C343A49AC}">
+      <dsp:nvSpPr>
+        <dsp:cNvPr id="0" name=""/>
+        <dsp:cNvSpPr/>
+      </dsp:nvSpPr>
+      <dsp:spPr>
+        <a:xfrm>
+          <a:off x="1279109" y="1386503"/>
+          <a:ext cx="3074495" cy="1107454"/>
+        </a:xfrm>
+        <a:prstGeom prst="rect">
+          <a:avLst/>
+        </a:prstGeom>
+        <a:noFill/>
+        <a:ln>
+          <a:noFill/>
+        </a:ln>
+        <a:effectLst/>
+      </dsp:spPr>
+      <dsp:style>
+        <a:lnRef idx="0">
+          <a:scrgbClr r="0" g="0" b="0"/>
+        </a:lnRef>
+        <a:fillRef idx="0">
+          <a:scrgbClr r="0" g="0" b="0"/>
+        </a:fillRef>
+        <a:effectRef idx="0">
+          <a:scrgbClr r="0" g="0" b="0"/>
+        </a:effectRef>
+        <a:fontRef idx="minor"/>
+      </dsp:style>
+      <dsp:txBody>
+        <a:bodyPr spcFirstLastPara="0" vert="horz" wrap="square" lIns="117206" tIns="117206" rIns="117206" bIns="117206" numCol="1" spcCol="1270" anchor="ctr" anchorCtr="0">
+          <a:noAutofit/>
+        </a:bodyPr>
+        <a:lstStyle/>
+        <a:p>
+          <a:pPr marL="0" lvl="0" indent="0" algn="l" defTabSz="977900">
+            <a:lnSpc>
+              <a:spcPct val="100000"/>
+            </a:lnSpc>
+            <a:spcBef>
+              <a:spcPct val="0"/>
+            </a:spcBef>
+            <a:spcAft>
+              <a:spcPct val="35000"/>
+            </a:spcAft>
+            <a:buNone/>
+          </a:pPr>
+          <a:r>
+            <a:rPr lang="en-US" sz="2200" kern="1200" dirty="0"/>
+            <a:t>Plan</a:t>
+          </a:r>
+        </a:p>
+      </dsp:txBody>
+      <dsp:txXfrm>
+        <a:off x="1279109" y="1386503"/>
+        <a:ext cx="3074495" cy="1107454"/>
+      </dsp:txXfrm>
+    </dsp:sp>
+    <dsp:sp modelId="{19BB6E5F-A11F-4FE3-AEB8-B88085F1369D}">
+      <dsp:nvSpPr>
+        <dsp:cNvPr id="0" name=""/>
+        <dsp:cNvSpPr/>
+      </dsp:nvSpPr>
+      <dsp:spPr>
+        <a:xfrm>
+          <a:off x="4353605" y="1386503"/>
+          <a:ext cx="2478606" cy="1107454"/>
+        </a:xfrm>
+        <a:prstGeom prst="rect">
+          <a:avLst/>
+        </a:prstGeom>
+        <a:noFill/>
+        <a:ln>
+          <a:noFill/>
+        </a:ln>
+        <a:effectLst/>
+      </dsp:spPr>
+      <dsp:style>
+        <a:lnRef idx="0">
+          <a:scrgbClr r="0" g="0" b="0"/>
+        </a:lnRef>
+        <a:fillRef idx="0">
+          <a:scrgbClr r="0" g="0" b="0"/>
+        </a:fillRef>
+        <a:effectRef idx="0">
+          <a:scrgbClr r="0" g="0" b="0"/>
+        </a:effectRef>
+        <a:fontRef idx="minor"/>
+      </dsp:style>
+      <dsp:txBody>
+        <a:bodyPr spcFirstLastPara="0" vert="horz" wrap="square" lIns="117206" tIns="117206" rIns="117206" bIns="117206" numCol="1" spcCol="1270" anchor="ctr" anchorCtr="0">
+          <a:noAutofit/>
+        </a:bodyPr>
+        <a:lstStyle/>
+        <a:p>
+          <a:pPr marL="0" lvl="0" indent="0" algn="l" defTabSz="800100">
+            <a:lnSpc>
+              <a:spcPct val="100000"/>
+            </a:lnSpc>
+            <a:spcBef>
+              <a:spcPct val="0"/>
+            </a:spcBef>
+            <a:spcAft>
+              <a:spcPct val="35000"/>
+            </a:spcAft>
+            <a:buNone/>
+          </a:pPr>
+          <a:r>
+            <a:rPr lang="en-US" sz="1800" kern="1200" dirty="0"/>
+            <a:t>Determine appropriate responses</a:t>
+          </a:r>
+        </a:p>
+      </dsp:txBody>
+      <dsp:txXfrm>
+        <a:off x="4353605" y="1386503"/>
+        <a:ext cx="2478606" cy="1107454"/>
+      </dsp:txXfrm>
+    </dsp:sp>
+    <dsp:sp modelId="{5BC17322-664E-430A-9DE3-79B4F5DBA3A2}">
+      <dsp:nvSpPr>
+        <dsp:cNvPr id="0" name=""/>
+        <dsp:cNvSpPr/>
+      </dsp:nvSpPr>
+      <dsp:spPr>
+        <a:xfrm>
+          <a:off x="0" y="2770821"/>
+          <a:ext cx="6832212" cy="1107454"/>
+        </a:xfrm>
+        <a:prstGeom prst="roundRect">
+          <a:avLst>
+            <a:gd name="adj" fmla="val 10000"/>
+          </a:avLst>
+        </a:prstGeom>
+        <a:solidFill>
+          <a:schemeClr val="bg1">
+            <a:lumMod val="95000"/>
+            <a:hueOff val="0"/>
+            <a:satOff val="0"/>
+            <a:lumOff val="0"/>
+            <a:alphaOff val="0"/>
+          </a:schemeClr>
+        </a:solidFill>
+        <a:ln>
+          <a:noFill/>
+        </a:ln>
+        <a:effectLst/>
+      </dsp:spPr>
+      <dsp:style>
+        <a:lnRef idx="0">
+          <a:scrgbClr r="0" g="0" b="0"/>
+        </a:lnRef>
+        <a:fillRef idx="1">
+          <a:scrgbClr r="0" g="0" b="0"/>
+        </a:fillRef>
+        <a:effectRef idx="0">
+          <a:scrgbClr r="0" g="0" b="0"/>
+        </a:effectRef>
+        <a:fontRef idx="minor"/>
+      </dsp:style>
+    </dsp:sp>
+    <dsp:sp modelId="{4E714C16-610A-4EAC-9CA3-85B784D28A60}">
+      <dsp:nvSpPr>
+        <dsp:cNvPr id="0" name=""/>
+        <dsp:cNvSpPr/>
+      </dsp:nvSpPr>
+      <dsp:spPr>
+        <a:xfrm>
+          <a:off x="335004" y="3019998"/>
+          <a:ext cx="609099" cy="609099"/>
+        </a:xfrm>
+        <a:prstGeom prst="rect">
+          <a:avLst/>
+        </a:prstGeom>
+        <a:blipFill>
+          <a:blip xmlns:r="http://schemas.openxmlformats.org/officeDocument/2006/relationships" r:embed="rId5">
+            <a:extLst>
+              <a:ext uri="{28A0092B-C50C-407E-A947-70E740481C1C}">
+                <a14:useLocalDpi xmlns:a14="http://schemas.microsoft.com/office/drawing/2010/main" val="0"/>
+              </a:ext>
+              <a:ext uri="{96DAC541-7B7A-43D3-8B79-37D633B846F1}">
+                <asvg:svgBlip xmlns:asvg="http://schemas.microsoft.com/office/drawing/2016/SVG/main" r:embed="rId6"/>
+              </a:ext>
+            </a:extLst>
+          </a:blip>
+          <a:stretch>
+            <a:fillRect/>
+          </a:stretch>
+        </a:blipFill>
+        <a:ln w="15875" cap="rnd" cmpd="sng" algn="ctr">
+          <a:noFill/>
+          <a:prstDash val="solid"/>
+        </a:ln>
+        <a:effectLst/>
+      </dsp:spPr>
+      <dsp:style>
+        <a:lnRef idx="2">
+          <a:scrgbClr r="0" g="0" b="0"/>
+        </a:lnRef>
+        <a:fillRef idx="1">
+          <a:scrgbClr r="0" g="0" b="0"/>
+        </a:fillRef>
+        <a:effectRef idx="0">
+          <a:scrgbClr r="0" g="0" b="0"/>
+        </a:effectRef>
+        <a:fontRef idx="minor">
+          <a:schemeClr val="lt1"/>
+        </a:fontRef>
+      </dsp:style>
+    </dsp:sp>
+    <dsp:sp modelId="{88EC4FBD-33CF-4E29-B84B-84F4B64CF8E4}">
+      <dsp:nvSpPr>
+        <dsp:cNvPr id="0" name=""/>
+        <dsp:cNvSpPr/>
+      </dsp:nvSpPr>
+      <dsp:spPr>
+        <a:xfrm>
+          <a:off x="1279109" y="2770821"/>
+          <a:ext cx="3074495" cy="1107454"/>
+        </a:xfrm>
+        <a:prstGeom prst="rect">
+          <a:avLst/>
+        </a:prstGeom>
+        <a:noFill/>
+        <a:ln>
+          <a:noFill/>
+        </a:ln>
+        <a:effectLst/>
+      </dsp:spPr>
+      <dsp:style>
+        <a:lnRef idx="0">
+          <a:scrgbClr r="0" g="0" b="0"/>
+        </a:lnRef>
+        <a:fillRef idx="0">
+          <a:scrgbClr r="0" g="0" b="0"/>
+        </a:fillRef>
+        <a:effectRef idx="0">
+          <a:scrgbClr r="0" g="0" b="0"/>
+        </a:effectRef>
+        <a:fontRef idx="minor"/>
+      </dsp:style>
+      <dsp:txBody>
+        <a:bodyPr spcFirstLastPara="0" vert="horz" wrap="square" lIns="117206" tIns="117206" rIns="117206" bIns="117206" numCol="1" spcCol="1270" anchor="ctr" anchorCtr="0">
+          <a:noAutofit/>
+        </a:bodyPr>
+        <a:lstStyle/>
+        <a:p>
+          <a:pPr marL="0" lvl="0" indent="0" algn="l" defTabSz="977900">
+            <a:lnSpc>
+              <a:spcPct val="100000"/>
+            </a:lnSpc>
+            <a:spcBef>
+              <a:spcPct val="0"/>
+            </a:spcBef>
+            <a:spcAft>
+              <a:spcPct val="35000"/>
+            </a:spcAft>
+            <a:buNone/>
+          </a:pPr>
+          <a:r>
+            <a:rPr lang="en-US" sz="2200" kern="1200" dirty="0"/>
+            <a:t>Act</a:t>
+          </a:r>
+        </a:p>
+      </dsp:txBody>
+      <dsp:txXfrm>
+        <a:off x="1279109" y="2770821"/>
+        <a:ext cx="3074495" cy="1107454"/>
+      </dsp:txXfrm>
+    </dsp:sp>
+    <dsp:sp modelId="{4C8A5F5E-11D5-49E8-9BA6-FB0C3E2EFC24}">
+      <dsp:nvSpPr>
+        <dsp:cNvPr id="0" name=""/>
+        <dsp:cNvSpPr/>
+      </dsp:nvSpPr>
+      <dsp:spPr>
+        <a:xfrm>
+          <a:off x="4353605" y="2770821"/>
+          <a:ext cx="2478606" cy="1107454"/>
+        </a:xfrm>
+        <a:prstGeom prst="rect">
+          <a:avLst/>
+        </a:prstGeom>
+        <a:noFill/>
+        <a:ln>
+          <a:noFill/>
+        </a:ln>
+        <a:effectLst/>
+      </dsp:spPr>
+      <dsp:style>
+        <a:lnRef idx="0">
+          <a:scrgbClr r="0" g="0" b="0"/>
+        </a:lnRef>
+        <a:fillRef idx="0">
+          <a:scrgbClr r="0" g="0" b="0"/>
+        </a:fillRef>
+        <a:effectRef idx="0">
+          <a:scrgbClr r="0" g="0" b="0"/>
+        </a:effectRef>
+        <a:fontRef idx="minor"/>
+      </dsp:style>
+      <dsp:txBody>
+        <a:bodyPr spcFirstLastPara="0" vert="horz" wrap="square" lIns="117206" tIns="117206" rIns="117206" bIns="117206" numCol="1" spcCol="1270" anchor="ctr" anchorCtr="0">
+          <a:noAutofit/>
+        </a:bodyPr>
+        <a:lstStyle/>
+        <a:p>
+          <a:pPr marL="0" lvl="0" indent="0" algn="l" defTabSz="800100">
+            <a:lnSpc>
+              <a:spcPct val="100000"/>
+            </a:lnSpc>
+            <a:spcBef>
+              <a:spcPct val="0"/>
+            </a:spcBef>
+            <a:spcAft>
+              <a:spcPct val="35000"/>
+            </a:spcAft>
+            <a:buNone/>
+          </a:pPr>
+          <a:r>
+            <a:rPr lang="en-US" sz="1800" kern="1200" dirty="0"/>
+            <a:t>Implement the plan</a:t>
+          </a:r>
+        </a:p>
+      </dsp:txBody>
+      <dsp:txXfrm>
+        <a:off x="4353605" y="2770821"/>
+        <a:ext cx="2478606" cy="1107454"/>
+      </dsp:txXfrm>
+    </dsp:sp>
+    <dsp:sp modelId="{A7AD2A86-DF9E-4EBC-A99D-9D0C1CAEBA29}">
+      <dsp:nvSpPr>
+        <dsp:cNvPr id="0" name=""/>
+        <dsp:cNvSpPr/>
+      </dsp:nvSpPr>
+      <dsp:spPr>
+        <a:xfrm>
+          <a:off x="0" y="4155139"/>
+          <a:ext cx="6832212" cy="1107454"/>
+        </a:xfrm>
+        <a:prstGeom prst="roundRect">
+          <a:avLst>
+            <a:gd name="adj" fmla="val 10000"/>
+          </a:avLst>
+        </a:prstGeom>
+        <a:solidFill>
+          <a:schemeClr val="bg1">
+            <a:lumMod val="95000"/>
+            <a:hueOff val="0"/>
+            <a:satOff val="0"/>
+            <a:lumOff val="0"/>
+            <a:alphaOff val="0"/>
+          </a:schemeClr>
+        </a:solidFill>
+        <a:ln>
+          <a:noFill/>
+        </a:ln>
+        <a:effectLst/>
+      </dsp:spPr>
+      <dsp:style>
+        <a:lnRef idx="0">
+          <a:scrgbClr r="0" g="0" b="0"/>
+        </a:lnRef>
+        <a:fillRef idx="1">
+          <a:scrgbClr r="0" g="0" b="0"/>
+        </a:fillRef>
+        <a:effectRef idx="0">
+          <a:scrgbClr r="0" g="0" b="0"/>
+        </a:effectRef>
+        <a:fontRef idx="minor"/>
+      </dsp:style>
+    </dsp:sp>
+    <dsp:sp modelId="{3E28EA8C-B93F-4E60-9D42-061C52DE82A0}">
+      <dsp:nvSpPr>
+        <dsp:cNvPr id="0" name=""/>
+        <dsp:cNvSpPr/>
+      </dsp:nvSpPr>
+      <dsp:spPr>
+        <a:xfrm>
+          <a:off x="335004" y="4404316"/>
+          <a:ext cx="609099" cy="609099"/>
+        </a:xfrm>
+        <a:prstGeom prst="rect">
+          <a:avLst/>
+        </a:prstGeom>
+        <a:blipFill>
+          <a:blip xmlns:r="http://schemas.openxmlformats.org/officeDocument/2006/relationships" r:embed="rId7">
+            <a:extLst>
+              <a:ext uri="{28A0092B-C50C-407E-A947-70E740481C1C}">
+                <a14:useLocalDpi xmlns:a14="http://schemas.microsoft.com/office/drawing/2010/main" val="0"/>
+              </a:ext>
+              <a:ext uri="{96DAC541-7B7A-43D3-8B79-37D633B846F1}">
+                <asvg:svgBlip xmlns:asvg="http://schemas.microsoft.com/office/drawing/2016/SVG/main" r:embed="rId8"/>
+              </a:ext>
+            </a:extLst>
+          </a:blip>
+          <a:stretch>
+            <a:fillRect/>
+          </a:stretch>
+        </a:blipFill>
+        <a:ln w="15875" cap="rnd" cmpd="sng" algn="ctr">
+          <a:noFill/>
+          <a:prstDash val="solid"/>
+        </a:ln>
+        <a:effectLst/>
+      </dsp:spPr>
+      <dsp:style>
+        <a:lnRef idx="2">
+          <a:scrgbClr r="0" g="0" b="0"/>
+        </a:lnRef>
+        <a:fillRef idx="1">
+          <a:scrgbClr r="0" g="0" b="0"/>
+        </a:fillRef>
+        <a:effectRef idx="0">
+          <a:scrgbClr r="0" g="0" b="0"/>
+        </a:effectRef>
+        <a:fontRef idx="minor">
+          <a:schemeClr val="lt1"/>
+        </a:fontRef>
+      </dsp:style>
+    </dsp:sp>
+    <dsp:sp modelId="{A4621C78-E2D9-40CB-8C00-F97A3C8E2E1F}">
+      <dsp:nvSpPr>
+        <dsp:cNvPr id="0" name=""/>
+        <dsp:cNvSpPr/>
+      </dsp:nvSpPr>
+      <dsp:spPr>
+        <a:xfrm>
+          <a:off x="1279109" y="4155139"/>
+          <a:ext cx="3074495" cy="1107454"/>
+        </a:xfrm>
+        <a:prstGeom prst="rect">
+          <a:avLst/>
+        </a:prstGeom>
+        <a:noFill/>
+        <a:ln>
+          <a:noFill/>
+        </a:ln>
+        <a:effectLst/>
+      </dsp:spPr>
+      <dsp:style>
+        <a:lnRef idx="0">
+          <a:scrgbClr r="0" g="0" b="0"/>
+        </a:lnRef>
+        <a:fillRef idx="0">
+          <a:scrgbClr r="0" g="0" b="0"/>
+        </a:fillRef>
+        <a:effectRef idx="0">
+          <a:scrgbClr r="0" g="0" b="0"/>
+        </a:effectRef>
+        <a:fontRef idx="minor"/>
+      </dsp:style>
+      <dsp:txBody>
+        <a:bodyPr spcFirstLastPara="0" vert="horz" wrap="square" lIns="117206" tIns="117206" rIns="117206" bIns="117206" numCol="1" spcCol="1270" anchor="ctr" anchorCtr="0">
+          <a:noAutofit/>
+        </a:bodyPr>
+        <a:lstStyle/>
+        <a:p>
+          <a:pPr marL="0" lvl="0" indent="0" algn="l" defTabSz="977900">
+            <a:lnSpc>
+              <a:spcPct val="100000"/>
+            </a:lnSpc>
+            <a:spcBef>
+              <a:spcPct val="0"/>
+            </a:spcBef>
+            <a:spcAft>
+              <a:spcPct val="35000"/>
+            </a:spcAft>
+            <a:buNone/>
+          </a:pPr>
+          <a:r>
+            <a:rPr lang="en-US" sz="2200" kern="1200" dirty="0"/>
+            <a:t>Check</a:t>
+          </a:r>
+        </a:p>
+      </dsp:txBody>
+      <dsp:txXfrm>
+        <a:off x="1279109" y="4155139"/>
+        <a:ext cx="3074495" cy="1107454"/>
+      </dsp:txXfrm>
+    </dsp:sp>
+    <dsp:sp modelId="{D8A735C6-7C25-4D52-B3F8-E7243DD0AB54}">
+      <dsp:nvSpPr>
+        <dsp:cNvPr id="0" name=""/>
+        <dsp:cNvSpPr/>
+      </dsp:nvSpPr>
+      <dsp:spPr>
+        <a:xfrm>
+          <a:off x="4353605" y="4155139"/>
+          <a:ext cx="2478606" cy="1107454"/>
+        </a:xfrm>
+        <a:prstGeom prst="rect">
+          <a:avLst/>
+        </a:prstGeom>
+        <a:noFill/>
+        <a:ln>
+          <a:noFill/>
+        </a:ln>
+        <a:effectLst/>
+      </dsp:spPr>
+      <dsp:style>
+        <a:lnRef idx="0">
+          <a:scrgbClr r="0" g="0" b="0"/>
+        </a:lnRef>
+        <a:fillRef idx="0">
+          <a:scrgbClr r="0" g="0" b="0"/>
+        </a:fillRef>
+        <a:effectRef idx="0">
+          <a:scrgbClr r="0" g="0" b="0"/>
+        </a:effectRef>
+        <a:fontRef idx="minor"/>
+      </dsp:style>
+      <dsp:txBody>
+        <a:bodyPr spcFirstLastPara="0" vert="horz" wrap="square" lIns="117206" tIns="117206" rIns="117206" bIns="117206" numCol="1" spcCol="1270" anchor="ctr" anchorCtr="0">
+          <a:noAutofit/>
+        </a:bodyPr>
+        <a:lstStyle/>
+        <a:p>
+          <a:pPr marL="0" lvl="0" indent="0" algn="l" defTabSz="800100">
+            <a:lnSpc>
+              <a:spcPct val="100000"/>
+            </a:lnSpc>
+            <a:spcBef>
+              <a:spcPct val="0"/>
+            </a:spcBef>
+            <a:spcAft>
+              <a:spcPct val="35000"/>
+            </a:spcAft>
+            <a:buNone/>
+          </a:pPr>
+          <a:r>
+            <a:rPr lang="en-US" sz="1800" kern="1200" dirty="0"/>
+            <a:t>Confirm the response is sufficient</a:t>
+          </a:r>
+        </a:p>
+      </dsp:txBody>
+      <dsp:txXfrm>
+        <a:off x="4353605" y="4155139"/>
+        <a:ext cx="2478606" cy="1107454"/>
+      </dsp:txXfrm>
+    </dsp:sp>
+  </dsp:spTree>
+</dsp:drawing>
+</file>
+
 <file path=ppt/diagrams/layout1.xml><?xml version="1.0" encoding="utf-8"?>
 <dgm:layoutDef xmlns:dgm="http://schemas.openxmlformats.org/drawingml/2006/diagram" xmlns:a="http://schemas.openxmlformats.org/drawingml/2006/main" uniqueId="urn:microsoft.com/office/officeart/2005/8/layout/vList2">
   <dgm:title val=""/>
@@ -9786,6 +12175,300 @@
 </dgm:layoutDef>
 </file>
 
+<file path=ppt/diagrams/layout5.xml><?xml version="1.0" encoding="utf-8"?>
+<dgm:layoutDef xmlns:dgm="http://schemas.openxmlformats.org/drawingml/2006/diagram" xmlns:a="http://schemas.openxmlformats.org/drawingml/2006/main" uniqueId="urn:microsoft.com/office/officeart/2018/2/layout/IconVerticalSolidList">
+  <dgm:title val="Icon Vertical Solid List"/>
+  <dgm:desc val="Use to show a series of visuals from top to bottom with Level 1 or Level 1 and Level 2 text grouped in a shape. Works best with icons or small pictures with lengthier descriptions."/>
+  <dgm:catLst>
+    <dgm:cat type="icon" pri="500"/>
+  </dgm:catLst>
+  <dgm:sampData useDef="1">
+    <dgm:dataModel>
+      <dgm:ptLst/>
+      <dgm:bg/>
+      <dgm:whole/>
+    </dgm:dataModel>
+  </dgm:sampData>
+  <dgm:styleData useDef="1">
+    <dgm:dataModel>
+      <dgm:ptLst/>
+      <dgm:bg/>
+      <dgm:whole/>
+    </dgm:dataModel>
+  </dgm:styleData>
+  <dgm:clrData useDef="1">
+    <dgm:dataModel>
+      <dgm:ptLst/>
+      <dgm:bg/>
+      <dgm:whole/>
+    </dgm:dataModel>
+  </dgm:clrData>
+  <dgm:layoutNode name="root">
+    <dgm:varLst>
+      <dgm:dir/>
+      <dgm:resizeHandles val="exact"/>
+    </dgm:varLst>
+    <dgm:choose name="Name0">
+      <dgm:if name="Name1" axis="self" func="var" arg="dir" op="equ" val="norm">
+        <dgm:alg type="lin">
+          <dgm:param type="linDir" val="fromT"/>
+          <dgm:param type="nodeHorzAlign" val="l"/>
+        </dgm:alg>
+      </dgm:if>
+      <dgm:else name="Name2">
+        <dgm:alg type="lin">
+          <dgm:param type="linDir" val="fromT"/>
+          <dgm:param type="nodeHorzAlign" val="r"/>
+        </dgm:alg>
+      </dgm:else>
+    </dgm:choose>
+    <dgm:shape xmlns:r="http://schemas.openxmlformats.org/officeDocument/2006/relationships" r:blip="">
+      <dgm:adjLst/>
+    </dgm:shape>
+    <dgm:presOf/>
+    <dgm:choose name="Name3">
+      <dgm:if name="Name4" axis="ch" ptType="node" func="cnt" op="lte" val="3">
+        <dgm:constrLst>
+          <dgm:constr type="h" for="ch" forName="compNode" refType="h" fact="0.3"/>
+          <dgm:constr type="w" for="ch" forName="compNode" refType="w"/>
+          <dgm:constr type="h" for="ch" forName="sibTrans" refType="h" refFor="ch" refForName="compNode" fact="0.25"/>
+          <dgm:constr type="primFontSz" for="des" forName="parTx" val="25"/>
+          <dgm:constr type="primFontSz" for="des" forName="desTx" refType="primFontSz" refFor="des" refForName="parTx" op="lte" fact="0.75"/>
+          <dgm:constr type="h" for="des" forName="compNode" op="equ"/>
+          <dgm:constr type="h" for="des" forName="bgRect" op="equ"/>
+          <dgm:constr type="h" for="des" forName="iconRect" op="equ"/>
+          <dgm:constr type="w" for="des" forName="iconRect" op="equ"/>
+          <dgm:constr type="h" for="des" forName="spaceRect" op="equ"/>
+          <dgm:constr type="h" for="des" forName="parTx" op="equ"/>
+          <dgm:constr type="h" for="des" forName="desTx" op="equ"/>
+        </dgm:constrLst>
+      </dgm:if>
+      <dgm:if name="Name5" axis="ch" ptType="node" func="cnt" op="lte" val="4">
+        <dgm:constrLst>
+          <dgm:constr type="h" for="ch" forName="compNode" refType="h" fact="0.3"/>
+          <dgm:constr type="w" for="ch" forName="compNode" refType="w"/>
+          <dgm:constr type="h" for="ch" forName="sibTrans" refType="h" refFor="ch" refForName="compNode" fact="0.25"/>
+          <dgm:constr type="primFontSz" for="des" forName="parTx" val="22"/>
+          <dgm:constr type="primFontSz" for="des" forName="desTx" refType="primFontSz" refFor="des" refForName="parTx" op="lte" fact="0.75"/>
+          <dgm:constr type="h" for="des" forName="compNode" op="equ"/>
+          <dgm:constr type="h" for="des" forName="bgRect" op="equ"/>
+          <dgm:constr type="h" for="des" forName="iconRect" op="equ"/>
+          <dgm:constr type="w" for="des" forName="iconRect" op="equ"/>
+          <dgm:constr type="h" for="des" forName="spaceRect" op="equ"/>
+          <dgm:constr type="h" for="des" forName="parTx" op="equ"/>
+          <dgm:constr type="h" for="des" forName="desTx" op="equ"/>
+        </dgm:constrLst>
+      </dgm:if>
+      <dgm:if name="Name6" axis="ch" ptType="node" func="cnt" op="lte" val="6">
+        <dgm:constrLst>
+          <dgm:constr type="h" for="ch" forName="compNode" refType="h" fact="0.3"/>
+          <dgm:constr type="w" for="ch" forName="compNode" refType="w"/>
+          <dgm:constr type="h" for="ch" forName="sibTrans" refType="h" refFor="ch" refForName="compNode" fact="0.25"/>
+          <dgm:constr type="primFontSz" for="des" forName="parTx" val="19"/>
+          <dgm:constr type="primFontSz" for="des" forName="desTx" refType="primFontSz" refFor="des" refForName="parTx" op="lte" fact="0.75"/>
+          <dgm:constr type="h" for="des" forName="compNode" op="equ"/>
+          <dgm:constr type="h" for="des" forName="bgRect" op="equ"/>
+          <dgm:constr type="h" for="des" forName="iconRect" op="equ"/>
+          <dgm:constr type="w" for="des" forName="iconRect" op="equ"/>
+          <dgm:constr type="h" for="des" forName="spaceRect" op="equ"/>
+          <dgm:constr type="h" for="des" forName="parTx" op="equ"/>
+          <dgm:constr type="h" for="des" forName="desTx" op="equ"/>
+        </dgm:constrLst>
+      </dgm:if>
+      <dgm:else name="Name7">
+        <dgm:constrLst>
+          <dgm:constr type="h" for="ch" forName="compNode" refType="h" fact="0.3"/>
+          <dgm:constr type="w" for="ch" forName="compNode" refType="w"/>
+          <dgm:constr type="h" for="ch" forName="sibTrans" refType="h" refFor="ch" refForName="compNode" fact="0.25"/>
+          <dgm:constr type="primFontSz" for="des" forName="parTx" val="16"/>
+          <dgm:constr type="primFontSz" for="des" forName="desTx" refType="primFontSz" refFor="des" refForName="parTx" op="lte" fact="0.75"/>
+          <dgm:constr type="h" for="des" forName="compNode" op="equ"/>
+          <dgm:constr type="h" for="des" forName="bgRect" op="equ"/>
+          <dgm:constr type="h" for="des" forName="iconRect" op="equ"/>
+          <dgm:constr type="w" for="des" forName="iconRect" op="equ"/>
+          <dgm:constr type="h" for="des" forName="spaceRect" op="equ"/>
+          <dgm:constr type="h" for="des" forName="parTx" op="equ"/>
+          <dgm:constr type="h" for="des" forName="desTx" op="equ"/>
+        </dgm:constrLst>
+      </dgm:else>
+    </dgm:choose>
+    <dgm:ruleLst>
+      <dgm:rule type="h" for="ch" forName="compNode" val="0" fact="NaN" max="NaN"/>
+    </dgm:ruleLst>
+    <dgm:forEach name="Name8" axis="ch" ptType="node">
+      <dgm:layoutNode name="compNode">
+        <dgm:alg type="composite"/>
+        <dgm:shape xmlns:r="http://schemas.openxmlformats.org/officeDocument/2006/relationships" r:blip="">
+          <dgm:adjLst/>
+        </dgm:shape>
+        <dgm:presOf axis="self"/>
+        <dgm:choose name="Name9">
+          <dgm:if name="Name10" axis="ch" ptType="node" func="cnt" op="gte" val="1">
+            <dgm:constrLst>
+              <dgm:constr type="w" for="ch" forName="bgRect" refType="w"/>
+              <dgm:constr type="h" for="ch" forName="bgRect" refType="h"/>
+              <dgm:constr type="l" for="ch" forName="bgRect"/>
+              <dgm:constr type="t" for="ch" forName="bgRect"/>
+              <dgm:constr type="h" for="ch" forName="iconRect" refType="h" fact="0.55"/>
+              <dgm:constr type="w" for="ch" forName="iconRect" refType="h" refFor="ch" refForName="iconRect"/>
+              <dgm:constr type="l" for="ch" forName="iconRect" refType="h" refFor="ch" refForName="iconRect" fact="0.55"/>
+              <dgm:constr type="ctrY" for="ch" forName="iconRect" refType="ctrY" refFor="ch" refForName="bgRect"/>
+              <dgm:constr type="w" for="ch" forName="spaceRect" refType="l" refFor="ch" refForName="iconRect"/>
+              <dgm:constr type="h" for="ch" forName="spaceRect" refType="h"/>
+              <dgm:constr type="l" for="ch" forName="spaceRect" refType="r" refFor="ch" refForName="iconRect"/>
+              <dgm:constr type="t" for="ch" forName="spaceRect"/>
+              <dgm:constr type="w" for="ch" forName="parTx" refType="w" fact="0.45"/>
+              <dgm:constr type="h" for="ch" forName="parTx" refType="h"/>
+              <dgm:constr type="l" for="ch" forName="parTx" refType="r" refFor="ch" refForName="spaceRect"/>
+              <dgm:constr type="t" for="ch" forName="parTx"/>
+              <dgm:constr type="h" for="ch" forName="desTx" refType="h"/>
+              <dgm:constr type="l" for="ch" forName="desTx" refType="r" refFor="ch" refForName="parTx"/>
+              <dgm:constr type="t" for="ch" forName="desTx"/>
+            </dgm:constrLst>
+          </dgm:if>
+          <dgm:else name="Name11">
+            <dgm:constrLst>
+              <dgm:constr type="w" for="ch" forName="bgRect" refType="w"/>
+              <dgm:constr type="h" for="ch" forName="bgRect" refType="h"/>
+              <dgm:constr type="l" for="ch" forName="bgRect"/>
+              <dgm:constr type="t" for="ch" forName="bgRect"/>
+              <dgm:constr type="h" for="ch" forName="iconRect" refType="h" fact="0.55"/>
+              <dgm:constr type="w" for="ch" forName="iconRect" refType="h" refFor="ch" refForName="iconRect"/>
+              <dgm:constr type="l" for="ch" forName="iconRect" refType="h" refFor="ch" refForName="iconRect" fact="0.55"/>
+              <dgm:constr type="ctrY" for="ch" forName="iconRect" refType="ctrY" refFor="ch" refForName="bgRect"/>
+              <dgm:constr type="w" for="ch" forName="spaceRect" refType="l" refFor="ch" refForName="iconRect"/>
+              <dgm:constr type="h" for="ch" forName="spaceRect" refType="h"/>
+              <dgm:constr type="l" for="ch" forName="spaceRect" refType="r" refFor="ch" refForName="iconRect"/>
+              <dgm:constr type="t" for="ch" forName="spaceRect"/>
+              <dgm:constr type="h" for="ch" forName="parTx" refType="h"/>
+              <dgm:constr type="l" for="ch" forName="parTx" refType="r" refFor="ch" refForName="spaceRect"/>
+              <dgm:constr type="t" for="ch" forName="parTx"/>
+            </dgm:constrLst>
+          </dgm:else>
+        </dgm:choose>
+        <dgm:ruleLst>
+          <dgm:rule type="h" val="INF" fact="NaN" max="NaN"/>
+        </dgm:ruleLst>
+        <dgm:layoutNode name="bgRect" styleLbl="bgShp">
+          <dgm:alg type="sp"/>
+          <dgm:shape xmlns:r="http://schemas.openxmlformats.org/officeDocument/2006/relationships" type="roundRect" r:blip="">
+            <dgm:adjLst>
+              <dgm:adj idx="1" val="0.1"/>
+            </dgm:adjLst>
+          </dgm:shape>
+          <dgm:presOf/>
+          <dgm:constrLst/>
+          <dgm:ruleLst/>
+        </dgm:layoutNode>
+        <dgm:layoutNode name="iconRect" styleLbl="node1">
+          <dgm:alg type="sp"/>
+          <dgm:shape xmlns:r="http://schemas.openxmlformats.org/officeDocument/2006/relationships" type="rect" r:blip="" blipPhldr="1">
+            <dgm:adjLst/>
+          </dgm:shape>
+          <dgm:presOf/>
+          <dgm:constrLst/>
+          <dgm:ruleLst/>
+        </dgm:layoutNode>
+        <dgm:layoutNode name="spaceRect">
+          <dgm:alg type="sp"/>
+          <dgm:shape xmlns:r="http://schemas.openxmlformats.org/officeDocument/2006/relationships" r:blip="">
+            <dgm:adjLst/>
+          </dgm:shape>
+          <dgm:presOf/>
+          <dgm:constrLst/>
+          <dgm:ruleLst/>
+        </dgm:layoutNode>
+        <dgm:layoutNode name="parTx" styleLbl="revTx">
+          <dgm:varLst>
+            <dgm:chMax val="0"/>
+            <dgm:chPref val="0"/>
+          </dgm:varLst>
+          <dgm:alg type="tx">
+            <dgm:param type="txAnchorVert" val="mid"/>
+            <dgm:param type="parTxLTRAlign" val="l"/>
+            <dgm:param type="shpTxLTRAlignCh" val="l"/>
+            <dgm:param type="parTxRTLAlign" val="r"/>
+            <dgm:param type="shpTxRTLAlignCh" val="r"/>
+          </dgm:alg>
+          <dgm:shape xmlns:r="http://schemas.openxmlformats.org/officeDocument/2006/relationships" type="rect" r:blip="">
+            <dgm:adjLst/>
+          </dgm:shape>
+          <dgm:presOf axis="self" ptType="node"/>
+          <dgm:constrLst>
+            <dgm:constr type="lMarg" refType="h" fact="0.3"/>
+            <dgm:constr type="rMarg" refType="h" fact="0.3"/>
+            <dgm:constr type="tMarg" refType="h" fact="0.3"/>
+            <dgm:constr type="bMarg" refType="h" fact="0.3"/>
+          </dgm:constrLst>
+          <dgm:ruleLst>
+            <dgm:rule type="primFontSz" val="14" fact="NaN" max="NaN"/>
+            <dgm:rule type="h" val="INF" fact="NaN" max="NaN"/>
+          </dgm:ruleLst>
+        </dgm:layoutNode>
+        <dgm:choose name="Name12">
+          <dgm:if name="Name13" axis="ch" ptType="node" func="cnt" op="gte" val="1">
+            <dgm:layoutNode name="desTx" styleLbl="revTx">
+              <dgm:varLst/>
+              <dgm:alg type="tx">
+                <dgm:param type="txAnchorVertCh" val="mid"/>
+                <dgm:param type="parTxLTRAlign" val="l"/>
+                <dgm:param type="shpTxLTRAlignCh" val="l"/>
+                <dgm:param type="parTxRTLAlign" val="r"/>
+                <dgm:param type="shpTxRTLAlignCh" val="r"/>
+                <dgm:param type="stBulletLvl" val="0"/>
+              </dgm:alg>
+              <dgm:shape xmlns:r="http://schemas.openxmlformats.org/officeDocument/2006/relationships" type="rect" r:blip="">
+                <dgm:adjLst/>
+              </dgm:shape>
+              <dgm:presOf axis="des" ptType="node"/>
+              <dgm:constrLst>
+                <dgm:constr type="primFontSz" val="18"/>
+                <dgm:constr type="secFontSz" refType="primFontSz"/>
+                <dgm:constr type="lMarg" refType="h" fact="0.3"/>
+                <dgm:constr type="rMarg" refType="h" fact="0.3"/>
+                <dgm:constr type="tMarg" refType="h" fact="0.3"/>
+                <dgm:constr type="bMarg" refType="h" fact="0.3"/>
+              </dgm:constrLst>
+              <dgm:ruleLst>
+                <dgm:rule type="primFontSz" val="11" fact="NaN" max="NaN"/>
+              </dgm:ruleLst>
+            </dgm:layoutNode>
+          </dgm:if>
+          <dgm:else name="Name14"/>
+        </dgm:choose>
+      </dgm:layoutNode>
+      <dgm:forEach name="Name15" axis="followSib" ptType="sibTrans" cnt="1">
+        <dgm:layoutNode name="sibTrans">
+          <dgm:alg type="sp"/>
+          <dgm:shape xmlns:r="http://schemas.openxmlformats.org/officeDocument/2006/relationships" r:blip="">
+            <dgm:adjLst/>
+          </dgm:shape>
+          <dgm:presOf axis="self"/>
+          <dgm:constrLst/>
+          <dgm:ruleLst/>
+        </dgm:layoutNode>
+      </dgm:forEach>
+    </dgm:forEach>
+  </dgm:layoutNode>
+  <dgm:extLst>
+    <a:ext uri="{68A01E43-0DF5-4B5B-8FA6-DAF915123BFB}">
+      <dgm1612:lstStyle xmlns:dgm1612="http://schemas.microsoft.com/office/drawing/2016/12/diagram">
+        <a:lvl1pPr>
+          <a:lnSpc>
+            <a:spcPct val="100000"/>
+          </a:lnSpc>
+        </a:lvl1pPr>
+        <a:lvl2pPr>
+          <a:lnSpc>
+            <a:spcPct val="100000"/>
+          </a:lnSpc>
+        </a:lvl2pPr>
+      </dgm1612:lstStyle>
+    </a:ext>
+  </dgm:extLst>
+</dgm:layoutDef>
+</file>
+
 <file path=ppt/diagrams/quickStyle1.xml><?xml version="1.0" encoding="utf-8"?>
 <dgm:styleDef xmlns:dgm="http://schemas.openxmlformats.org/drawingml/2006/diagram" xmlns:a="http://schemas.openxmlformats.org/drawingml/2006/main" uniqueId="urn:microsoft.com/office/officeart/2005/8/quickstyle/simple4">
   <dgm:title val=""/>
@@ -13894,6 +16577,1040 @@
         <a:scrgbClr r="0" g="0" b="0"/>
       </a:fillRef>
       <a:effectRef idx="2">
+        <a:scrgbClr r="0" g="0" b="0"/>
+      </a:effectRef>
+      <a:fontRef idx="minor"/>
+    </dgm:style>
+  </dgm:styleLbl>
+  <dgm:styleLbl name="revTx">
+    <dgm:scene3d>
+      <a:camera prst="orthographicFront"/>
+      <a:lightRig rig="threePt" dir="t"/>
+    </dgm:scene3d>
+    <dgm:sp3d/>
+    <dgm:txPr/>
+    <dgm:style>
+      <a:lnRef idx="0">
+        <a:scrgbClr r="0" g="0" b="0"/>
+      </a:lnRef>
+      <a:fillRef idx="0">
+        <a:scrgbClr r="0" g="0" b="0"/>
+      </a:fillRef>
+      <a:effectRef idx="0">
+        <a:scrgbClr r="0" g="0" b="0"/>
+      </a:effectRef>
+      <a:fontRef idx="minor"/>
+    </dgm:style>
+  </dgm:styleLbl>
+</dgm:styleDef>
+</file>
+
+<file path=ppt/diagrams/quickStyle5.xml><?xml version="1.0" encoding="utf-8"?>
+<dgm:styleDef xmlns:dgm="http://schemas.openxmlformats.org/drawingml/2006/diagram" xmlns:a="http://schemas.openxmlformats.org/drawingml/2006/main" uniqueId="urn:microsoft.com/office/officeart/2005/8/quickstyle/simple1">
+  <dgm:title val=""/>
+  <dgm:desc val=""/>
+  <dgm:catLst>
+    <dgm:cat type="simple" pri="10100"/>
+  </dgm:catLst>
+  <dgm:scene3d>
+    <a:camera prst="orthographicFront"/>
+    <a:lightRig rig="threePt" dir="t"/>
+  </dgm:scene3d>
+  <dgm:styleLbl name="node0">
+    <dgm:scene3d>
+      <a:camera prst="orthographicFront"/>
+      <a:lightRig rig="threePt" dir="t"/>
+    </dgm:scene3d>
+    <dgm:sp3d/>
+    <dgm:txPr/>
+    <dgm:style>
+      <a:lnRef idx="2">
+        <a:scrgbClr r="0" g="0" b="0"/>
+      </a:lnRef>
+      <a:fillRef idx="1">
+        <a:scrgbClr r="0" g="0" b="0"/>
+      </a:fillRef>
+      <a:effectRef idx="0">
+        <a:scrgbClr r="0" g="0" b="0"/>
+      </a:effectRef>
+      <a:fontRef idx="minor">
+        <a:schemeClr val="lt1"/>
+      </a:fontRef>
+    </dgm:style>
+  </dgm:styleLbl>
+  <dgm:styleLbl name="lnNode1">
+    <dgm:scene3d>
+      <a:camera prst="orthographicFront"/>
+      <a:lightRig rig="threePt" dir="t"/>
+    </dgm:scene3d>
+    <dgm:sp3d/>
+    <dgm:txPr/>
+    <dgm:style>
+      <a:lnRef idx="2">
+        <a:scrgbClr r="0" g="0" b="0"/>
+      </a:lnRef>
+      <a:fillRef idx="1">
+        <a:scrgbClr r="0" g="0" b="0"/>
+      </a:fillRef>
+      <a:effectRef idx="0">
+        <a:scrgbClr r="0" g="0" b="0"/>
+      </a:effectRef>
+      <a:fontRef idx="minor">
+        <a:schemeClr val="lt1"/>
+      </a:fontRef>
+    </dgm:style>
+  </dgm:styleLbl>
+  <dgm:styleLbl name="vennNode1">
+    <dgm:scene3d>
+      <a:camera prst="orthographicFront"/>
+      <a:lightRig rig="threePt" dir="t"/>
+    </dgm:scene3d>
+    <dgm:sp3d/>
+    <dgm:txPr/>
+    <dgm:style>
+      <a:lnRef idx="2">
+        <a:scrgbClr r="0" g="0" b="0"/>
+      </a:lnRef>
+      <a:fillRef idx="1">
+        <a:scrgbClr r="0" g="0" b="0"/>
+      </a:fillRef>
+      <a:effectRef idx="0">
+        <a:scrgbClr r="0" g="0" b="0"/>
+      </a:effectRef>
+      <a:fontRef idx="minor">
+        <a:schemeClr val="tx1"/>
+      </a:fontRef>
+    </dgm:style>
+  </dgm:styleLbl>
+  <dgm:styleLbl name="alignNode1">
+    <dgm:scene3d>
+      <a:camera prst="orthographicFront"/>
+      <a:lightRig rig="threePt" dir="t"/>
+    </dgm:scene3d>
+    <dgm:sp3d/>
+    <dgm:txPr/>
+    <dgm:style>
+      <a:lnRef idx="2">
+        <a:scrgbClr r="0" g="0" b="0"/>
+      </a:lnRef>
+      <a:fillRef idx="1">
+        <a:scrgbClr r="0" g="0" b="0"/>
+      </a:fillRef>
+      <a:effectRef idx="0">
+        <a:scrgbClr r="0" g="0" b="0"/>
+      </a:effectRef>
+      <a:fontRef idx="minor">
+        <a:schemeClr val="lt1"/>
+      </a:fontRef>
+    </dgm:style>
+  </dgm:styleLbl>
+  <dgm:styleLbl name="node1">
+    <dgm:scene3d>
+      <a:camera prst="orthographicFront"/>
+      <a:lightRig rig="threePt" dir="t"/>
+    </dgm:scene3d>
+    <dgm:sp3d/>
+    <dgm:txPr/>
+    <dgm:style>
+      <a:lnRef idx="2">
+        <a:scrgbClr r="0" g="0" b="0"/>
+      </a:lnRef>
+      <a:fillRef idx="1">
+        <a:scrgbClr r="0" g="0" b="0"/>
+      </a:fillRef>
+      <a:effectRef idx="0">
+        <a:scrgbClr r="0" g="0" b="0"/>
+      </a:effectRef>
+      <a:fontRef idx="minor">
+        <a:schemeClr val="lt1"/>
+      </a:fontRef>
+    </dgm:style>
+  </dgm:styleLbl>
+  <dgm:styleLbl name="node2">
+    <dgm:scene3d>
+      <a:camera prst="orthographicFront"/>
+      <a:lightRig rig="threePt" dir="t"/>
+    </dgm:scene3d>
+    <dgm:sp3d/>
+    <dgm:txPr/>
+    <dgm:style>
+      <a:lnRef idx="2">
+        <a:scrgbClr r="0" g="0" b="0"/>
+      </a:lnRef>
+      <a:fillRef idx="1">
+        <a:scrgbClr r="0" g="0" b="0"/>
+      </a:fillRef>
+      <a:effectRef idx="0">
+        <a:scrgbClr r="0" g="0" b="0"/>
+      </a:effectRef>
+      <a:fontRef idx="minor">
+        <a:schemeClr val="lt1"/>
+      </a:fontRef>
+    </dgm:style>
+  </dgm:styleLbl>
+  <dgm:styleLbl name="node3">
+    <dgm:scene3d>
+      <a:camera prst="orthographicFront"/>
+      <a:lightRig rig="threePt" dir="t"/>
+    </dgm:scene3d>
+    <dgm:sp3d/>
+    <dgm:txPr/>
+    <dgm:style>
+      <a:lnRef idx="2">
+        <a:scrgbClr r="0" g="0" b="0"/>
+      </a:lnRef>
+      <a:fillRef idx="1">
+        <a:scrgbClr r="0" g="0" b="0"/>
+      </a:fillRef>
+      <a:effectRef idx="0">
+        <a:scrgbClr r="0" g="0" b="0"/>
+      </a:effectRef>
+      <a:fontRef idx="minor">
+        <a:schemeClr val="lt1"/>
+      </a:fontRef>
+    </dgm:style>
+  </dgm:styleLbl>
+  <dgm:styleLbl name="node4">
+    <dgm:scene3d>
+      <a:camera prst="orthographicFront"/>
+      <a:lightRig rig="threePt" dir="t"/>
+    </dgm:scene3d>
+    <dgm:sp3d/>
+    <dgm:txPr/>
+    <dgm:style>
+      <a:lnRef idx="2">
+        <a:scrgbClr r="0" g="0" b="0"/>
+      </a:lnRef>
+      <a:fillRef idx="1">
+        <a:scrgbClr r="0" g="0" b="0"/>
+      </a:fillRef>
+      <a:effectRef idx="0">
+        <a:scrgbClr r="0" g="0" b="0"/>
+      </a:effectRef>
+      <a:fontRef idx="minor">
+        <a:schemeClr val="lt1"/>
+      </a:fontRef>
+    </dgm:style>
+  </dgm:styleLbl>
+  <dgm:styleLbl name="fgImgPlace1">
+    <dgm:scene3d>
+      <a:camera prst="orthographicFront"/>
+      <a:lightRig rig="threePt" dir="t"/>
+    </dgm:scene3d>
+    <dgm:sp3d/>
+    <dgm:txPr/>
+    <dgm:style>
+      <a:lnRef idx="2">
+        <a:scrgbClr r="0" g="0" b="0"/>
+      </a:lnRef>
+      <a:fillRef idx="1">
+        <a:scrgbClr r="0" g="0" b="0"/>
+      </a:fillRef>
+      <a:effectRef idx="0">
+        <a:scrgbClr r="0" g="0" b="0"/>
+      </a:effectRef>
+      <a:fontRef idx="minor"/>
+    </dgm:style>
+  </dgm:styleLbl>
+  <dgm:styleLbl name="alignImgPlace1">
+    <dgm:scene3d>
+      <a:camera prst="orthographicFront"/>
+      <a:lightRig rig="threePt" dir="t"/>
+    </dgm:scene3d>
+    <dgm:sp3d/>
+    <dgm:txPr/>
+    <dgm:style>
+      <a:lnRef idx="2">
+        <a:scrgbClr r="0" g="0" b="0"/>
+      </a:lnRef>
+      <a:fillRef idx="1">
+        <a:scrgbClr r="0" g="0" b="0"/>
+      </a:fillRef>
+      <a:effectRef idx="0">
+        <a:scrgbClr r="0" g="0" b="0"/>
+      </a:effectRef>
+      <a:fontRef idx="minor"/>
+    </dgm:style>
+  </dgm:styleLbl>
+  <dgm:styleLbl name="bgImgPlace1">
+    <dgm:scene3d>
+      <a:camera prst="orthographicFront"/>
+      <a:lightRig rig="threePt" dir="t"/>
+    </dgm:scene3d>
+    <dgm:sp3d/>
+    <dgm:txPr/>
+    <dgm:style>
+      <a:lnRef idx="2">
+        <a:scrgbClr r="0" g="0" b="0"/>
+      </a:lnRef>
+      <a:fillRef idx="1">
+        <a:scrgbClr r="0" g="0" b="0"/>
+      </a:fillRef>
+      <a:effectRef idx="0">
+        <a:scrgbClr r="0" g="0" b="0"/>
+      </a:effectRef>
+      <a:fontRef idx="minor"/>
+    </dgm:style>
+  </dgm:styleLbl>
+  <dgm:styleLbl name="sibTrans2D1">
+    <dgm:scene3d>
+      <a:camera prst="orthographicFront"/>
+      <a:lightRig rig="threePt" dir="t"/>
+    </dgm:scene3d>
+    <dgm:sp3d/>
+    <dgm:txPr/>
+    <dgm:style>
+      <a:lnRef idx="0">
+        <a:scrgbClr r="0" g="0" b="0"/>
+      </a:lnRef>
+      <a:fillRef idx="1">
+        <a:scrgbClr r="0" g="0" b="0"/>
+      </a:fillRef>
+      <a:effectRef idx="0">
+        <a:scrgbClr r="0" g="0" b="0"/>
+      </a:effectRef>
+      <a:fontRef idx="minor">
+        <a:schemeClr val="lt1"/>
+      </a:fontRef>
+    </dgm:style>
+  </dgm:styleLbl>
+  <dgm:styleLbl name="fgSibTrans2D1">
+    <dgm:scene3d>
+      <a:camera prst="orthographicFront"/>
+      <a:lightRig rig="threePt" dir="t"/>
+    </dgm:scene3d>
+    <dgm:sp3d/>
+    <dgm:txPr/>
+    <dgm:style>
+      <a:lnRef idx="0">
+        <a:scrgbClr r="0" g="0" b="0"/>
+      </a:lnRef>
+      <a:fillRef idx="1">
+        <a:scrgbClr r="0" g="0" b="0"/>
+      </a:fillRef>
+      <a:effectRef idx="0">
+        <a:scrgbClr r="0" g="0" b="0"/>
+      </a:effectRef>
+      <a:fontRef idx="minor">
+        <a:schemeClr val="lt1"/>
+      </a:fontRef>
+    </dgm:style>
+  </dgm:styleLbl>
+  <dgm:styleLbl name="bgSibTrans2D1">
+    <dgm:scene3d>
+      <a:camera prst="orthographicFront"/>
+      <a:lightRig rig="threePt" dir="t"/>
+    </dgm:scene3d>
+    <dgm:sp3d/>
+    <dgm:txPr/>
+    <dgm:style>
+      <a:lnRef idx="0">
+        <a:scrgbClr r="0" g="0" b="0"/>
+      </a:lnRef>
+      <a:fillRef idx="1">
+        <a:scrgbClr r="0" g="0" b="0"/>
+      </a:fillRef>
+      <a:effectRef idx="0">
+        <a:scrgbClr r="0" g="0" b="0"/>
+      </a:effectRef>
+      <a:fontRef idx="minor">
+        <a:schemeClr val="lt1"/>
+      </a:fontRef>
+    </dgm:style>
+  </dgm:styleLbl>
+  <dgm:styleLbl name="sibTrans1D1">
+    <dgm:scene3d>
+      <a:camera prst="orthographicFront"/>
+      <a:lightRig rig="threePt" dir="t"/>
+    </dgm:scene3d>
+    <dgm:sp3d/>
+    <dgm:txPr/>
+    <dgm:style>
+      <a:lnRef idx="1">
+        <a:scrgbClr r="0" g="0" b="0"/>
+      </a:lnRef>
+      <a:fillRef idx="0">
+        <a:scrgbClr r="0" g="0" b="0"/>
+      </a:fillRef>
+      <a:effectRef idx="0">
+        <a:scrgbClr r="0" g="0" b="0"/>
+      </a:effectRef>
+      <a:fontRef idx="minor"/>
+    </dgm:style>
+  </dgm:styleLbl>
+  <dgm:styleLbl name="callout">
+    <dgm:scene3d>
+      <a:camera prst="orthographicFront"/>
+      <a:lightRig rig="threePt" dir="t"/>
+    </dgm:scene3d>
+    <dgm:sp3d/>
+    <dgm:txPr/>
+    <dgm:style>
+      <a:lnRef idx="2">
+        <a:scrgbClr r="0" g="0" b="0"/>
+      </a:lnRef>
+      <a:fillRef idx="1">
+        <a:scrgbClr r="0" g="0" b="0"/>
+      </a:fillRef>
+      <a:effectRef idx="0">
+        <a:scrgbClr r="0" g="0" b="0"/>
+      </a:effectRef>
+      <a:fontRef idx="minor"/>
+    </dgm:style>
+  </dgm:styleLbl>
+  <dgm:styleLbl name="asst0">
+    <dgm:scene3d>
+      <a:camera prst="orthographicFront"/>
+      <a:lightRig rig="threePt" dir="t"/>
+    </dgm:scene3d>
+    <dgm:sp3d/>
+    <dgm:txPr/>
+    <dgm:style>
+      <a:lnRef idx="2">
+        <a:scrgbClr r="0" g="0" b="0"/>
+      </a:lnRef>
+      <a:fillRef idx="1">
+        <a:scrgbClr r="0" g="0" b="0"/>
+      </a:fillRef>
+      <a:effectRef idx="0">
+        <a:scrgbClr r="0" g="0" b="0"/>
+      </a:effectRef>
+      <a:fontRef idx="minor">
+        <a:schemeClr val="lt1"/>
+      </a:fontRef>
+    </dgm:style>
+  </dgm:styleLbl>
+  <dgm:styleLbl name="asst1">
+    <dgm:scene3d>
+      <a:camera prst="orthographicFront"/>
+      <a:lightRig rig="threePt" dir="t"/>
+    </dgm:scene3d>
+    <dgm:sp3d/>
+    <dgm:txPr/>
+    <dgm:style>
+      <a:lnRef idx="2">
+        <a:scrgbClr r="0" g="0" b="0"/>
+      </a:lnRef>
+      <a:fillRef idx="1">
+        <a:scrgbClr r="0" g="0" b="0"/>
+      </a:fillRef>
+      <a:effectRef idx="0">
+        <a:scrgbClr r="0" g="0" b="0"/>
+      </a:effectRef>
+      <a:fontRef idx="minor">
+        <a:schemeClr val="lt1"/>
+      </a:fontRef>
+    </dgm:style>
+  </dgm:styleLbl>
+  <dgm:styleLbl name="asst2">
+    <dgm:scene3d>
+      <a:camera prst="orthographicFront"/>
+      <a:lightRig rig="threePt" dir="t"/>
+    </dgm:scene3d>
+    <dgm:sp3d/>
+    <dgm:txPr/>
+    <dgm:style>
+      <a:lnRef idx="2">
+        <a:scrgbClr r="0" g="0" b="0"/>
+      </a:lnRef>
+      <a:fillRef idx="1">
+        <a:scrgbClr r="0" g="0" b="0"/>
+      </a:fillRef>
+      <a:effectRef idx="0">
+        <a:scrgbClr r="0" g="0" b="0"/>
+      </a:effectRef>
+      <a:fontRef idx="minor">
+        <a:schemeClr val="lt1"/>
+      </a:fontRef>
+    </dgm:style>
+  </dgm:styleLbl>
+  <dgm:styleLbl name="asst3">
+    <dgm:scene3d>
+      <a:camera prst="orthographicFront"/>
+      <a:lightRig rig="threePt" dir="t"/>
+    </dgm:scene3d>
+    <dgm:sp3d/>
+    <dgm:txPr/>
+    <dgm:style>
+      <a:lnRef idx="2">
+        <a:scrgbClr r="0" g="0" b="0"/>
+      </a:lnRef>
+      <a:fillRef idx="1">
+        <a:scrgbClr r="0" g="0" b="0"/>
+      </a:fillRef>
+      <a:effectRef idx="0">
+        <a:scrgbClr r="0" g="0" b="0"/>
+      </a:effectRef>
+      <a:fontRef idx="minor">
+        <a:schemeClr val="lt1"/>
+      </a:fontRef>
+    </dgm:style>
+  </dgm:styleLbl>
+  <dgm:styleLbl name="asst4">
+    <dgm:scene3d>
+      <a:camera prst="orthographicFront"/>
+      <a:lightRig rig="threePt" dir="t"/>
+    </dgm:scene3d>
+    <dgm:sp3d/>
+    <dgm:txPr/>
+    <dgm:style>
+      <a:lnRef idx="2">
+        <a:scrgbClr r="0" g="0" b="0"/>
+      </a:lnRef>
+      <a:fillRef idx="1">
+        <a:scrgbClr r="0" g="0" b="0"/>
+      </a:fillRef>
+      <a:effectRef idx="0">
+        <a:scrgbClr r="0" g="0" b="0"/>
+      </a:effectRef>
+      <a:fontRef idx="minor">
+        <a:schemeClr val="lt1"/>
+      </a:fontRef>
+    </dgm:style>
+  </dgm:styleLbl>
+  <dgm:styleLbl name="parChTrans2D1">
+    <dgm:scene3d>
+      <a:camera prst="orthographicFront"/>
+      <a:lightRig rig="threePt" dir="t"/>
+    </dgm:scene3d>
+    <dgm:sp3d/>
+    <dgm:txPr/>
+    <dgm:style>
+      <a:lnRef idx="2">
+        <a:scrgbClr r="0" g="0" b="0"/>
+      </a:lnRef>
+      <a:fillRef idx="1">
+        <a:scrgbClr r="0" g="0" b="0"/>
+      </a:fillRef>
+      <a:effectRef idx="0">
+        <a:scrgbClr r="0" g="0" b="0"/>
+      </a:effectRef>
+      <a:fontRef idx="minor">
+        <a:schemeClr val="lt1"/>
+      </a:fontRef>
+    </dgm:style>
+  </dgm:styleLbl>
+  <dgm:styleLbl name="parChTrans2D2">
+    <dgm:scene3d>
+      <a:camera prst="orthographicFront"/>
+      <a:lightRig rig="threePt" dir="t"/>
+    </dgm:scene3d>
+    <dgm:sp3d/>
+    <dgm:txPr/>
+    <dgm:style>
+      <a:lnRef idx="2">
+        <a:scrgbClr r="0" g="0" b="0"/>
+      </a:lnRef>
+      <a:fillRef idx="1">
+        <a:scrgbClr r="0" g="0" b="0"/>
+      </a:fillRef>
+      <a:effectRef idx="0">
+        <a:scrgbClr r="0" g="0" b="0"/>
+      </a:effectRef>
+      <a:fontRef idx="minor">
+        <a:schemeClr val="lt1"/>
+      </a:fontRef>
+    </dgm:style>
+  </dgm:styleLbl>
+  <dgm:styleLbl name="parChTrans2D3">
+    <dgm:scene3d>
+      <a:camera prst="orthographicFront"/>
+      <a:lightRig rig="threePt" dir="t"/>
+    </dgm:scene3d>
+    <dgm:sp3d/>
+    <dgm:txPr/>
+    <dgm:style>
+      <a:lnRef idx="2">
+        <a:scrgbClr r="0" g="0" b="0"/>
+      </a:lnRef>
+      <a:fillRef idx="1">
+        <a:scrgbClr r="0" g="0" b="0"/>
+      </a:fillRef>
+      <a:effectRef idx="0">
+        <a:scrgbClr r="0" g="0" b="0"/>
+      </a:effectRef>
+      <a:fontRef idx="minor">
+        <a:schemeClr val="lt1"/>
+      </a:fontRef>
+    </dgm:style>
+  </dgm:styleLbl>
+  <dgm:styleLbl name="parChTrans2D4">
+    <dgm:scene3d>
+      <a:camera prst="orthographicFront"/>
+      <a:lightRig rig="threePt" dir="t"/>
+    </dgm:scene3d>
+    <dgm:sp3d/>
+    <dgm:txPr/>
+    <dgm:style>
+      <a:lnRef idx="2">
+        <a:scrgbClr r="0" g="0" b="0"/>
+      </a:lnRef>
+      <a:fillRef idx="1">
+        <a:scrgbClr r="0" g="0" b="0"/>
+      </a:fillRef>
+      <a:effectRef idx="0">
+        <a:scrgbClr r="0" g="0" b="0"/>
+      </a:effectRef>
+      <a:fontRef idx="minor">
+        <a:schemeClr val="lt1"/>
+      </a:fontRef>
+    </dgm:style>
+  </dgm:styleLbl>
+  <dgm:styleLbl name="parChTrans1D1">
+    <dgm:scene3d>
+      <a:camera prst="orthographicFront"/>
+      <a:lightRig rig="threePt" dir="t"/>
+    </dgm:scene3d>
+    <dgm:sp3d/>
+    <dgm:txPr/>
+    <dgm:style>
+      <a:lnRef idx="2">
+        <a:scrgbClr r="0" g="0" b="0"/>
+      </a:lnRef>
+      <a:fillRef idx="0">
+        <a:scrgbClr r="0" g="0" b="0"/>
+      </a:fillRef>
+      <a:effectRef idx="0">
+        <a:scrgbClr r="0" g="0" b="0"/>
+      </a:effectRef>
+      <a:fontRef idx="minor"/>
+    </dgm:style>
+  </dgm:styleLbl>
+  <dgm:styleLbl name="parChTrans1D2">
+    <dgm:scene3d>
+      <a:camera prst="orthographicFront"/>
+      <a:lightRig rig="threePt" dir="t"/>
+    </dgm:scene3d>
+    <dgm:sp3d/>
+    <dgm:txPr/>
+    <dgm:style>
+      <a:lnRef idx="2">
+        <a:scrgbClr r="0" g="0" b="0"/>
+      </a:lnRef>
+      <a:fillRef idx="0">
+        <a:scrgbClr r="0" g="0" b="0"/>
+      </a:fillRef>
+      <a:effectRef idx="0">
+        <a:scrgbClr r="0" g="0" b="0"/>
+      </a:effectRef>
+      <a:fontRef idx="minor"/>
+    </dgm:style>
+  </dgm:styleLbl>
+  <dgm:styleLbl name="parChTrans1D3">
+    <dgm:scene3d>
+      <a:camera prst="orthographicFront"/>
+      <a:lightRig rig="threePt" dir="t"/>
+    </dgm:scene3d>
+    <dgm:sp3d/>
+    <dgm:txPr/>
+    <dgm:style>
+      <a:lnRef idx="2">
+        <a:scrgbClr r="0" g="0" b="0"/>
+      </a:lnRef>
+      <a:fillRef idx="0">
+        <a:scrgbClr r="0" g="0" b="0"/>
+      </a:fillRef>
+      <a:effectRef idx="0">
+        <a:scrgbClr r="0" g="0" b="0"/>
+      </a:effectRef>
+      <a:fontRef idx="minor"/>
+    </dgm:style>
+  </dgm:styleLbl>
+  <dgm:styleLbl name="parChTrans1D4">
+    <dgm:scene3d>
+      <a:camera prst="orthographicFront"/>
+      <a:lightRig rig="threePt" dir="t"/>
+    </dgm:scene3d>
+    <dgm:sp3d/>
+    <dgm:txPr/>
+    <dgm:style>
+      <a:lnRef idx="2">
+        <a:scrgbClr r="0" g="0" b="0"/>
+      </a:lnRef>
+      <a:fillRef idx="0">
+        <a:scrgbClr r="0" g="0" b="0"/>
+      </a:fillRef>
+      <a:effectRef idx="0">
+        <a:scrgbClr r="0" g="0" b="0"/>
+      </a:effectRef>
+      <a:fontRef idx="minor"/>
+    </dgm:style>
+  </dgm:styleLbl>
+  <dgm:styleLbl name="fgAcc1">
+    <dgm:scene3d>
+      <a:camera prst="orthographicFront"/>
+      <a:lightRig rig="threePt" dir="t"/>
+    </dgm:scene3d>
+    <dgm:sp3d/>
+    <dgm:txPr/>
+    <dgm:style>
+      <a:lnRef idx="2">
+        <a:scrgbClr r="0" g="0" b="0"/>
+      </a:lnRef>
+      <a:fillRef idx="1">
+        <a:scrgbClr r="0" g="0" b="0"/>
+      </a:fillRef>
+      <a:effectRef idx="0">
+        <a:scrgbClr r="0" g="0" b="0"/>
+      </a:effectRef>
+      <a:fontRef idx="minor"/>
+    </dgm:style>
+  </dgm:styleLbl>
+  <dgm:styleLbl name="conFgAcc1">
+    <dgm:scene3d>
+      <a:camera prst="orthographicFront"/>
+      <a:lightRig rig="threePt" dir="t"/>
+    </dgm:scene3d>
+    <dgm:sp3d/>
+    <dgm:txPr/>
+    <dgm:style>
+      <a:lnRef idx="2">
+        <a:scrgbClr r="0" g="0" b="0"/>
+      </a:lnRef>
+      <a:fillRef idx="1">
+        <a:scrgbClr r="0" g="0" b="0"/>
+      </a:fillRef>
+      <a:effectRef idx="0">
+        <a:scrgbClr r="0" g="0" b="0"/>
+      </a:effectRef>
+      <a:fontRef idx="minor"/>
+    </dgm:style>
+  </dgm:styleLbl>
+  <dgm:styleLbl name="alignAcc1">
+    <dgm:scene3d>
+      <a:camera prst="orthographicFront"/>
+      <a:lightRig rig="threePt" dir="t"/>
+    </dgm:scene3d>
+    <dgm:sp3d/>
+    <dgm:txPr/>
+    <dgm:style>
+      <a:lnRef idx="2">
+        <a:scrgbClr r="0" g="0" b="0"/>
+      </a:lnRef>
+      <a:fillRef idx="1">
+        <a:scrgbClr r="0" g="0" b="0"/>
+      </a:fillRef>
+      <a:effectRef idx="0">
+        <a:scrgbClr r="0" g="0" b="0"/>
+      </a:effectRef>
+      <a:fontRef idx="minor"/>
+    </dgm:style>
+  </dgm:styleLbl>
+  <dgm:styleLbl name="trAlignAcc1">
+    <dgm:scene3d>
+      <a:camera prst="orthographicFront"/>
+      <a:lightRig rig="threePt" dir="t"/>
+    </dgm:scene3d>
+    <dgm:sp3d/>
+    <dgm:txPr/>
+    <dgm:style>
+      <a:lnRef idx="1">
+        <a:scrgbClr r="0" g="0" b="0"/>
+      </a:lnRef>
+      <a:fillRef idx="1">
+        <a:scrgbClr r="0" g="0" b="0"/>
+      </a:fillRef>
+      <a:effectRef idx="0">
+        <a:scrgbClr r="0" g="0" b="0"/>
+      </a:effectRef>
+      <a:fontRef idx="minor"/>
+    </dgm:style>
+  </dgm:styleLbl>
+  <dgm:styleLbl name="bgAcc1">
+    <dgm:scene3d>
+      <a:camera prst="orthographicFront"/>
+      <a:lightRig rig="threePt" dir="t"/>
+    </dgm:scene3d>
+    <dgm:sp3d/>
+    <dgm:txPr/>
+    <dgm:style>
+      <a:lnRef idx="2">
+        <a:scrgbClr r="0" g="0" b="0"/>
+      </a:lnRef>
+      <a:fillRef idx="1">
+        <a:scrgbClr r="0" g="0" b="0"/>
+      </a:fillRef>
+      <a:effectRef idx="0">
+        <a:scrgbClr r="0" g="0" b="0"/>
+      </a:effectRef>
+      <a:fontRef idx="minor"/>
+    </dgm:style>
+  </dgm:styleLbl>
+  <dgm:styleLbl name="solidFgAcc1">
+    <dgm:scene3d>
+      <a:camera prst="orthographicFront"/>
+      <a:lightRig rig="threePt" dir="t"/>
+    </dgm:scene3d>
+    <dgm:sp3d/>
+    <dgm:txPr/>
+    <dgm:style>
+      <a:lnRef idx="2">
+        <a:scrgbClr r="0" g="0" b="0"/>
+      </a:lnRef>
+      <a:fillRef idx="1">
+        <a:scrgbClr r="0" g="0" b="0"/>
+      </a:fillRef>
+      <a:effectRef idx="0">
+        <a:scrgbClr r="0" g="0" b="0"/>
+      </a:effectRef>
+      <a:fontRef idx="minor"/>
+    </dgm:style>
+  </dgm:styleLbl>
+  <dgm:styleLbl name="solidAlignAcc1">
+    <dgm:scene3d>
+      <a:camera prst="orthographicFront"/>
+      <a:lightRig rig="threePt" dir="t"/>
+    </dgm:scene3d>
+    <dgm:sp3d/>
+    <dgm:txPr/>
+    <dgm:style>
+      <a:lnRef idx="2">
+        <a:scrgbClr r="0" g="0" b="0"/>
+      </a:lnRef>
+      <a:fillRef idx="1">
+        <a:scrgbClr r="0" g="0" b="0"/>
+      </a:fillRef>
+      <a:effectRef idx="0">
+        <a:scrgbClr r="0" g="0" b="0"/>
+      </a:effectRef>
+      <a:fontRef idx="minor"/>
+    </dgm:style>
+  </dgm:styleLbl>
+  <dgm:styleLbl name="solidBgAcc1">
+    <dgm:scene3d>
+      <a:camera prst="orthographicFront"/>
+      <a:lightRig rig="threePt" dir="t"/>
+    </dgm:scene3d>
+    <dgm:sp3d/>
+    <dgm:txPr/>
+    <dgm:style>
+      <a:lnRef idx="2">
+        <a:scrgbClr r="0" g="0" b="0"/>
+      </a:lnRef>
+      <a:fillRef idx="1">
+        <a:scrgbClr r="0" g="0" b="0"/>
+      </a:fillRef>
+      <a:effectRef idx="0">
+        <a:scrgbClr r="0" g="0" b="0"/>
+      </a:effectRef>
+      <a:fontRef idx="minor"/>
+    </dgm:style>
+  </dgm:styleLbl>
+  <dgm:styleLbl name="fgAccFollowNode1">
+    <dgm:scene3d>
+      <a:camera prst="orthographicFront"/>
+      <a:lightRig rig="threePt" dir="t"/>
+    </dgm:scene3d>
+    <dgm:sp3d/>
+    <dgm:txPr/>
+    <dgm:style>
+      <a:lnRef idx="2">
+        <a:scrgbClr r="0" g="0" b="0"/>
+      </a:lnRef>
+      <a:fillRef idx="1">
+        <a:scrgbClr r="0" g="0" b="0"/>
+      </a:fillRef>
+      <a:effectRef idx="0">
+        <a:scrgbClr r="0" g="0" b="0"/>
+      </a:effectRef>
+      <a:fontRef idx="minor"/>
+    </dgm:style>
+  </dgm:styleLbl>
+  <dgm:styleLbl name="alignAccFollowNode1">
+    <dgm:scene3d>
+      <a:camera prst="orthographicFront"/>
+      <a:lightRig rig="threePt" dir="t"/>
+    </dgm:scene3d>
+    <dgm:sp3d/>
+    <dgm:txPr/>
+    <dgm:style>
+      <a:lnRef idx="2">
+        <a:scrgbClr r="0" g="0" b="0"/>
+      </a:lnRef>
+      <a:fillRef idx="1">
+        <a:scrgbClr r="0" g="0" b="0"/>
+      </a:fillRef>
+      <a:effectRef idx="0">
+        <a:scrgbClr r="0" g="0" b="0"/>
+      </a:effectRef>
+      <a:fontRef idx="minor"/>
+    </dgm:style>
+  </dgm:styleLbl>
+  <dgm:styleLbl name="bgAccFollowNode1">
+    <dgm:scene3d>
+      <a:camera prst="orthographicFront"/>
+      <a:lightRig rig="threePt" dir="t"/>
+    </dgm:scene3d>
+    <dgm:sp3d/>
+    <dgm:txPr/>
+    <dgm:style>
+      <a:lnRef idx="2">
+        <a:scrgbClr r="0" g="0" b="0"/>
+      </a:lnRef>
+      <a:fillRef idx="1">
+        <a:scrgbClr r="0" g="0" b="0"/>
+      </a:fillRef>
+      <a:effectRef idx="0">
+        <a:scrgbClr r="0" g="0" b="0"/>
+      </a:effectRef>
+      <a:fontRef idx="minor"/>
+    </dgm:style>
+  </dgm:styleLbl>
+  <dgm:styleLbl name="fgAcc0">
+    <dgm:scene3d>
+      <a:camera prst="orthographicFront"/>
+      <a:lightRig rig="threePt" dir="t"/>
+    </dgm:scene3d>
+    <dgm:sp3d/>
+    <dgm:txPr/>
+    <dgm:style>
+      <a:lnRef idx="2">
+        <a:scrgbClr r="0" g="0" b="0"/>
+      </a:lnRef>
+      <a:fillRef idx="1">
+        <a:scrgbClr r="0" g="0" b="0"/>
+      </a:fillRef>
+      <a:effectRef idx="0">
+        <a:scrgbClr r="0" g="0" b="0"/>
+      </a:effectRef>
+      <a:fontRef idx="minor"/>
+    </dgm:style>
+  </dgm:styleLbl>
+  <dgm:styleLbl name="fgAcc2">
+    <dgm:scene3d>
+      <a:camera prst="orthographicFront"/>
+      <a:lightRig rig="threePt" dir="t"/>
+    </dgm:scene3d>
+    <dgm:sp3d/>
+    <dgm:txPr/>
+    <dgm:style>
+      <a:lnRef idx="2">
+        <a:scrgbClr r="0" g="0" b="0"/>
+      </a:lnRef>
+      <a:fillRef idx="1">
+        <a:scrgbClr r="0" g="0" b="0"/>
+      </a:fillRef>
+      <a:effectRef idx="0">
+        <a:scrgbClr r="0" g="0" b="0"/>
+      </a:effectRef>
+      <a:fontRef idx="minor"/>
+    </dgm:style>
+  </dgm:styleLbl>
+  <dgm:styleLbl name="fgAcc3">
+    <dgm:scene3d>
+      <a:camera prst="orthographicFront"/>
+      <a:lightRig rig="threePt" dir="t"/>
+    </dgm:scene3d>
+    <dgm:sp3d/>
+    <dgm:txPr/>
+    <dgm:style>
+      <a:lnRef idx="2">
+        <a:scrgbClr r="0" g="0" b="0"/>
+      </a:lnRef>
+      <a:fillRef idx="1">
+        <a:scrgbClr r="0" g="0" b="0"/>
+      </a:fillRef>
+      <a:effectRef idx="0">
+        <a:scrgbClr r="0" g="0" b="0"/>
+      </a:effectRef>
+      <a:fontRef idx="minor"/>
+    </dgm:style>
+  </dgm:styleLbl>
+  <dgm:styleLbl name="fgAcc4">
+    <dgm:scene3d>
+      <a:camera prst="orthographicFront"/>
+      <a:lightRig rig="threePt" dir="t"/>
+    </dgm:scene3d>
+    <dgm:sp3d/>
+    <dgm:txPr/>
+    <dgm:style>
+      <a:lnRef idx="2">
+        <a:scrgbClr r="0" g="0" b="0"/>
+      </a:lnRef>
+      <a:fillRef idx="1">
+        <a:scrgbClr r="0" g="0" b="0"/>
+      </a:fillRef>
+      <a:effectRef idx="0">
+        <a:scrgbClr r="0" g="0" b="0"/>
+      </a:effectRef>
+      <a:fontRef idx="minor"/>
+    </dgm:style>
+  </dgm:styleLbl>
+  <dgm:styleLbl name="bgShp">
+    <dgm:scene3d>
+      <a:camera prst="orthographicFront"/>
+      <a:lightRig rig="threePt" dir="t"/>
+    </dgm:scene3d>
+    <dgm:sp3d/>
+    <dgm:txPr/>
+    <dgm:style>
+      <a:lnRef idx="0">
+        <a:scrgbClr r="0" g="0" b="0"/>
+      </a:lnRef>
+      <a:fillRef idx="1">
+        <a:scrgbClr r="0" g="0" b="0"/>
+      </a:fillRef>
+      <a:effectRef idx="0">
+        <a:scrgbClr r="0" g="0" b="0"/>
+      </a:effectRef>
+      <a:fontRef idx="minor"/>
+    </dgm:style>
+  </dgm:styleLbl>
+  <dgm:styleLbl name="dkBgShp">
+    <dgm:scene3d>
+      <a:camera prst="orthographicFront"/>
+      <a:lightRig rig="threePt" dir="t"/>
+    </dgm:scene3d>
+    <dgm:sp3d/>
+    <dgm:txPr/>
+    <dgm:style>
+      <a:lnRef idx="0">
+        <a:scrgbClr r="0" g="0" b="0"/>
+      </a:lnRef>
+      <a:fillRef idx="1">
+        <a:scrgbClr r="0" g="0" b="0"/>
+      </a:fillRef>
+      <a:effectRef idx="0">
+        <a:scrgbClr r="0" g="0" b="0"/>
+      </a:effectRef>
+      <a:fontRef idx="minor"/>
+    </dgm:style>
+  </dgm:styleLbl>
+  <dgm:styleLbl name="trBgShp">
+    <dgm:scene3d>
+      <a:camera prst="orthographicFront"/>
+      <a:lightRig rig="threePt" dir="t"/>
+    </dgm:scene3d>
+    <dgm:sp3d/>
+    <dgm:txPr/>
+    <dgm:style>
+      <a:lnRef idx="0">
+        <a:scrgbClr r="0" g="0" b="0"/>
+      </a:lnRef>
+      <a:fillRef idx="1">
+        <a:scrgbClr r="0" g="0" b="0"/>
+      </a:fillRef>
+      <a:effectRef idx="0">
+        <a:scrgbClr r="0" g="0" b="0"/>
+      </a:effectRef>
+      <a:fontRef idx="minor"/>
+    </dgm:style>
+  </dgm:styleLbl>
+  <dgm:styleLbl name="fgShp">
+    <dgm:scene3d>
+      <a:camera prst="orthographicFront"/>
+      <a:lightRig rig="threePt" dir="t"/>
+    </dgm:scene3d>
+    <dgm:sp3d/>
+    <dgm:txPr/>
+    <dgm:style>
+      <a:lnRef idx="2">
+        <a:scrgbClr r="0" g="0" b="0"/>
+      </a:lnRef>
+      <a:fillRef idx="1">
+        <a:scrgbClr r="0" g="0" b="0"/>
+      </a:fillRef>
+      <a:effectRef idx="0">
         <a:scrgbClr r="0" g="0" b="0"/>
       </a:effectRef>
       <a:fontRef idx="minor"/>
@@ -24990,6 +28707,29 @@
 <file path=ppt/slides/slide13.xml><?xml version="1.0" encoding="utf-8"?>
 <p:sld xmlns:a="http://schemas.openxmlformats.org/drawingml/2006/main" xmlns:r="http://schemas.openxmlformats.org/officeDocument/2006/relationships" xmlns:p="http://schemas.openxmlformats.org/presentationml/2006/main">
   <p:cSld>
+    <p:bg>
+      <p:bgPr>
+        <a:gradFill rotWithShape="1">
+          <a:gsLst>
+            <a:gs pos="0">
+              <a:schemeClr val="bg2">
+                <a:tint val="90000"/>
+                <a:lumMod val="120000"/>
+              </a:schemeClr>
+            </a:gs>
+            <a:gs pos="100000">
+              <a:schemeClr val="bg2">
+                <a:shade val="98000"/>
+                <a:satMod val="120000"/>
+                <a:lumMod val="98000"/>
+              </a:schemeClr>
+            </a:gs>
+          </a:gsLst>
+          <a:lin ang="5400000" scaled="0"/>
+        </a:gradFill>
+        <a:effectLst/>
+      </p:bgPr>
+    </p:bg>
     <p:spTree>
       <p:nvGrpSpPr>
         <p:cNvPr id="1" name=""/>
@@ -25006,6 +28746,69 @@
       </p:grpSpPr>
       <p:sp>
         <p:nvSpPr>
+          <p:cNvPr id="22" name="Rectangle 21">
+            <a:extLst>
+              <a:ext uri="{FF2B5EF4-FFF2-40B4-BE49-F238E27FC236}">
+                <a16:creationId xmlns:a16="http://schemas.microsoft.com/office/drawing/2014/main" id="{1BB01FB5-37B9-4EBD-AF40-DE68D3CA46A6}"/>
+              </a:ext>
+              <a:ext uri="{C183D7F6-B498-43B3-948B-1728B52AA6E4}">
+                <adec:decorative xmlns:adec="http://schemas.microsoft.com/office/drawing/2017/decorative" val="1"/>
+              </a:ext>
+            </a:extLst>
+          </p:cNvPr>
+          <p:cNvSpPr>
+            <a:spLocks noGrp="1" noRot="1" noChangeAspect="1" noMove="1" noResize="1" noEditPoints="1" noAdjustHandles="1" noChangeArrowheads="1" noChangeShapeType="1" noTextEdit="1"/>
+          </p:cNvSpPr>
+          <p:nvPr>
+            <p:extLst>
+              <p:ext uri="{386F3935-93C4-4BCD-93E2-E3B085C9AB24}">
+                <p16:designElem xmlns:p16="http://schemas.microsoft.com/office/powerpoint/2015/main" val="1"/>
+              </p:ext>
+            </p:extLst>
+          </p:nvPr>
+        </p:nvSpPr>
+        <p:spPr>
+          <a:xfrm>
+            <a:off x="1" y="0"/>
+            <a:ext cx="4059079" cy="6858000"/>
+          </a:xfrm>
+          <a:prstGeom prst="rect">
+            <a:avLst/>
+          </a:prstGeom>
+          <a:solidFill>
+            <a:schemeClr val="tx2"/>
+          </a:solidFill>
+          <a:ln>
+            <a:noFill/>
+          </a:ln>
+        </p:spPr>
+        <p:style>
+          <a:lnRef idx="2">
+            <a:schemeClr val="accent1">
+              <a:shade val="50000"/>
+            </a:schemeClr>
+          </a:lnRef>
+          <a:fillRef idx="1">
+            <a:schemeClr val="accent1"/>
+          </a:fillRef>
+          <a:effectRef idx="0">
+            <a:schemeClr val="accent1"/>
+          </a:effectRef>
+          <a:fontRef idx="minor">
+            <a:schemeClr val="lt1"/>
+          </a:fontRef>
+        </p:style>
+        <p:txBody>
+          <a:bodyPr rtlCol="0" anchor="ctr"/>
+          <a:lstStyle/>
+          <a:p>
+            <a:pPr algn="ctr"/>
+            <a:endParaRPr lang="en-US"/>
+          </a:p>
+        </p:txBody>
+      </p:sp>
+      <p:sp>
+        <p:nvSpPr>
           <p:cNvPr id="2" name="Title 1">
             <a:extLst>
               <a:ext uri="{FF2B5EF4-FFF2-40B4-BE49-F238E27FC236}">
@@ -25020,13 +28823,24 @@
             <p:ph type="title"/>
           </p:nvPr>
         </p:nvSpPr>
-        <p:spPr/>
+        <p:spPr>
+          <a:xfrm>
+            <a:off x="1261295" y="2648511"/>
+            <a:ext cx="2454052" cy="1803416"/>
+          </a:xfrm>
+        </p:spPr>
         <p:txBody>
-          <a:bodyPr/>
+          <a:bodyPr>
+            <a:normAutofit/>
+          </a:bodyPr>
           <a:lstStyle/>
           <a:p>
             <a:r>
-              <a:rPr lang="en-US" dirty="0"/>
+              <a:rPr lang="en-US" sz="2500" dirty="0">
+                <a:solidFill>
+                  <a:schemeClr val="bg1"/>
+                </a:solidFill>
+              </a:rPr>
               <a:t>Integrating Existing Risk Management Frameworks</a:t>
             </a:r>
           </a:p>
@@ -25034,29 +28848,287 @@
       </p:sp>
       <p:sp>
         <p:nvSpPr>
-          <p:cNvPr id="3" name="Content Placeholder 2">
+          <p:cNvPr id="24" name="Freeform 11">
             <a:extLst>
               <a:ext uri="{FF2B5EF4-FFF2-40B4-BE49-F238E27FC236}">
-                <a16:creationId xmlns:a16="http://schemas.microsoft.com/office/drawing/2014/main" id="{461877FB-A676-4CE0-B74E-034B49AA5491}"/>
+                <a16:creationId xmlns:a16="http://schemas.microsoft.com/office/drawing/2014/main" id="{06AF6A9A-0638-4916-AD29-9FC8FC07AE5F}"/>
+              </a:ext>
+              <a:ext uri="{C183D7F6-B498-43B3-948B-1728B52AA6E4}">
+                <adec:decorative xmlns:adec="http://schemas.microsoft.com/office/drawing/2017/decorative" val="1"/>
               </a:ext>
             </a:extLst>
           </p:cNvPr>
           <p:cNvSpPr>
-            <a:spLocks noGrp="1"/>
+            <a:spLocks noGrp="1" noRot="1" noChangeAspect="1" noMove="1" noResize="1" noEditPoints="1" noAdjustHandles="1" noChangeArrowheads="1" noChangeShapeType="1" noTextEdit="1"/>
           </p:cNvSpPr>
           <p:nvPr>
-            <p:ph idx="1"/>
+            <p:extLst>
+              <p:ext uri="{386F3935-93C4-4BCD-93E2-E3B085C9AB24}">
+                <p16:designElem xmlns:p16="http://schemas.microsoft.com/office/powerpoint/2015/main" val="1"/>
+              </p:ext>
+            </p:extLst>
           </p:nvPr>
         </p:nvSpPr>
-        <p:spPr/>
+        <p:spPr bwMode="auto">
+          <a:xfrm flipV="1">
+            <a:off x="-159" y="3179901"/>
+            <a:ext cx="1098194" cy="514066"/>
+          </a:xfrm>
+          <a:custGeom>
+            <a:avLst/>
+            <a:gdLst>
+              <a:gd name="connsiteX0" fmla="*/ 10000 w 10044"/>
+              <a:gd name="connsiteY0" fmla="*/ 4701 h 9966"/>
+              <a:gd name="connsiteX1" fmla="*/ 8559 w 10044"/>
+              <a:gd name="connsiteY1" fmla="*/ 188 h 9966"/>
+              <a:gd name="connsiteX2" fmla="*/ 8527 w 10044"/>
+              <a:gd name="connsiteY2" fmla="*/ 94 h 9966"/>
+              <a:gd name="connsiteX3" fmla="*/ 8438 w 10044"/>
+              <a:gd name="connsiteY3" fmla="*/ 0 h 9966"/>
+              <a:gd name="connsiteX4" fmla="*/ 7867 w 10044"/>
+              <a:gd name="connsiteY4" fmla="*/ 0 h 9966"/>
+              <a:gd name="connsiteX5" fmla="*/ 0 w 10044"/>
+              <a:gd name="connsiteY5" fmla="*/ 70 h 9966"/>
+              <a:gd name="connsiteX6" fmla="*/ 3132 w 10044"/>
+              <a:gd name="connsiteY6" fmla="*/ 9763 h 9966"/>
+              <a:gd name="connsiteX7" fmla="*/ 7867 w 10044"/>
+              <a:gd name="connsiteY7" fmla="*/ 9966 h 9966"/>
+              <a:gd name="connsiteX8" fmla="*/ 8438 w 10044"/>
+              <a:gd name="connsiteY8" fmla="*/ 9966 h 9966"/>
+              <a:gd name="connsiteX9" fmla="*/ 8527 w 10044"/>
+              <a:gd name="connsiteY9" fmla="*/ 9872 h 9966"/>
+              <a:gd name="connsiteX10" fmla="*/ 8559 w 10044"/>
+              <a:gd name="connsiteY10" fmla="*/ 9778 h 9966"/>
+              <a:gd name="connsiteX11" fmla="*/ 10000 w 10044"/>
+              <a:gd name="connsiteY11" fmla="*/ 5265 h 9966"/>
+              <a:gd name="connsiteX12" fmla="*/ 10000 w 10044"/>
+              <a:gd name="connsiteY12" fmla="*/ 4701 h 9966"/>
+              <a:gd name="connsiteX0" fmla="*/ 6839 w 6883"/>
+              <a:gd name="connsiteY0" fmla="*/ 4885 h 10168"/>
+              <a:gd name="connsiteX1" fmla="*/ 5405 w 6883"/>
+              <a:gd name="connsiteY1" fmla="*/ 357 h 10168"/>
+              <a:gd name="connsiteX2" fmla="*/ 5373 w 6883"/>
+              <a:gd name="connsiteY2" fmla="*/ 262 h 10168"/>
+              <a:gd name="connsiteX3" fmla="*/ 5284 w 6883"/>
+              <a:gd name="connsiteY3" fmla="*/ 168 h 10168"/>
+              <a:gd name="connsiteX4" fmla="*/ 4716 w 6883"/>
+              <a:gd name="connsiteY4" fmla="*/ 168 h 10168"/>
+              <a:gd name="connsiteX5" fmla="*/ 50 w 6883"/>
+              <a:gd name="connsiteY5" fmla="*/ 0 h 10168"/>
+              <a:gd name="connsiteX6" fmla="*/ 1 w 6883"/>
+              <a:gd name="connsiteY6" fmla="*/ 9964 h 10168"/>
+              <a:gd name="connsiteX7" fmla="*/ 4716 w 6883"/>
+              <a:gd name="connsiteY7" fmla="*/ 10168 h 10168"/>
+              <a:gd name="connsiteX8" fmla="*/ 5284 w 6883"/>
+              <a:gd name="connsiteY8" fmla="*/ 10168 h 10168"/>
+              <a:gd name="connsiteX9" fmla="*/ 5373 w 6883"/>
+              <a:gd name="connsiteY9" fmla="*/ 10074 h 10168"/>
+              <a:gd name="connsiteX10" fmla="*/ 5405 w 6883"/>
+              <a:gd name="connsiteY10" fmla="*/ 9979 h 10168"/>
+              <a:gd name="connsiteX11" fmla="*/ 6839 w 6883"/>
+              <a:gd name="connsiteY11" fmla="*/ 5451 h 10168"/>
+              <a:gd name="connsiteX12" fmla="*/ 6839 w 6883"/>
+              <a:gd name="connsiteY12" fmla="*/ 4885 h 10168"/>
+            </a:gdLst>
+            <a:ahLst/>
+            <a:cxnLst>
+              <a:cxn ang="0">
+                <a:pos x="connsiteX0" y="connsiteY0"/>
+              </a:cxn>
+              <a:cxn ang="0">
+                <a:pos x="connsiteX1" y="connsiteY1"/>
+              </a:cxn>
+              <a:cxn ang="0">
+                <a:pos x="connsiteX2" y="connsiteY2"/>
+              </a:cxn>
+              <a:cxn ang="0">
+                <a:pos x="connsiteX3" y="connsiteY3"/>
+              </a:cxn>
+              <a:cxn ang="0">
+                <a:pos x="connsiteX4" y="connsiteY4"/>
+              </a:cxn>
+              <a:cxn ang="0">
+                <a:pos x="connsiteX5" y="connsiteY5"/>
+              </a:cxn>
+              <a:cxn ang="0">
+                <a:pos x="connsiteX6" y="connsiteY6"/>
+              </a:cxn>
+              <a:cxn ang="0">
+                <a:pos x="connsiteX7" y="connsiteY7"/>
+              </a:cxn>
+              <a:cxn ang="0">
+                <a:pos x="connsiteX8" y="connsiteY8"/>
+              </a:cxn>
+              <a:cxn ang="0">
+                <a:pos x="connsiteX9" y="connsiteY9"/>
+              </a:cxn>
+              <a:cxn ang="0">
+                <a:pos x="connsiteX10" y="connsiteY10"/>
+              </a:cxn>
+              <a:cxn ang="0">
+                <a:pos x="connsiteX11" y="connsiteY11"/>
+              </a:cxn>
+              <a:cxn ang="0">
+                <a:pos x="connsiteX12" y="connsiteY12"/>
+              </a:cxn>
+            </a:cxnLst>
+            <a:rect l="l" t="t" r="r" b="b"/>
+            <a:pathLst>
+              <a:path w="6883" h="10168">
+                <a:moveTo>
+                  <a:pt x="6839" y="4885"/>
+                </a:moveTo>
+                <a:lnTo>
+                  <a:pt x="5405" y="357"/>
+                </a:lnTo>
+                <a:cubicBezTo>
+                  <a:pt x="5395" y="325"/>
+                  <a:pt x="5383" y="294"/>
+                  <a:pt x="5373" y="262"/>
+                </a:cubicBezTo>
+                <a:cubicBezTo>
+                  <a:pt x="5344" y="168"/>
+                  <a:pt x="5314" y="168"/>
+                  <a:pt x="5284" y="168"/>
+                </a:cubicBezTo>
+                <a:lnTo>
+                  <a:pt x="4716" y="168"/>
+                </a:lnTo>
+                <a:lnTo>
+                  <a:pt x="50" y="0"/>
+                </a:lnTo>
+                <a:cubicBezTo>
+                  <a:pt x="59" y="3322"/>
+                  <a:pt x="-8" y="6643"/>
+                  <a:pt x="1" y="9964"/>
+                </a:cubicBezTo>
+                <a:lnTo>
+                  <a:pt x="4716" y="10168"/>
+                </a:lnTo>
+                <a:lnTo>
+                  <a:pt x="5284" y="10168"/>
+                </a:lnTo>
+                <a:cubicBezTo>
+                  <a:pt x="5314" y="10168"/>
+                  <a:pt x="5344" y="10074"/>
+                  <a:pt x="5373" y="10074"/>
+                </a:cubicBezTo>
+                <a:cubicBezTo>
+                  <a:pt x="5373" y="9979"/>
+                  <a:pt x="5405" y="9979"/>
+                  <a:pt x="5405" y="9979"/>
+                </a:cubicBezTo>
+                <a:lnTo>
+                  <a:pt x="6839" y="5451"/>
+                </a:lnTo>
+                <a:cubicBezTo>
+                  <a:pt x="6898" y="5262"/>
+                  <a:pt x="6898" y="5074"/>
+                  <a:pt x="6839" y="4885"/>
+                </a:cubicBezTo>
+                <a:close/>
+              </a:path>
+            </a:pathLst>
+          </a:custGeom>
+          <a:solidFill>
+            <a:schemeClr val="accent1"/>
+          </a:solidFill>
+          <a:ln>
+            <a:noFill/>
+          </a:ln>
+        </p:spPr>
+      </p:sp>
+      <p:sp useBgFill="1">
+        <p:nvSpPr>
+          <p:cNvPr id="26" name="Rectangle 25">
+            <a:extLst>
+              <a:ext uri="{FF2B5EF4-FFF2-40B4-BE49-F238E27FC236}">
+                <a16:creationId xmlns:a16="http://schemas.microsoft.com/office/drawing/2014/main" id="{79057B2B-0D8C-47F2-836B-2E7DD462150A}"/>
+              </a:ext>
+              <a:ext uri="{C183D7F6-B498-43B3-948B-1728B52AA6E4}">
+                <adec:decorative xmlns:adec="http://schemas.microsoft.com/office/drawing/2017/decorative" val="1"/>
+              </a:ext>
+            </a:extLst>
+          </p:cNvPr>
+          <p:cNvSpPr>
+            <a:spLocks noGrp="1" noRot="1" noChangeAspect="1" noMove="1" noResize="1" noEditPoints="1" noAdjustHandles="1" noChangeArrowheads="1" noChangeShapeType="1" noTextEdit="1"/>
+          </p:cNvSpPr>
+          <p:nvPr>
+            <p:extLst>
+              <p:ext uri="{386F3935-93C4-4BCD-93E2-E3B085C9AB24}">
+                <p16:designElem xmlns:p16="http://schemas.microsoft.com/office/powerpoint/2015/main" val="1"/>
+              </p:ext>
+            </p:extLst>
+          </p:nvPr>
+        </p:nvSpPr>
+        <p:spPr>
+          <a:xfrm>
+            <a:off x="4795736" y="0"/>
+            <a:ext cx="7396264" cy="6858000"/>
+          </a:xfrm>
+          <a:prstGeom prst="rect">
+            <a:avLst/>
+          </a:prstGeom>
+          <a:ln>
+            <a:noFill/>
+          </a:ln>
+        </p:spPr>
+        <p:style>
+          <a:lnRef idx="2">
+            <a:schemeClr val="accent1">
+              <a:shade val="50000"/>
+            </a:schemeClr>
+          </a:lnRef>
+          <a:fillRef idx="1">
+            <a:schemeClr val="accent1"/>
+          </a:fillRef>
+          <a:effectRef idx="0">
+            <a:schemeClr val="accent1"/>
+          </a:effectRef>
+          <a:fontRef idx="minor">
+            <a:schemeClr val="lt1"/>
+          </a:fontRef>
+        </p:style>
         <p:txBody>
-          <a:bodyPr/>
+          <a:bodyPr rtlCol="0" anchor="ctr"/>
           <a:lstStyle/>
           <a:p>
-            <a:endParaRPr lang="en-US" dirty="0"/>
+            <a:pPr algn="ctr"/>
+            <a:endParaRPr lang="en-US"/>
           </a:p>
         </p:txBody>
       </p:sp>
+      <p:graphicFrame>
+        <p:nvGraphicFramePr>
+          <p:cNvPr id="4" name="Content Placeholder 3">
+            <a:extLst>
+              <a:ext uri="{FF2B5EF4-FFF2-40B4-BE49-F238E27FC236}">
+                <a16:creationId xmlns:a16="http://schemas.microsoft.com/office/drawing/2014/main" id="{0A3F64B9-20A0-4FA6-A487-1DF3ED2328BC}"/>
+              </a:ext>
+            </a:extLst>
+          </p:cNvPr>
+          <p:cNvGraphicFramePr>
+            <a:graphicFrameLocks noGrp="1"/>
+          </p:cNvGraphicFramePr>
+          <p:nvPr>
+            <p:ph idx="1"/>
+            <p:extLst>
+              <p:ext uri="{D42A27DB-BD31-4B8C-83A1-F6EECF244321}">
+                <p14:modId xmlns:p14="http://schemas.microsoft.com/office/powerpoint/2010/main" val="3707212852"/>
+              </p:ext>
+            </p:extLst>
+          </p:nvPr>
+        </p:nvGraphicFramePr>
+        <p:xfrm>
+          <a:off x="4713144" y="641551"/>
+          <a:ext cx="6832212" cy="5264779"/>
+        </p:xfrm>
+        <a:graphic>
+          <a:graphicData uri="http://schemas.openxmlformats.org/drawingml/2006/diagram">
+            <dgm:relIds xmlns:dgm="http://schemas.openxmlformats.org/drawingml/2006/diagram" xmlns:r="http://schemas.openxmlformats.org/officeDocument/2006/relationships" r:dm="rId2" r:lo="rId3" r:qs="rId4" r:cs="rId5"/>
+          </a:graphicData>
+        </a:graphic>
+      </p:graphicFrame>
     </p:spTree>
     <p:extLst>
       <p:ext uri="{BB962C8B-B14F-4D97-AF65-F5344CB8AC3E}">

</xml_diff>